<commit_message>
Aggiornati powerpoint e Technical Architecture
</commit_message>
<xml_diff>
--- a/PowerPointWha2.0.pptx
+++ b/PowerPointWha2.0.pptx
@@ -2,24 +2,24 @@
 <file path=ppt/presentation.xml><?xml version="1.0" encoding="utf-8"?>
 <p:presentation xmlns:a="http://schemas.openxmlformats.org/drawingml/2006/main" xmlns:r="http://schemas.openxmlformats.org/officeDocument/2006/relationships" xmlns:p="http://schemas.openxmlformats.org/presentationml/2006/main">
   <p:sldMasterIdLst>
-    <p:sldMasterId id="2147483648" r:id="rId1"/>
+    <p:sldMasterId id="2147483648" r:id="rId5"/>
   </p:sldMasterIdLst>
   <p:notesMasterIdLst>
-    <p:notesMasterId r:id="rId14"/>
+    <p:notesMasterId r:id="rId7"/>
   </p:notesMasterIdLst>
   <p:sldIdLst>
-    <p:sldId id="256" r:id="rId2"/>
-    <p:sldId id="257" r:id="rId3"/>
-    <p:sldId id="258" r:id="rId4"/>
-    <p:sldId id="259" r:id="rId5"/>
-    <p:sldId id="260" r:id="rId6"/>
-    <p:sldId id="261" r:id="rId7"/>
-    <p:sldId id="262" r:id="rId8"/>
-    <p:sldId id="263" r:id="rId9"/>
-    <p:sldId id="264" r:id="rId10"/>
-    <p:sldId id="267" r:id="rId11"/>
-    <p:sldId id="265" r:id="rId12"/>
-    <p:sldId id="266" r:id="rId13"/>
+    <p:sldId id="256" r:id="rId8"/>
+    <p:sldId id="257" r:id="rId9"/>
+    <p:sldId id="258" r:id="rId10"/>
+    <p:sldId id="259" r:id="rId11"/>
+    <p:sldId id="260" r:id="rId12"/>
+    <p:sldId id="261" r:id="rId13"/>
+    <p:sldId id="262" r:id="rId14"/>
+    <p:sldId id="263" r:id="rId15"/>
+    <p:sldId id="264" r:id="rId16"/>
+    <p:sldId id="265" r:id="rId17"/>
+    <p:sldId id="266" r:id="rId18"/>
+    <p:sldId id="267" r:id="rId19"/>
   </p:sldIdLst>
   <p:sldSz cx="13004800" cy="9753600"/>
   <p:notesSz cx="6858000" cy="9144000"/>
@@ -39,7 +39,7 @@
       <a:buFontTx/>
       <a:buNone/>
       <a:tabLst/>
-      <a:defRPr kumimoji="0" sz="1800" b="0" i="0" u="none" strike="noStrike" cap="none" spc="0" normalizeH="0" baseline="0">
+      <a:defRPr b="0" baseline="0" cap="none" i="0" spc="0" strike="noStrike" sz="1800" u="none" kumimoji="0" normalizeH="0">
         <a:ln>
           <a:noFill/>
         </a:ln>
@@ -65,7 +65,7 @@
       <a:buFontTx/>
       <a:buNone/>
       <a:tabLst/>
-      <a:defRPr kumimoji="0" sz="2400" b="1" i="0" u="none" strike="noStrike" cap="none" spc="0" normalizeH="0" baseline="0">
+      <a:defRPr b="0" baseline="0" cap="none" i="0" spc="0" strike="noStrike" sz="2400" u="none" kumimoji="0" normalizeH="0">
         <a:ln>
           <a:noFill/>
         </a:ln>
@@ -74,13 +74,13 @@
         </a:solidFill>
         <a:effectLst/>
         <a:uFillTx/>
-        <a:latin typeface="Helvetica Neue"/>
-        <a:ea typeface="Helvetica Neue"/>
-        <a:cs typeface="Helvetica Neue"/>
-        <a:sym typeface="Helvetica Neue"/>
+        <a:latin typeface="Helvetica Neue Medium"/>
+        <a:ea typeface="Helvetica Neue Medium"/>
+        <a:cs typeface="Helvetica Neue Medium"/>
+        <a:sym typeface="Helvetica Neue Medium"/>
       </a:defRPr>
     </a:lvl1pPr>
-    <a:lvl2pPr marL="0" marR="0" indent="228600" algn="ctr" defTabSz="584200" rtl="0" fontAlgn="auto" latinLnBrk="0" hangingPunct="0">
+    <a:lvl2pPr marL="0" marR="0" indent="0" algn="ctr" defTabSz="584200" rtl="0" fontAlgn="auto" latinLnBrk="0" hangingPunct="0">
       <a:lnSpc>
         <a:spcPct val="100000"/>
       </a:lnSpc>
@@ -95,7 +95,7 @@
       <a:buFontTx/>
       <a:buNone/>
       <a:tabLst/>
-      <a:defRPr kumimoji="0" sz="2400" b="1" i="0" u="none" strike="noStrike" cap="none" spc="0" normalizeH="0" baseline="0">
+      <a:defRPr b="0" baseline="0" cap="none" i="0" spc="0" strike="noStrike" sz="2400" u="none" kumimoji="0" normalizeH="0">
         <a:ln>
           <a:noFill/>
         </a:ln>
@@ -104,13 +104,13 @@
         </a:solidFill>
         <a:effectLst/>
         <a:uFillTx/>
-        <a:latin typeface="Helvetica Neue"/>
-        <a:ea typeface="Helvetica Neue"/>
-        <a:cs typeface="Helvetica Neue"/>
-        <a:sym typeface="Helvetica Neue"/>
+        <a:latin typeface="Helvetica Neue Medium"/>
+        <a:ea typeface="Helvetica Neue Medium"/>
+        <a:cs typeface="Helvetica Neue Medium"/>
+        <a:sym typeface="Helvetica Neue Medium"/>
       </a:defRPr>
     </a:lvl2pPr>
-    <a:lvl3pPr marL="0" marR="0" indent="457200" algn="ctr" defTabSz="584200" rtl="0" fontAlgn="auto" latinLnBrk="0" hangingPunct="0">
+    <a:lvl3pPr marL="0" marR="0" indent="0" algn="ctr" defTabSz="584200" rtl="0" fontAlgn="auto" latinLnBrk="0" hangingPunct="0">
       <a:lnSpc>
         <a:spcPct val="100000"/>
       </a:lnSpc>
@@ -125,7 +125,7 @@
       <a:buFontTx/>
       <a:buNone/>
       <a:tabLst/>
-      <a:defRPr kumimoji="0" sz="2400" b="1" i="0" u="none" strike="noStrike" cap="none" spc="0" normalizeH="0" baseline="0">
+      <a:defRPr b="0" baseline="0" cap="none" i="0" spc="0" strike="noStrike" sz="2400" u="none" kumimoji="0" normalizeH="0">
         <a:ln>
           <a:noFill/>
         </a:ln>
@@ -134,13 +134,13 @@
         </a:solidFill>
         <a:effectLst/>
         <a:uFillTx/>
-        <a:latin typeface="Helvetica Neue"/>
-        <a:ea typeface="Helvetica Neue"/>
-        <a:cs typeface="Helvetica Neue"/>
-        <a:sym typeface="Helvetica Neue"/>
+        <a:latin typeface="Helvetica Neue Medium"/>
+        <a:ea typeface="Helvetica Neue Medium"/>
+        <a:cs typeface="Helvetica Neue Medium"/>
+        <a:sym typeface="Helvetica Neue Medium"/>
       </a:defRPr>
     </a:lvl3pPr>
-    <a:lvl4pPr marL="0" marR="0" indent="685800" algn="ctr" defTabSz="584200" rtl="0" fontAlgn="auto" latinLnBrk="0" hangingPunct="0">
+    <a:lvl4pPr marL="0" marR="0" indent="0" algn="ctr" defTabSz="584200" rtl="0" fontAlgn="auto" latinLnBrk="0" hangingPunct="0">
       <a:lnSpc>
         <a:spcPct val="100000"/>
       </a:lnSpc>
@@ -155,7 +155,7 @@
       <a:buFontTx/>
       <a:buNone/>
       <a:tabLst/>
-      <a:defRPr kumimoji="0" sz="2400" b="1" i="0" u="none" strike="noStrike" cap="none" spc="0" normalizeH="0" baseline="0">
+      <a:defRPr b="0" baseline="0" cap="none" i="0" spc="0" strike="noStrike" sz="2400" u="none" kumimoji="0" normalizeH="0">
         <a:ln>
           <a:noFill/>
         </a:ln>
@@ -164,13 +164,13 @@
         </a:solidFill>
         <a:effectLst/>
         <a:uFillTx/>
-        <a:latin typeface="Helvetica Neue"/>
-        <a:ea typeface="Helvetica Neue"/>
-        <a:cs typeface="Helvetica Neue"/>
-        <a:sym typeface="Helvetica Neue"/>
+        <a:latin typeface="Helvetica Neue Medium"/>
+        <a:ea typeface="Helvetica Neue Medium"/>
+        <a:cs typeface="Helvetica Neue Medium"/>
+        <a:sym typeface="Helvetica Neue Medium"/>
       </a:defRPr>
     </a:lvl4pPr>
-    <a:lvl5pPr marL="0" marR="0" indent="914400" algn="ctr" defTabSz="584200" rtl="0" fontAlgn="auto" latinLnBrk="0" hangingPunct="0">
+    <a:lvl5pPr marL="0" marR="0" indent="0" algn="ctr" defTabSz="584200" rtl="0" fontAlgn="auto" latinLnBrk="0" hangingPunct="0">
       <a:lnSpc>
         <a:spcPct val="100000"/>
       </a:lnSpc>
@@ -185,7 +185,7 @@
       <a:buFontTx/>
       <a:buNone/>
       <a:tabLst/>
-      <a:defRPr kumimoji="0" sz="2400" b="1" i="0" u="none" strike="noStrike" cap="none" spc="0" normalizeH="0" baseline="0">
+      <a:defRPr b="0" baseline="0" cap="none" i="0" spc="0" strike="noStrike" sz="2400" u="none" kumimoji="0" normalizeH="0">
         <a:ln>
           <a:noFill/>
         </a:ln>
@@ -194,13 +194,13 @@
         </a:solidFill>
         <a:effectLst/>
         <a:uFillTx/>
-        <a:latin typeface="Helvetica Neue"/>
-        <a:ea typeface="Helvetica Neue"/>
-        <a:cs typeface="Helvetica Neue"/>
-        <a:sym typeface="Helvetica Neue"/>
+        <a:latin typeface="Helvetica Neue Medium"/>
+        <a:ea typeface="Helvetica Neue Medium"/>
+        <a:cs typeface="Helvetica Neue Medium"/>
+        <a:sym typeface="Helvetica Neue Medium"/>
       </a:defRPr>
     </a:lvl5pPr>
-    <a:lvl6pPr marL="0" marR="0" indent="1143000" algn="ctr" defTabSz="584200" rtl="0" fontAlgn="auto" latinLnBrk="0" hangingPunct="0">
+    <a:lvl6pPr marL="0" marR="0" indent="0" algn="ctr" defTabSz="584200" rtl="0" fontAlgn="auto" latinLnBrk="0" hangingPunct="0">
       <a:lnSpc>
         <a:spcPct val="100000"/>
       </a:lnSpc>
@@ -215,7 +215,7 @@
       <a:buFontTx/>
       <a:buNone/>
       <a:tabLst/>
-      <a:defRPr kumimoji="0" sz="2400" b="1" i="0" u="none" strike="noStrike" cap="none" spc="0" normalizeH="0" baseline="0">
+      <a:defRPr b="0" baseline="0" cap="none" i="0" spc="0" strike="noStrike" sz="2400" u="none" kumimoji="0" normalizeH="0">
         <a:ln>
           <a:noFill/>
         </a:ln>
@@ -224,13 +224,13 @@
         </a:solidFill>
         <a:effectLst/>
         <a:uFillTx/>
-        <a:latin typeface="Helvetica Neue"/>
-        <a:ea typeface="Helvetica Neue"/>
-        <a:cs typeface="Helvetica Neue"/>
-        <a:sym typeface="Helvetica Neue"/>
+        <a:latin typeface="Helvetica Neue Medium"/>
+        <a:ea typeface="Helvetica Neue Medium"/>
+        <a:cs typeface="Helvetica Neue Medium"/>
+        <a:sym typeface="Helvetica Neue Medium"/>
       </a:defRPr>
     </a:lvl6pPr>
-    <a:lvl7pPr marL="0" marR="0" indent="1371600" algn="ctr" defTabSz="584200" rtl="0" fontAlgn="auto" latinLnBrk="0" hangingPunct="0">
+    <a:lvl7pPr marL="0" marR="0" indent="0" algn="ctr" defTabSz="584200" rtl="0" fontAlgn="auto" latinLnBrk="0" hangingPunct="0">
       <a:lnSpc>
         <a:spcPct val="100000"/>
       </a:lnSpc>
@@ -245,7 +245,7 @@
       <a:buFontTx/>
       <a:buNone/>
       <a:tabLst/>
-      <a:defRPr kumimoji="0" sz="2400" b="1" i="0" u="none" strike="noStrike" cap="none" spc="0" normalizeH="0" baseline="0">
+      <a:defRPr b="0" baseline="0" cap="none" i="0" spc="0" strike="noStrike" sz="2400" u="none" kumimoji="0" normalizeH="0">
         <a:ln>
           <a:noFill/>
         </a:ln>
@@ -254,13 +254,13 @@
         </a:solidFill>
         <a:effectLst/>
         <a:uFillTx/>
-        <a:latin typeface="Helvetica Neue"/>
-        <a:ea typeface="Helvetica Neue"/>
-        <a:cs typeface="Helvetica Neue"/>
-        <a:sym typeface="Helvetica Neue"/>
+        <a:latin typeface="Helvetica Neue Medium"/>
+        <a:ea typeface="Helvetica Neue Medium"/>
+        <a:cs typeface="Helvetica Neue Medium"/>
+        <a:sym typeface="Helvetica Neue Medium"/>
       </a:defRPr>
     </a:lvl7pPr>
-    <a:lvl8pPr marL="0" marR="0" indent="1600200" algn="ctr" defTabSz="584200" rtl="0" fontAlgn="auto" latinLnBrk="0" hangingPunct="0">
+    <a:lvl8pPr marL="0" marR="0" indent="0" algn="ctr" defTabSz="584200" rtl="0" fontAlgn="auto" latinLnBrk="0" hangingPunct="0">
       <a:lnSpc>
         <a:spcPct val="100000"/>
       </a:lnSpc>
@@ -275,7 +275,7 @@
       <a:buFontTx/>
       <a:buNone/>
       <a:tabLst/>
-      <a:defRPr kumimoji="0" sz="2400" b="1" i="0" u="none" strike="noStrike" cap="none" spc="0" normalizeH="0" baseline="0">
+      <a:defRPr b="0" baseline="0" cap="none" i="0" spc="0" strike="noStrike" sz="2400" u="none" kumimoji="0" normalizeH="0">
         <a:ln>
           <a:noFill/>
         </a:ln>
@@ -284,13 +284,13 @@
         </a:solidFill>
         <a:effectLst/>
         <a:uFillTx/>
-        <a:latin typeface="Helvetica Neue"/>
-        <a:ea typeface="Helvetica Neue"/>
-        <a:cs typeface="Helvetica Neue"/>
-        <a:sym typeface="Helvetica Neue"/>
+        <a:latin typeface="Helvetica Neue Medium"/>
+        <a:ea typeface="Helvetica Neue Medium"/>
+        <a:cs typeface="Helvetica Neue Medium"/>
+        <a:sym typeface="Helvetica Neue Medium"/>
       </a:defRPr>
     </a:lvl8pPr>
-    <a:lvl9pPr marL="0" marR="0" indent="1828800" algn="ctr" defTabSz="584200" rtl="0" fontAlgn="auto" latinLnBrk="0" hangingPunct="0">
+    <a:lvl9pPr marL="0" marR="0" indent="0" algn="ctr" defTabSz="584200" rtl="0" fontAlgn="auto" latinLnBrk="0" hangingPunct="0">
       <a:lnSpc>
         <a:spcPct val="100000"/>
       </a:lnSpc>
@@ -305,7 +305,7 @@
       <a:buFontTx/>
       <a:buNone/>
       <a:tabLst/>
-      <a:defRPr kumimoji="0" sz="2400" b="1" i="0" u="none" strike="noStrike" cap="none" spc="0" normalizeH="0" baseline="0">
+      <a:defRPr b="0" baseline="0" cap="none" i="0" spc="0" strike="noStrike" sz="2400" u="none" kumimoji="0" normalizeH="0">
         <a:ln>
           <a:noFill/>
         </a:ln>
@@ -314,24 +314,23 @@
         </a:solidFill>
         <a:effectLst/>
         <a:uFillTx/>
-        <a:latin typeface="Helvetica Neue"/>
-        <a:ea typeface="Helvetica Neue"/>
-        <a:cs typeface="Helvetica Neue"/>
-        <a:sym typeface="Helvetica Neue"/>
+        <a:latin typeface="Helvetica Neue Medium"/>
+        <a:ea typeface="Helvetica Neue Medium"/>
+        <a:cs typeface="Helvetica Neue Medium"/>
+        <a:sym typeface="Helvetica Neue Medium"/>
       </a:defRPr>
     </a:lvl9pPr>
   </p:defaultTextStyle>
 </p:presentation>
 </file>
 
+<file path=ppt/commentAuthors.xml><?xml version="1.0" encoding="utf-8"?>
+<p:cmAuthorLst xmlns:a="http://schemas.openxmlformats.org/drawingml/2006/main" xmlns:r="http://schemas.openxmlformats.org/officeDocument/2006/relationships" xmlns:p="http://schemas.openxmlformats.org/presentationml/2006/main"/>
+</file>
+
 <file path=ppt/notesMasters/notesMaster1.xml><?xml version="1.0" encoding="utf-8"?>
 <p:notesMaster xmlns:a="http://schemas.openxmlformats.org/drawingml/2006/main" xmlns:r="http://schemas.openxmlformats.org/officeDocument/2006/relationships" xmlns:p="http://schemas.openxmlformats.org/presentationml/2006/main">
   <p:cSld>
-    <p:bg>
-      <p:bgRef idx="1001">
-        <a:schemeClr val="bg1"/>
-      </p:bgRef>
-    </p:bg>
     <p:spTree>
       <p:nvGrpSpPr>
         <p:cNvPr id="1" name=""/>
@@ -349,9 +348,7 @@
       <p:sp>
         <p:nvSpPr>
           <p:cNvPr id="116" name="Shape 116"/>
-          <p:cNvSpPr>
-            <a:spLocks noGrp="1" noRot="1" noChangeAspect="1"/>
-          </p:cNvSpPr>
+          <p:cNvSpPr/>
           <p:nvPr>
             <p:ph type="sldImg"/>
           </p:nvPr>
@@ -369,16 +366,14 @@
           <a:bodyPr/>
           <a:lstStyle/>
           <a:p>
-            <a:endParaRPr/>
+            <a:pPr/>
           </a:p>
         </p:txBody>
       </p:sp>
       <p:sp>
         <p:nvSpPr>
           <p:cNvPr id="117" name="Shape 117"/>
-          <p:cNvSpPr>
-            <a:spLocks noGrp="1"/>
-          </p:cNvSpPr>
+          <p:cNvSpPr/>
           <p:nvPr>
             <p:ph type="body" sz="quarter" idx="1"/>
           </p:nvPr>
@@ -396,7 +391,7 @@
           <a:bodyPr/>
           <a:lstStyle/>
           <a:p>
-            <a:endParaRPr/>
+            <a:pPr/>
           </a:p>
         </p:txBody>
       </p:sp>
@@ -409,9 +404,9 @@
         <a:spcPct val="117999"/>
       </a:lnSpc>
       <a:defRPr sz="2200">
-        <a:latin typeface="Helvetica Neue"/>
-        <a:ea typeface="Helvetica Neue"/>
-        <a:cs typeface="Helvetica Neue"/>
+        <a:latin typeface="+mn-lt"/>
+        <a:ea typeface="+mn-ea"/>
+        <a:cs typeface="+mn-cs"/>
         <a:sym typeface="Helvetica Neue"/>
       </a:defRPr>
     </a:lvl1pPr>
@@ -420,9 +415,9 @@
         <a:spcPct val="117999"/>
       </a:lnSpc>
       <a:defRPr sz="2200">
-        <a:latin typeface="Helvetica Neue"/>
-        <a:ea typeface="Helvetica Neue"/>
-        <a:cs typeface="Helvetica Neue"/>
+        <a:latin typeface="+mn-lt"/>
+        <a:ea typeface="+mn-ea"/>
+        <a:cs typeface="+mn-cs"/>
         <a:sym typeface="Helvetica Neue"/>
       </a:defRPr>
     </a:lvl2pPr>
@@ -431,9 +426,9 @@
         <a:spcPct val="117999"/>
       </a:lnSpc>
       <a:defRPr sz="2200">
-        <a:latin typeface="Helvetica Neue"/>
-        <a:ea typeface="Helvetica Neue"/>
-        <a:cs typeface="Helvetica Neue"/>
+        <a:latin typeface="+mn-lt"/>
+        <a:ea typeface="+mn-ea"/>
+        <a:cs typeface="+mn-cs"/>
         <a:sym typeface="Helvetica Neue"/>
       </a:defRPr>
     </a:lvl3pPr>
@@ -442,9 +437,9 @@
         <a:spcPct val="117999"/>
       </a:lnSpc>
       <a:defRPr sz="2200">
-        <a:latin typeface="Helvetica Neue"/>
-        <a:ea typeface="Helvetica Neue"/>
-        <a:cs typeface="Helvetica Neue"/>
+        <a:latin typeface="+mn-lt"/>
+        <a:ea typeface="+mn-ea"/>
+        <a:cs typeface="+mn-cs"/>
         <a:sym typeface="Helvetica Neue"/>
       </a:defRPr>
     </a:lvl4pPr>
@@ -453,9 +448,9 @@
         <a:spcPct val="117999"/>
       </a:lnSpc>
       <a:defRPr sz="2200">
-        <a:latin typeface="Helvetica Neue"/>
-        <a:ea typeface="Helvetica Neue"/>
-        <a:cs typeface="Helvetica Neue"/>
+        <a:latin typeface="+mn-lt"/>
+        <a:ea typeface="+mn-ea"/>
+        <a:cs typeface="+mn-cs"/>
         <a:sym typeface="Helvetica Neue"/>
       </a:defRPr>
     </a:lvl5pPr>
@@ -464,9 +459,9 @@
         <a:spcPct val="117999"/>
       </a:lnSpc>
       <a:defRPr sz="2200">
-        <a:latin typeface="Helvetica Neue"/>
-        <a:ea typeface="Helvetica Neue"/>
-        <a:cs typeface="Helvetica Neue"/>
+        <a:latin typeface="+mn-lt"/>
+        <a:ea typeface="+mn-ea"/>
+        <a:cs typeface="+mn-cs"/>
         <a:sym typeface="Helvetica Neue"/>
       </a:defRPr>
     </a:lvl6pPr>
@@ -475,9 +470,9 @@
         <a:spcPct val="117999"/>
       </a:lnSpc>
       <a:defRPr sz="2200">
-        <a:latin typeface="Helvetica Neue"/>
-        <a:ea typeface="Helvetica Neue"/>
-        <a:cs typeface="Helvetica Neue"/>
+        <a:latin typeface="+mn-lt"/>
+        <a:ea typeface="+mn-ea"/>
+        <a:cs typeface="+mn-cs"/>
         <a:sym typeface="Helvetica Neue"/>
       </a:defRPr>
     </a:lvl7pPr>
@@ -486,9 +481,9 @@
         <a:spcPct val="117999"/>
       </a:lnSpc>
       <a:defRPr sz="2200">
-        <a:latin typeface="Helvetica Neue"/>
-        <a:ea typeface="Helvetica Neue"/>
-        <a:cs typeface="Helvetica Neue"/>
+        <a:latin typeface="+mn-lt"/>
+        <a:ea typeface="+mn-ea"/>
+        <a:cs typeface="+mn-cs"/>
         <a:sym typeface="Helvetica Neue"/>
       </a:defRPr>
     </a:lvl8pPr>
@@ -497,9 +492,9 @@
         <a:spcPct val="117999"/>
       </a:lnSpc>
       <a:defRPr sz="2200">
-        <a:latin typeface="Helvetica Neue"/>
-        <a:ea typeface="Helvetica Neue"/>
-        <a:cs typeface="Helvetica Neue"/>
+        <a:latin typeface="+mn-lt"/>
+        <a:ea typeface="+mn-ea"/>
+        <a:cs typeface="+mn-cs"/>
         <a:sym typeface="Helvetica Neue"/>
       </a:defRPr>
     </a:lvl9pPr>
@@ -508,7 +503,7 @@
 </file>
 
 <file path=ppt/slideLayouts/slideLayout1.xml><?xml version="1.0" encoding="utf-8"?>
-<p:sldLayout xmlns:a="http://schemas.openxmlformats.org/drawingml/2006/main" xmlns:r="http://schemas.openxmlformats.org/officeDocument/2006/relationships" xmlns:p="http://schemas.openxmlformats.org/presentationml/2006/main" type="title">
+<p:sldLayout xmlns:a="http://schemas.openxmlformats.org/drawingml/2006/main" xmlns:r="http://schemas.openxmlformats.org/officeDocument/2006/relationships" xmlns:p="http://schemas.openxmlformats.org/presentationml/2006/main" type="title" showMasterSp="1" showMasterPhAnim="1">
   <p:cSld name="Titolo e sottotitolo">
     <p:spTree>
       <p:nvGrpSpPr>
@@ -527,9 +522,7 @@
       <p:sp>
         <p:nvSpPr>
           <p:cNvPr id="11" name="Titolo Testo"/>
-          <p:cNvSpPr txBox="1">
-            <a:spLocks noGrp="1"/>
-          </p:cNvSpPr>
+          <p:cNvSpPr txBox="1"/>
           <p:nvPr>
             <p:ph type="title"/>
           </p:nvPr>
@@ -547,6 +540,7 @@
           <a:bodyPr anchor="b"/>
           <a:lstStyle/>
           <a:p>
+            <a:pPr/>
             <a:r>
               <a:t>Titolo Testo</a:t>
             </a:r>
@@ -556,9 +550,7 @@
       <p:sp>
         <p:nvSpPr>
           <p:cNvPr id="12" name="Corpo livello uno…"/>
-          <p:cNvSpPr txBox="1">
-            <a:spLocks noGrp="1"/>
-          </p:cNvSpPr>
+          <p:cNvSpPr txBox="1"/>
           <p:nvPr>
             <p:ph type="body" sz="quarter" idx="1"/>
           </p:nvPr>
@@ -617,6 +609,7 @@
             </a:lvl5pPr>
           </a:lstStyle>
           <a:p>
+            <a:pPr/>
             <a:r>
               <a:t>Corpo livello uno</a:t>
             </a:r>
@@ -650,9 +643,7 @@
       <p:sp>
         <p:nvSpPr>
           <p:cNvPr id="13" name="Numero diapositiva"/>
-          <p:cNvSpPr txBox="1">
-            <a:spLocks noGrp="1"/>
-          </p:cNvSpPr>
+          <p:cNvSpPr txBox="1"/>
           <p:nvPr>
             <p:ph type="sldNum" sz="quarter" idx="2"/>
           </p:nvPr>
@@ -675,10 +666,8 @@
             </a:lvl1pPr>
           </a:lstStyle>
           <a:p>
-            <a:fld id="{86CB4B4D-7CA3-9044-876B-883B54F8677D}" type="slidenum">
-              <a:t>‹#›</a:t>
-            </a:fld>
-            <a:endParaRPr/>
+            <a:pPr/>
+            <a:fld id="{86CB4B4D-7CA3-9044-876B-883B54F8677D}" type="slidenum"/>
           </a:p>
         </p:txBody>
       </p:sp>
@@ -687,12 +676,12 @@
   <p:clrMapOvr>
     <a:masterClrMapping/>
   </p:clrMapOvr>
-  <p:transition spd="med"/>
+  <p:transition xmlns:p14="http://schemas.microsoft.com/office/powerpoint/2010/main" spd="med" advClick="1"/>
 </p:sldLayout>
 </file>
 
 <file path=ppt/slideLayouts/slideLayout10.xml><?xml version="1.0" encoding="utf-8"?>
-<p:sldLayout xmlns:a="http://schemas.openxmlformats.org/drawingml/2006/main" xmlns:r="http://schemas.openxmlformats.org/officeDocument/2006/relationships" xmlns:p="http://schemas.openxmlformats.org/presentationml/2006/main" type="tx">
+<p:sldLayout xmlns:a="http://schemas.openxmlformats.org/drawingml/2006/main" xmlns:r="http://schemas.openxmlformats.org/officeDocument/2006/relationships" xmlns:p="http://schemas.openxmlformats.org/presentationml/2006/main" type="tx" showMasterSp="1" showMasterPhAnim="1">
   <p:cSld name="Citazione">
     <p:spTree>
       <p:nvGrpSpPr>
@@ -710,12 +699,10 @@
       </p:grpSpPr>
       <p:sp>
         <p:nvSpPr>
-          <p:cNvPr id="93" name="–Giovanni Mela"/>
-          <p:cNvSpPr txBox="1">
-            <a:spLocks noGrp="1"/>
-          </p:cNvSpPr>
+          <p:cNvPr id="93" name="Corpo livello uno…"/>
+          <p:cNvSpPr txBox="1"/>
           <p:nvPr>
-            <p:ph type="body" sz="quarter" idx="13"/>
+            <p:ph type="body" sz="quarter" idx="1"/>
           </p:nvPr>
         </p:nvSpPr>
         <p:spPr>
@@ -728,9 +715,7 @@
           </a:prstGeom>
         </p:spPr>
         <p:txBody>
-          <a:bodyPr anchor="t">
-            <a:spAutoFit/>
-          </a:bodyPr>
+          <a:bodyPr anchor="t"/>
           <a:lstStyle>
             <a:lvl1pPr marL="0" indent="0" algn="ctr">
               <a:spcBef>
@@ -738,12 +723,61 @@
               </a:spcBef>
               <a:buSzTx/>
               <a:buNone/>
-              <a:defRPr sz="2400" i="1"/>
+              <a:defRPr i="1" sz="2400"/>
             </a:lvl1pPr>
+            <a:lvl2pPr marL="777875" indent="-333375" algn="ctr">
+              <a:spcBef>
+                <a:spcPts val="0"/>
+              </a:spcBef>
+              <a:defRPr i="1" sz="2400"/>
+            </a:lvl2pPr>
+            <a:lvl3pPr marL="1222375" indent="-333375" algn="ctr">
+              <a:spcBef>
+                <a:spcPts val="0"/>
+              </a:spcBef>
+              <a:defRPr i="1" sz="2400"/>
+            </a:lvl3pPr>
+            <a:lvl4pPr marL="1666875" indent="-333375" algn="ctr">
+              <a:spcBef>
+                <a:spcPts val="0"/>
+              </a:spcBef>
+              <a:defRPr i="1" sz="2400"/>
+            </a:lvl4pPr>
+            <a:lvl5pPr marL="2111375" indent="-333375" algn="ctr">
+              <a:spcBef>
+                <a:spcPts val="0"/>
+              </a:spcBef>
+              <a:defRPr i="1" sz="2400"/>
+            </a:lvl5pPr>
           </a:lstStyle>
           <a:p>
-            <a:r>
-              <a:t>–Giovanni Mela</a:t>
+            <a:pPr/>
+            <a:r>
+              <a:t>Corpo livello uno</a:t>
+            </a:r>
+          </a:p>
+          <a:p>
+            <a:pPr lvl="1"/>
+            <a:r>
+              <a:t>Corpo livello due</a:t>
+            </a:r>
+          </a:p>
+          <a:p>
+            <a:pPr lvl="2"/>
+            <a:r>
+              <a:t>Corpo livello tre</a:t>
+            </a:r>
+          </a:p>
+          <a:p>
+            <a:pPr lvl="3"/>
+            <a:r>
+              <a:t>Corpo livello quattro</a:t>
+            </a:r>
+          </a:p>
+          <a:p>
+            <a:pPr lvl="4"/>
+            <a:r>
+              <a:t>Corpo livello cinque</a:t>
             </a:r>
           </a:p>
         </p:txBody>
@@ -751,54 +785,44 @@
       <p:sp>
         <p:nvSpPr>
           <p:cNvPr id="94" name="“Inserisci qui una citazione”."/>
-          <p:cNvSpPr txBox="1">
-            <a:spLocks noGrp="1"/>
-          </p:cNvSpPr>
+          <p:cNvSpPr txBox="1"/>
           <p:nvPr>
-            <p:ph type="body" sz="quarter" idx="14"/>
+            <p:ph type="body" sz="quarter" idx="13"/>
           </p:nvPr>
         </p:nvSpPr>
         <p:spPr>
           <a:xfrm>
             <a:off x="1270000" y="4267112"/>
-            <a:ext cx="10464800" cy="609776"/>
+            <a:ext cx="10464800" cy="609777"/>
           </a:xfrm>
           <a:prstGeom prst="rect">
             <a:avLst/>
           </a:prstGeom>
         </p:spPr>
         <p:txBody>
-          <a:bodyPr>
-            <a:spAutoFit/>
-          </a:bodyPr>
-          <a:lstStyle>
-            <a:lvl1pPr marL="0" indent="0" algn="ctr">
+          <a:bodyPr/>
+          <a:lstStyle/>
+          <a:p>
+            <a:pPr marL="0" indent="0" algn="ctr">
               <a:spcBef>
                 <a:spcPts val="0"/>
               </a:spcBef>
               <a:buSzTx/>
               <a:buNone/>
               <a:defRPr sz="3400">
-                <a:latin typeface="+mn-lt"/>
-                <a:ea typeface="+mn-ea"/>
-                <a:cs typeface="+mn-cs"/>
+                <a:latin typeface="Helvetica Neue Medium"/>
+                <a:ea typeface="Helvetica Neue Medium"/>
+                <a:cs typeface="Helvetica Neue Medium"/>
                 <a:sym typeface="Helvetica Neue Medium"/>
               </a:defRPr>
-            </a:lvl1pPr>
-          </a:lstStyle>
-          <a:p>
-            <a:r>
-              <a:t>“Inserisci qui una citazione”. </a:t>
-            </a:r>
+            </a:pPr>
           </a:p>
         </p:txBody>
       </p:sp>
       <p:sp>
         <p:nvSpPr>
           <p:cNvPr id="95" name="Numero diapositiva"/>
-          <p:cNvSpPr txBox="1">
-            <a:spLocks noGrp="1"/>
-          </p:cNvSpPr>
+          <p:cNvSpPr txBox="1"/>
           <p:nvPr>
             <p:ph type="sldNum" sz="quarter" idx="2"/>
           </p:nvPr>
@@ -812,10 +836,8 @@
           <a:bodyPr/>
           <a:lstStyle/>
           <a:p>
-            <a:fld id="{86CB4B4D-7CA3-9044-876B-883B54F8677D}" type="slidenum">
-              <a:t>‹#›</a:t>
-            </a:fld>
-            <a:endParaRPr/>
+            <a:pPr/>
+            <a:fld id="{86CB4B4D-7CA3-9044-876B-883B54F8677D}" type="slidenum"/>
           </a:p>
         </p:txBody>
       </p:sp>
@@ -824,12 +846,12 @@
   <p:clrMapOvr>
     <a:masterClrMapping/>
   </p:clrMapOvr>
-  <p:transition spd="med"/>
+  <p:transition xmlns:p14="http://schemas.microsoft.com/office/powerpoint/2010/main" spd="med" advClick="1"/>
 </p:sldLayout>
 </file>
 
 <file path=ppt/slideLayouts/slideLayout11.xml><?xml version="1.0" encoding="utf-8"?>
-<p:sldLayout xmlns:a="http://schemas.openxmlformats.org/drawingml/2006/main" xmlns:r="http://schemas.openxmlformats.org/officeDocument/2006/relationships" xmlns:p="http://schemas.openxmlformats.org/presentationml/2006/main" type="tx">
+<p:sldLayout xmlns:a="http://schemas.openxmlformats.org/drawingml/2006/main" xmlns:r="http://schemas.openxmlformats.org/officeDocument/2006/relationships" xmlns:p="http://schemas.openxmlformats.org/presentationml/2006/main" type="tx" showMasterSp="1" showMasterPhAnim="1">
   <p:cSld name="Foto">
     <p:spTree>
       <p:nvGrpSpPr>
@@ -848,9 +870,7 @@
       <p:sp>
         <p:nvSpPr>
           <p:cNvPr id="102" name="Immagine"/>
-          <p:cNvSpPr>
-            <a:spLocks noGrp="1"/>
-          </p:cNvSpPr>
+          <p:cNvSpPr/>
           <p:nvPr>
             <p:ph type="pic" idx="13"/>
           </p:nvPr>
@@ -870,16 +890,14 @@
           </a:bodyPr>
           <a:lstStyle/>
           <a:p>
-            <a:endParaRPr/>
+            <a:pPr/>
           </a:p>
         </p:txBody>
       </p:sp>
       <p:sp>
         <p:nvSpPr>
           <p:cNvPr id="103" name="Numero diapositiva"/>
-          <p:cNvSpPr txBox="1">
-            <a:spLocks noGrp="1"/>
-          </p:cNvSpPr>
+          <p:cNvSpPr txBox="1"/>
           <p:nvPr>
             <p:ph type="sldNum" sz="quarter" idx="2"/>
           </p:nvPr>
@@ -893,10 +911,8 @@
           <a:bodyPr/>
           <a:lstStyle/>
           <a:p>
-            <a:fld id="{86CB4B4D-7CA3-9044-876B-883B54F8677D}" type="slidenum">
-              <a:t>‹#›</a:t>
-            </a:fld>
-            <a:endParaRPr/>
+            <a:pPr/>
+            <a:fld id="{86CB4B4D-7CA3-9044-876B-883B54F8677D}" type="slidenum"/>
           </a:p>
         </p:txBody>
       </p:sp>
@@ -905,12 +921,12 @@
   <p:clrMapOvr>
     <a:masterClrMapping/>
   </p:clrMapOvr>
-  <p:transition spd="med"/>
+  <p:transition xmlns:p14="http://schemas.microsoft.com/office/powerpoint/2010/main" spd="med" advClick="1"/>
 </p:sldLayout>
 </file>
 
 <file path=ppt/slideLayouts/slideLayout12.xml><?xml version="1.0" encoding="utf-8"?>
-<p:sldLayout xmlns:a="http://schemas.openxmlformats.org/drawingml/2006/main" xmlns:r="http://schemas.openxmlformats.org/officeDocument/2006/relationships" xmlns:p="http://schemas.openxmlformats.org/presentationml/2006/main" type="tx">
+<p:sldLayout xmlns:a="http://schemas.openxmlformats.org/drawingml/2006/main" xmlns:r="http://schemas.openxmlformats.org/officeDocument/2006/relationships" xmlns:p="http://schemas.openxmlformats.org/presentationml/2006/main" type="tx" showMasterSp="1" showMasterPhAnim="1">
   <p:cSld name="Vuoto">
     <p:spTree>
       <p:nvGrpSpPr>
@@ -929,9 +945,7 @@
       <p:sp>
         <p:nvSpPr>
           <p:cNvPr id="110" name="Numero diapositiva"/>
-          <p:cNvSpPr txBox="1">
-            <a:spLocks noGrp="1"/>
-          </p:cNvSpPr>
+          <p:cNvSpPr txBox="1"/>
           <p:nvPr>
             <p:ph type="sldNum" sz="quarter" idx="2"/>
           </p:nvPr>
@@ -945,10 +959,8 @@
           <a:bodyPr/>
           <a:lstStyle/>
           <a:p>
-            <a:fld id="{86CB4B4D-7CA3-9044-876B-883B54F8677D}" type="slidenum">
-              <a:t>‹#›</a:t>
-            </a:fld>
-            <a:endParaRPr/>
+            <a:pPr/>
+            <a:fld id="{86CB4B4D-7CA3-9044-876B-883B54F8677D}" type="slidenum"/>
           </a:p>
         </p:txBody>
       </p:sp>
@@ -957,12 +969,12 @@
   <p:clrMapOvr>
     <a:masterClrMapping/>
   </p:clrMapOvr>
-  <p:transition spd="med"/>
+  <p:transition xmlns:p14="http://schemas.microsoft.com/office/powerpoint/2010/main" spd="med" advClick="1"/>
 </p:sldLayout>
 </file>
 
 <file path=ppt/slideLayouts/slideLayout2.xml><?xml version="1.0" encoding="utf-8"?>
-<p:sldLayout xmlns:a="http://schemas.openxmlformats.org/drawingml/2006/main" xmlns:r="http://schemas.openxmlformats.org/officeDocument/2006/relationships" xmlns:p="http://schemas.openxmlformats.org/presentationml/2006/main" type="tx">
+<p:sldLayout xmlns:a="http://schemas.openxmlformats.org/drawingml/2006/main" xmlns:r="http://schemas.openxmlformats.org/officeDocument/2006/relationships" xmlns:p="http://schemas.openxmlformats.org/presentationml/2006/main" type="tx" showMasterSp="1" showMasterPhAnim="1">
   <p:cSld name="Foto - Orizzontale">
     <p:spTree>
       <p:nvGrpSpPr>
@@ -981,17 +993,15 @@
       <p:sp>
         <p:nvSpPr>
           <p:cNvPr id="20" name="Immagine"/>
-          <p:cNvSpPr>
-            <a:spLocks noGrp="1"/>
-          </p:cNvSpPr>
+          <p:cNvSpPr/>
           <p:nvPr>
             <p:ph type="pic" idx="13"/>
           </p:nvPr>
         </p:nvSpPr>
         <p:spPr>
           <a:xfrm>
-            <a:off x="1622088" y="289099"/>
-            <a:ext cx="9753603" cy="6505789"/>
+            <a:off x="1622088" y="289098"/>
+            <a:ext cx="9753604" cy="6505790"/>
           </a:xfrm>
           <a:prstGeom prst="rect">
             <a:avLst/>
@@ -1003,16 +1013,14 @@
           </a:bodyPr>
           <a:lstStyle/>
           <a:p>
-            <a:endParaRPr/>
+            <a:pPr/>
           </a:p>
         </p:txBody>
       </p:sp>
       <p:sp>
         <p:nvSpPr>
           <p:cNvPr id="21" name="Titolo Testo"/>
-          <p:cNvSpPr txBox="1">
-            <a:spLocks noGrp="1"/>
-          </p:cNvSpPr>
+          <p:cNvSpPr txBox="1"/>
           <p:nvPr>
             <p:ph type="title"/>
           </p:nvPr>
@@ -1030,6 +1038,7 @@
           <a:bodyPr anchor="b"/>
           <a:lstStyle/>
           <a:p>
+            <a:pPr/>
             <a:r>
               <a:t>Titolo Testo</a:t>
             </a:r>
@@ -1039,9 +1048,7 @@
       <p:sp>
         <p:nvSpPr>
           <p:cNvPr id="22" name="Corpo livello uno…"/>
-          <p:cNvSpPr txBox="1">
-            <a:spLocks noGrp="1"/>
-          </p:cNvSpPr>
+          <p:cNvSpPr txBox="1"/>
           <p:nvPr>
             <p:ph type="body" sz="quarter" idx="1"/>
           </p:nvPr>
@@ -1100,6 +1107,7 @@
             </a:lvl5pPr>
           </a:lstStyle>
           <a:p>
+            <a:pPr/>
             <a:r>
               <a:t>Corpo livello uno</a:t>
             </a:r>
@@ -1133,9 +1141,7 @@
       <p:sp>
         <p:nvSpPr>
           <p:cNvPr id="23" name="Numero diapositiva"/>
-          <p:cNvSpPr txBox="1">
-            <a:spLocks noGrp="1"/>
-          </p:cNvSpPr>
+          <p:cNvSpPr txBox="1"/>
           <p:nvPr>
             <p:ph type="sldNum" sz="quarter" idx="2"/>
           </p:nvPr>
@@ -1149,10 +1155,8 @@
           <a:bodyPr/>
           <a:lstStyle/>
           <a:p>
-            <a:fld id="{86CB4B4D-7CA3-9044-876B-883B54F8677D}" type="slidenum">
-              <a:t>‹#›</a:t>
-            </a:fld>
-            <a:endParaRPr/>
+            <a:pPr/>
+            <a:fld id="{86CB4B4D-7CA3-9044-876B-883B54F8677D}" type="slidenum"/>
           </a:p>
         </p:txBody>
       </p:sp>
@@ -1161,12 +1165,12 @@
   <p:clrMapOvr>
     <a:masterClrMapping/>
   </p:clrMapOvr>
-  <p:transition spd="med"/>
+  <p:transition xmlns:p14="http://schemas.microsoft.com/office/powerpoint/2010/main" spd="med" advClick="1"/>
 </p:sldLayout>
 </file>
 
 <file path=ppt/slideLayouts/slideLayout3.xml><?xml version="1.0" encoding="utf-8"?>
-<p:sldLayout xmlns:a="http://schemas.openxmlformats.org/drawingml/2006/main" xmlns:r="http://schemas.openxmlformats.org/officeDocument/2006/relationships" xmlns:p="http://schemas.openxmlformats.org/presentationml/2006/main" type="tx">
+<p:sldLayout xmlns:a="http://schemas.openxmlformats.org/drawingml/2006/main" xmlns:r="http://schemas.openxmlformats.org/officeDocument/2006/relationships" xmlns:p="http://schemas.openxmlformats.org/presentationml/2006/main" type="tx" showMasterSp="1" showMasterPhAnim="1">
   <p:cSld name="Titolo - Centrato">
     <p:spTree>
       <p:nvGrpSpPr>
@@ -1185,9 +1189,7 @@
       <p:sp>
         <p:nvSpPr>
           <p:cNvPr id="30" name="Titolo Testo"/>
-          <p:cNvSpPr txBox="1">
-            <a:spLocks noGrp="1"/>
-          </p:cNvSpPr>
+          <p:cNvSpPr txBox="1"/>
           <p:nvPr>
             <p:ph type="title"/>
           </p:nvPr>
@@ -1205,6 +1207,7 @@
           <a:bodyPr/>
           <a:lstStyle/>
           <a:p>
+            <a:pPr/>
             <a:r>
               <a:t>Titolo Testo</a:t>
             </a:r>
@@ -1214,9 +1217,7 @@
       <p:sp>
         <p:nvSpPr>
           <p:cNvPr id="31" name="Numero diapositiva"/>
-          <p:cNvSpPr txBox="1">
-            <a:spLocks noGrp="1"/>
-          </p:cNvSpPr>
+          <p:cNvSpPr txBox="1"/>
           <p:nvPr>
             <p:ph type="sldNum" sz="quarter" idx="2"/>
           </p:nvPr>
@@ -1230,10 +1231,8 @@
           <a:bodyPr/>
           <a:lstStyle/>
           <a:p>
-            <a:fld id="{86CB4B4D-7CA3-9044-876B-883B54F8677D}" type="slidenum">
-              <a:t>‹#›</a:t>
-            </a:fld>
-            <a:endParaRPr/>
+            <a:pPr/>
+            <a:fld id="{86CB4B4D-7CA3-9044-876B-883B54F8677D}" type="slidenum"/>
           </a:p>
         </p:txBody>
       </p:sp>
@@ -1242,12 +1241,12 @@
   <p:clrMapOvr>
     <a:masterClrMapping/>
   </p:clrMapOvr>
-  <p:transition spd="med"/>
+  <p:transition xmlns:p14="http://schemas.microsoft.com/office/powerpoint/2010/main" spd="med" advClick="1"/>
 </p:sldLayout>
 </file>
 
 <file path=ppt/slideLayouts/slideLayout4.xml><?xml version="1.0" encoding="utf-8"?>
-<p:sldLayout xmlns:a="http://schemas.openxmlformats.org/drawingml/2006/main" xmlns:r="http://schemas.openxmlformats.org/officeDocument/2006/relationships" xmlns:p="http://schemas.openxmlformats.org/presentationml/2006/main" type="tx">
+<p:sldLayout xmlns:a="http://schemas.openxmlformats.org/drawingml/2006/main" xmlns:r="http://schemas.openxmlformats.org/officeDocument/2006/relationships" xmlns:p="http://schemas.openxmlformats.org/presentationml/2006/main" type="tx" showMasterSp="1" showMasterPhAnim="1">
   <p:cSld name="Foto - Verticale">
     <p:spTree>
       <p:nvGrpSpPr>
@@ -1266,17 +1265,15 @@
       <p:sp>
         <p:nvSpPr>
           <p:cNvPr id="38" name="Immagine"/>
-          <p:cNvSpPr>
-            <a:spLocks noGrp="1"/>
-          </p:cNvSpPr>
+          <p:cNvSpPr/>
           <p:nvPr>
             <p:ph type="pic" idx="13"/>
           </p:nvPr>
         </p:nvSpPr>
         <p:spPr>
           <a:xfrm>
-            <a:off x="2263775" y="613833"/>
-            <a:ext cx="12401550" cy="8267701"/>
+            <a:off x="2263775" y="613832"/>
+            <a:ext cx="12401550" cy="8267702"/>
           </a:xfrm>
           <a:prstGeom prst="rect">
             <a:avLst/>
@@ -1288,16 +1285,14 @@
           </a:bodyPr>
           <a:lstStyle/>
           <a:p>
-            <a:endParaRPr/>
+            <a:pPr/>
           </a:p>
         </p:txBody>
       </p:sp>
       <p:sp>
         <p:nvSpPr>
           <p:cNvPr id="39" name="Titolo Testo"/>
-          <p:cNvSpPr txBox="1">
-            <a:spLocks noGrp="1"/>
-          </p:cNvSpPr>
+          <p:cNvSpPr txBox="1"/>
           <p:nvPr>
             <p:ph type="title"/>
           </p:nvPr>
@@ -1319,6 +1314,7 @@
             </a:lvl1pPr>
           </a:lstStyle>
           <a:p>
+            <a:pPr/>
             <a:r>
               <a:t>Titolo Testo</a:t>
             </a:r>
@@ -1328,9 +1324,7 @@
       <p:sp>
         <p:nvSpPr>
           <p:cNvPr id="40" name="Corpo livello uno…"/>
-          <p:cNvSpPr txBox="1">
-            <a:spLocks noGrp="1"/>
-          </p:cNvSpPr>
+          <p:cNvSpPr txBox="1"/>
           <p:nvPr>
             <p:ph type="body" sz="quarter" idx="1"/>
           </p:nvPr>
@@ -1389,6 +1383,7 @@
             </a:lvl5pPr>
           </a:lstStyle>
           <a:p>
+            <a:pPr/>
             <a:r>
               <a:t>Corpo livello uno</a:t>
             </a:r>
@@ -1422,9 +1417,7 @@
       <p:sp>
         <p:nvSpPr>
           <p:cNvPr id="41" name="Numero diapositiva"/>
-          <p:cNvSpPr txBox="1">
-            <a:spLocks noGrp="1"/>
-          </p:cNvSpPr>
+          <p:cNvSpPr txBox="1"/>
           <p:nvPr>
             <p:ph type="sldNum" sz="quarter" idx="2"/>
           </p:nvPr>
@@ -1438,10 +1431,8 @@
           <a:bodyPr/>
           <a:lstStyle/>
           <a:p>
-            <a:fld id="{86CB4B4D-7CA3-9044-876B-883B54F8677D}" type="slidenum">
-              <a:t>‹#›</a:t>
-            </a:fld>
-            <a:endParaRPr/>
+            <a:pPr/>
+            <a:fld id="{86CB4B4D-7CA3-9044-876B-883B54F8677D}" type="slidenum"/>
           </a:p>
         </p:txBody>
       </p:sp>
@@ -1450,12 +1441,12 @@
   <p:clrMapOvr>
     <a:masterClrMapping/>
   </p:clrMapOvr>
-  <p:transition spd="med"/>
+  <p:transition xmlns:p14="http://schemas.microsoft.com/office/powerpoint/2010/main" spd="med" advClick="1"/>
 </p:sldLayout>
 </file>
 
 <file path=ppt/slideLayouts/slideLayout5.xml><?xml version="1.0" encoding="utf-8"?>
-<p:sldLayout xmlns:a="http://schemas.openxmlformats.org/drawingml/2006/main" xmlns:r="http://schemas.openxmlformats.org/officeDocument/2006/relationships" xmlns:p="http://schemas.openxmlformats.org/presentationml/2006/main" type="tx">
+<p:sldLayout xmlns:a="http://schemas.openxmlformats.org/drawingml/2006/main" xmlns:r="http://schemas.openxmlformats.org/officeDocument/2006/relationships" xmlns:p="http://schemas.openxmlformats.org/presentationml/2006/main" type="tx" showMasterSp="1" showMasterPhAnim="1">
   <p:cSld name="Titolo - In alto">
     <p:spTree>
       <p:nvGrpSpPr>
@@ -1474,9 +1465,7 @@
       <p:sp>
         <p:nvSpPr>
           <p:cNvPr id="48" name="Titolo Testo"/>
-          <p:cNvSpPr txBox="1">
-            <a:spLocks noGrp="1"/>
-          </p:cNvSpPr>
+          <p:cNvSpPr txBox="1"/>
           <p:nvPr>
             <p:ph type="title"/>
           </p:nvPr>
@@ -1490,6 +1479,7 @@
           <a:bodyPr/>
           <a:lstStyle/>
           <a:p>
+            <a:pPr/>
             <a:r>
               <a:t>Titolo Testo</a:t>
             </a:r>
@@ -1499,9 +1489,7 @@
       <p:sp>
         <p:nvSpPr>
           <p:cNvPr id="49" name="Numero diapositiva"/>
-          <p:cNvSpPr txBox="1">
-            <a:spLocks noGrp="1"/>
-          </p:cNvSpPr>
+          <p:cNvSpPr txBox="1"/>
           <p:nvPr>
             <p:ph type="sldNum" sz="quarter" idx="2"/>
           </p:nvPr>
@@ -1515,10 +1503,8 @@
           <a:bodyPr/>
           <a:lstStyle/>
           <a:p>
-            <a:fld id="{86CB4B4D-7CA3-9044-876B-883B54F8677D}" type="slidenum">
-              <a:t>‹#›</a:t>
-            </a:fld>
-            <a:endParaRPr/>
+            <a:pPr/>
+            <a:fld id="{86CB4B4D-7CA3-9044-876B-883B54F8677D}" type="slidenum"/>
           </a:p>
         </p:txBody>
       </p:sp>
@@ -1527,12 +1513,12 @@
   <p:clrMapOvr>
     <a:masterClrMapping/>
   </p:clrMapOvr>
-  <p:transition spd="med"/>
+  <p:transition xmlns:p14="http://schemas.microsoft.com/office/powerpoint/2010/main" spd="med" advClick="1"/>
 </p:sldLayout>
 </file>
 
 <file path=ppt/slideLayouts/slideLayout6.xml><?xml version="1.0" encoding="utf-8"?>
-<p:sldLayout xmlns:a="http://schemas.openxmlformats.org/drawingml/2006/main" xmlns:r="http://schemas.openxmlformats.org/officeDocument/2006/relationships" xmlns:p="http://schemas.openxmlformats.org/presentationml/2006/main" type="tx">
+<p:sldLayout xmlns:a="http://schemas.openxmlformats.org/drawingml/2006/main" xmlns:r="http://schemas.openxmlformats.org/officeDocument/2006/relationships" xmlns:p="http://schemas.openxmlformats.org/presentationml/2006/main" type="tx" showMasterSp="1" showMasterPhAnim="1">
   <p:cSld name="Titolo e punti elenco">
     <p:spTree>
       <p:nvGrpSpPr>
@@ -1551,9 +1537,7 @@
       <p:sp>
         <p:nvSpPr>
           <p:cNvPr id="56" name="Titolo Testo"/>
-          <p:cNvSpPr txBox="1">
-            <a:spLocks noGrp="1"/>
-          </p:cNvSpPr>
+          <p:cNvSpPr txBox="1"/>
           <p:nvPr>
             <p:ph type="title"/>
           </p:nvPr>
@@ -1567,6 +1551,7 @@
           <a:bodyPr/>
           <a:lstStyle/>
           <a:p>
+            <a:pPr/>
             <a:r>
               <a:t>Titolo Testo</a:t>
             </a:r>
@@ -1576,9 +1561,7 @@
       <p:sp>
         <p:nvSpPr>
           <p:cNvPr id="57" name="Corpo livello uno…"/>
-          <p:cNvSpPr txBox="1">
-            <a:spLocks noGrp="1"/>
-          </p:cNvSpPr>
+          <p:cNvSpPr txBox="1"/>
           <p:nvPr>
             <p:ph type="body" idx="1"/>
           </p:nvPr>
@@ -1592,6 +1575,7 @@
           <a:bodyPr/>
           <a:lstStyle/>
           <a:p>
+            <a:pPr/>
             <a:r>
               <a:t>Corpo livello uno</a:t>
             </a:r>
@@ -1625,9 +1609,7 @@
       <p:sp>
         <p:nvSpPr>
           <p:cNvPr id="58" name="Numero diapositiva"/>
-          <p:cNvSpPr txBox="1">
-            <a:spLocks noGrp="1"/>
-          </p:cNvSpPr>
+          <p:cNvSpPr txBox="1"/>
           <p:nvPr>
             <p:ph type="sldNum" sz="quarter" idx="2"/>
           </p:nvPr>
@@ -1641,10 +1623,8 @@
           <a:bodyPr/>
           <a:lstStyle/>
           <a:p>
-            <a:fld id="{86CB4B4D-7CA3-9044-876B-883B54F8677D}" type="slidenum">
-              <a:t>‹#›</a:t>
-            </a:fld>
-            <a:endParaRPr/>
+            <a:pPr/>
+            <a:fld id="{86CB4B4D-7CA3-9044-876B-883B54F8677D}" type="slidenum"/>
           </a:p>
         </p:txBody>
       </p:sp>
@@ -1653,12 +1633,12 @@
   <p:clrMapOvr>
     <a:masterClrMapping/>
   </p:clrMapOvr>
-  <p:transition spd="med"/>
+  <p:transition xmlns:p14="http://schemas.microsoft.com/office/powerpoint/2010/main" spd="med" advClick="1"/>
 </p:sldLayout>
 </file>
 
 <file path=ppt/slideLayouts/slideLayout7.xml><?xml version="1.0" encoding="utf-8"?>
-<p:sldLayout xmlns:a="http://schemas.openxmlformats.org/drawingml/2006/main" xmlns:r="http://schemas.openxmlformats.org/officeDocument/2006/relationships" xmlns:p="http://schemas.openxmlformats.org/presentationml/2006/main" type="tx">
+<p:sldLayout xmlns:a="http://schemas.openxmlformats.org/drawingml/2006/main" xmlns:r="http://schemas.openxmlformats.org/officeDocument/2006/relationships" xmlns:p="http://schemas.openxmlformats.org/presentationml/2006/main" type="tx" showMasterSp="1" showMasterPhAnim="1">
   <p:cSld name="Titolo, punti elenco e foto">
     <p:spTree>
       <p:nvGrpSpPr>
@@ -1677,17 +1657,15 @@
       <p:sp>
         <p:nvSpPr>
           <p:cNvPr id="65" name="Immagine"/>
-          <p:cNvSpPr>
-            <a:spLocks noGrp="1"/>
-          </p:cNvSpPr>
+          <p:cNvSpPr/>
           <p:nvPr>
             <p:ph type="pic" idx="13"/>
           </p:nvPr>
         </p:nvSpPr>
         <p:spPr>
           <a:xfrm>
-            <a:off x="4086225" y="2586566"/>
-            <a:ext cx="9429750" cy="6286501"/>
+            <a:off x="4086225" y="2586565"/>
+            <a:ext cx="9429750" cy="6286503"/>
           </a:xfrm>
           <a:prstGeom prst="rect">
             <a:avLst/>
@@ -1699,16 +1677,14 @@
           </a:bodyPr>
           <a:lstStyle/>
           <a:p>
-            <a:endParaRPr/>
+            <a:pPr/>
           </a:p>
         </p:txBody>
       </p:sp>
       <p:sp>
         <p:nvSpPr>
           <p:cNvPr id="66" name="Titolo Testo"/>
-          <p:cNvSpPr txBox="1">
-            <a:spLocks noGrp="1"/>
-          </p:cNvSpPr>
+          <p:cNvSpPr txBox="1"/>
           <p:nvPr>
             <p:ph type="title"/>
           </p:nvPr>
@@ -1722,6 +1698,7 @@
           <a:bodyPr/>
           <a:lstStyle/>
           <a:p>
+            <a:pPr/>
             <a:r>
               <a:t>Titolo Testo</a:t>
             </a:r>
@@ -1731,9 +1708,7 @@
       <p:sp>
         <p:nvSpPr>
           <p:cNvPr id="67" name="Corpo livello uno…"/>
-          <p:cNvSpPr txBox="1">
-            <a:spLocks noGrp="1"/>
-          </p:cNvSpPr>
+          <p:cNvSpPr txBox="1"/>
           <p:nvPr>
             <p:ph type="body" sz="half" idx="1"/>
           </p:nvPr>
@@ -1782,6 +1757,7 @@
             </a:lvl5pPr>
           </a:lstStyle>
           <a:p>
+            <a:pPr/>
             <a:r>
               <a:t>Corpo livello uno</a:t>
             </a:r>
@@ -1815,9 +1791,7 @@
       <p:sp>
         <p:nvSpPr>
           <p:cNvPr id="68" name="Numero diapositiva"/>
-          <p:cNvSpPr txBox="1">
-            <a:spLocks noGrp="1"/>
-          </p:cNvSpPr>
+          <p:cNvSpPr txBox="1"/>
           <p:nvPr>
             <p:ph type="sldNum" sz="quarter" idx="2"/>
           </p:nvPr>
@@ -1844,10 +1818,8 @@
             </a:lvl1pPr>
           </a:lstStyle>
           <a:p>
-            <a:fld id="{86CB4B4D-7CA3-9044-876B-883B54F8677D}" type="slidenum">
-              <a:t>‹#›</a:t>
-            </a:fld>
-            <a:endParaRPr/>
+            <a:pPr/>
+            <a:fld id="{86CB4B4D-7CA3-9044-876B-883B54F8677D}" type="slidenum"/>
           </a:p>
         </p:txBody>
       </p:sp>
@@ -1856,12 +1828,12 @@
   <p:clrMapOvr>
     <a:masterClrMapping/>
   </p:clrMapOvr>
-  <p:transition spd="med"/>
+  <p:transition xmlns:p14="http://schemas.microsoft.com/office/powerpoint/2010/main" spd="med" advClick="1"/>
 </p:sldLayout>
 </file>
 
 <file path=ppt/slideLayouts/slideLayout8.xml><?xml version="1.0" encoding="utf-8"?>
-<p:sldLayout xmlns:a="http://schemas.openxmlformats.org/drawingml/2006/main" xmlns:r="http://schemas.openxmlformats.org/officeDocument/2006/relationships" xmlns:p="http://schemas.openxmlformats.org/presentationml/2006/main" type="tx">
+<p:sldLayout xmlns:a="http://schemas.openxmlformats.org/drawingml/2006/main" xmlns:r="http://schemas.openxmlformats.org/officeDocument/2006/relationships" xmlns:p="http://schemas.openxmlformats.org/presentationml/2006/main" type="tx" showMasterSp="1" showMasterPhAnim="1">
   <p:cSld name="Punti elenco">
     <p:spTree>
       <p:nvGrpSpPr>
@@ -1880,9 +1852,7 @@
       <p:sp>
         <p:nvSpPr>
           <p:cNvPr id="75" name="Corpo livello uno…"/>
-          <p:cNvSpPr txBox="1">
-            <a:spLocks noGrp="1"/>
-          </p:cNvSpPr>
+          <p:cNvSpPr txBox="1"/>
           <p:nvPr>
             <p:ph type="body" idx="1"/>
           </p:nvPr>
@@ -1900,6 +1870,7 @@
           <a:bodyPr/>
           <a:lstStyle/>
           <a:p>
+            <a:pPr/>
             <a:r>
               <a:t>Corpo livello uno</a:t>
             </a:r>
@@ -1933,9 +1904,7 @@
       <p:sp>
         <p:nvSpPr>
           <p:cNvPr id="76" name="Numero diapositiva"/>
-          <p:cNvSpPr txBox="1">
-            <a:spLocks noGrp="1"/>
-          </p:cNvSpPr>
+          <p:cNvSpPr txBox="1"/>
           <p:nvPr>
             <p:ph type="sldNum" sz="quarter" idx="2"/>
           </p:nvPr>
@@ -1949,10 +1918,8 @@
           <a:bodyPr/>
           <a:lstStyle/>
           <a:p>
-            <a:fld id="{86CB4B4D-7CA3-9044-876B-883B54F8677D}" type="slidenum">
-              <a:t>‹#›</a:t>
-            </a:fld>
-            <a:endParaRPr/>
+            <a:pPr/>
+            <a:fld id="{86CB4B4D-7CA3-9044-876B-883B54F8677D}" type="slidenum"/>
           </a:p>
         </p:txBody>
       </p:sp>
@@ -1961,12 +1928,12 @@
   <p:clrMapOvr>
     <a:masterClrMapping/>
   </p:clrMapOvr>
-  <p:transition spd="med"/>
+  <p:transition xmlns:p14="http://schemas.microsoft.com/office/powerpoint/2010/main" spd="med" advClick="1"/>
 </p:sldLayout>
 </file>
 
 <file path=ppt/slideLayouts/slideLayout9.xml><?xml version="1.0" encoding="utf-8"?>
-<p:sldLayout xmlns:a="http://schemas.openxmlformats.org/drawingml/2006/main" xmlns:r="http://schemas.openxmlformats.org/officeDocument/2006/relationships" xmlns:p="http://schemas.openxmlformats.org/presentationml/2006/main" type="tx">
+<p:sldLayout xmlns:a="http://schemas.openxmlformats.org/drawingml/2006/main" xmlns:r="http://schemas.openxmlformats.org/officeDocument/2006/relationships" xmlns:p="http://schemas.openxmlformats.org/presentationml/2006/main" type="tx" showMasterSp="1" showMasterPhAnim="1">
   <p:cSld name="Foto - 3 per pagina">
     <p:spTree>
       <p:nvGrpSpPr>
@@ -1985,9 +1952,7 @@
       <p:sp>
         <p:nvSpPr>
           <p:cNvPr id="83" name="Immagine"/>
-          <p:cNvSpPr>
-            <a:spLocks noGrp="1"/>
-          </p:cNvSpPr>
+          <p:cNvSpPr/>
           <p:nvPr>
             <p:ph type="pic" sz="quarter" idx="13"/>
           </p:nvPr>
@@ -2007,16 +1972,14 @@
           </a:bodyPr>
           <a:lstStyle/>
           <a:p>
-            <a:endParaRPr/>
+            <a:pPr/>
           </a:p>
         </p:txBody>
       </p:sp>
       <p:sp>
         <p:nvSpPr>
           <p:cNvPr id="84" name="Immagine"/>
-          <p:cNvSpPr>
-            <a:spLocks noGrp="1"/>
-          </p:cNvSpPr>
+          <p:cNvSpPr/>
           <p:nvPr>
             <p:ph type="pic" sz="quarter" idx="14"/>
           </p:nvPr>
@@ -2024,7 +1987,7 @@
         <p:spPr>
           <a:xfrm>
             <a:off x="6502400" y="889000"/>
-            <a:ext cx="5867400" cy="3911601"/>
+            <a:ext cx="5867400" cy="3911602"/>
           </a:xfrm>
           <a:prstGeom prst="rect">
             <a:avLst/>
@@ -2036,16 +1999,14 @@
           </a:bodyPr>
           <a:lstStyle/>
           <a:p>
-            <a:endParaRPr/>
+            <a:pPr/>
           </a:p>
         </p:txBody>
       </p:sp>
       <p:sp>
         <p:nvSpPr>
           <p:cNvPr id="85" name="Immagine"/>
-          <p:cNvSpPr>
-            <a:spLocks noGrp="1"/>
-          </p:cNvSpPr>
+          <p:cNvSpPr/>
           <p:nvPr>
             <p:ph type="pic" idx="15"/>
           </p:nvPr>
@@ -2065,16 +2026,14 @@
           </a:bodyPr>
           <a:lstStyle/>
           <a:p>
-            <a:endParaRPr/>
+            <a:pPr/>
           </a:p>
         </p:txBody>
       </p:sp>
       <p:sp>
         <p:nvSpPr>
           <p:cNvPr id="86" name="Numero diapositiva"/>
-          <p:cNvSpPr txBox="1">
-            <a:spLocks noGrp="1"/>
-          </p:cNvSpPr>
+          <p:cNvSpPr txBox="1"/>
           <p:nvPr>
             <p:ph type="sldNum" sz="quarter" idx="2"/>
           </p:nvPr>
@@ -2088,10 +2047,8 @@
           <a:bodyPr/>
           <a:lstStyle/>
           <a:p>
-            <a:fld id="{86CB4B4D-7CA3-9044-876B-883B54F8677D}" type="slidenum">
-              <a:t>‹#›</a:t>
-            </a:fld>
-            <a:endParaRPr/>
+            <a:pPr/>
+            <a:fld id="{86CB4B4D-7CA3-9044-876B-883B54F8677D}" type="slidenum"/>
           </a:p>
         </p:txBody>
       </p:sp>
@@ -2100,7 +2057,7 @@
   <p:clrMapOvr>
     <a:masterClrMapping/>
   </p:clrMapOvr>
-  <p:transition spd="med"/>
+  <p:transition xmlns:p14="http://schemas.microsoft.com/office/powerpoint/2010/main" spd="med" advClick="1"/>
 </p:sldLayout>
 </file>
 
@@ -2112,7 +2069,6 @@
         <a:solidFill>
           <a:srgbClr val="FFFFFF"/>
         </a:solidFill>
-        <a:effectLst/>
       </p:bgPr>
     </p:bg>
     <p:spTree>
@@ -2132,9 +2088,7 @@
       <p:sp>
         <p:nvSpPr>
           <p:cNvPr id="2" name="Titolo Testo"/>
-          <p:cNvSpPr txBox="1">
-            <a:spLocks noGrp="1"/>
-          </p:cNvSpPr>
+          <p:cNvSpPr txBox="1"/>
           <p:nvPr>
             <p:ph type="title"/>
           </p:nvPr>
@@ -2152,16 +2106,17 @@
           </a:ln>
           <a:extLst>
             <a:ext uri="{C572A759-6A51-4108-AA02-DFA0A04FC94B}">
-              <ma14:wrappingTextBoxFlag xmlns:ma14="http://schemas.microsoft.com/office/mac/drawingml/2011/main" xmlns:a14="http://schemas.microsoft.com/office/drawing/2010/main" xmlns:m="http://schemas.openxmlformats.org/officeDocument/2006/math" xmlns="" val="1"/>
+              <ma14:wrappingTextBoxFlag xmlns:ma14="http://schemas.microsoft.com/office/mac/drawingml/2011/main" val="1"/>
             </a:ext>
           </a:extLst>
         </p:spPr>
         <p:txBody>
           <a:bodyPr lIns="50800" tIns="50800" rIns="50800" bIns="50800" anchor="ctr">
-            <a:normAutofit/>
+            <a:normAutofit fontScale="100000" lnSpcReduction="0"/>
           </a:bodyPr>
           <a:lstStyle/>
           <a:p>
+            <a:pPr/>
             <a:r>
               <a:t>Titolo Testo</a:t>
             </a:r>
@@ -2171,9 +2126,7 @@
       <p:sp>
         <p:nvSpPr>
           <p:cNvPr id="3" name="Corpo livello uno…"/>
-          <p:cNvSpPr txBox="1">
-            <a:spLocks noGrp="1"/>
-          </p:cNvSpPr>
+          <p:cNvSpPr txBox="1"/>
           <p:nvPr>
             <p:ph type="body" idx="1"/>
           </p:nvPr>
@@ -2191,16 +2144,17 @@
           </a:ln>
           <a:extLst>
             <a:ext uri="{C572A759-6A51-4108-AA02-DFA0A04FC94B}">
-              <ma14:wrappingTextBoxFlag xmlns:ma14="http://schemas.microsoft.com/office/mac/drawingml/2011/main" xmlns:a14="http://schemas.microsoft.com/office/drawing/2010/main" xmlns:m="http://schemas.openxmlformats.org/officeDocument/2006/math" xmlns="" val="1"/>
+              <ma14:wrappingTextBoxFlag xmlns:ma14="http://schemas.microsoft.com/office/mac/drawingml/2011/main" val="1"/>
             </a:ext>
           </a:extLst>
         </p:spPr>
         <p:txBody>
           <a:bodyPr lIns="50800" tIns="50800" rIns="50800" bIns="50800" anchor="ctr">
-            <a:normAutofit/>
+            <a:normAutofit fontScale="100000" lnSpcReduction="0"/>
           </a:bodyPr>
           <a:lstStyle/>
           <a:p>
+            <a:pPr/>
             <a:r>
               <a:t>Corpo livello uno</a:t>
             </a:r>
@@ -2234,9 +2188,7 @@
       <p:sp>
         <p:nvSpPr>
           <p:cNvPr id="4" name="Numero diapositiva"/>
-          <p:cNvSpPr txBox="1">
-            <a:spLocks noGrp="1"/>
-          </p:cNvSpPr>
+          <p:cNvSpPr txBox="1"/>
           <p:nvPr>
             <p:ph type="sldNum" sz="quarter" idx="2"/>
           </p:nvPr>
@@ -2259,7 +2211,7 @@
           </a:bodyPr>
           <a:lstStyle>
             <a:lvl1pPr>
-              <a:defRPr sz="1600" b="0">
+              <a:defRPr sz="1600">
                 <a:latin typeface="Helvetica Neue Light"/>
                 <a:ea typeface="Helvetica Neue Light"/>
                 <a:cs typeface="Helvetica Neue Light"/>
@@ -2268,10 +2220,8 @@
             </a:lvl1pPr>
           </a:lstStyle>
           <a:p>
-            <a:fld id="{86CB4B4D-7CA3-9044-876B-883B54F8677D}" type="slidenum">
-              <a:t>‹#›</a:t>
-            </a:fld>
-            <a:endParaRPr/>
+            <a:pPr/>
+            <a:fld id="{86CB4B4D-7CA3-9044-876B-883B54F8677D}" type="slidenum"/>
           </a:p>
         </p:txBody>
       </p:sp>
@@ -2279,20 +2229,20 @@
   </p:cSld>
   <p:clrMap bg1="lt1" tx1="dk1" bg2="lt2" tx2="dk2" accent1="accent1" accent2="accent2" accent3="accent3" accent4="accent4" accent5="accent5" accent6="accent6" hlink="hlink" folHlink="folHlink"/>
   <p:sldLayoutIdLst>
-    <p:sldLayoutId id="2147483649" r:id="rId1"/>
-    <p:sldLayoutId id="2147483650" r:id="rId2"/>
-    <p:sldLayoutId id="2147483651" r:id="rId3"/>
-    <p:sldLayoutId id="2147483652" r:id="rId4"/>
-    <p:sldLayoutId id="2147483653" r:id="rId5"/>
-    <p:sldLayoutId id="2147483654" r:id="rId6"/>
-    <p:sldLayoutId id="2147483655" r:id="rId7"/>
-    <p:sldLayoutId id="2147483656" r:id="rId8"/>
-    <p:sldLayoutId id="2147483657" r:id="rId9"/>
-    <p:sldLayoutId id="2147483658" r:id="rId10"/>
-    <p:sldLayoutId id="2147483659" r:id="rId11"/>
-    <p:sldLayoutId id="2147483660" r:id="rId12"/>
+    <p:sldLayoutId id="2147483649" r:id="rId2"/>
+    <p:sldLayoutId id="2147483650" r:id="rId3"/>
+    <p:sldLayoutId id="2147483651" r:id="rId4"/>
+    <p:sldLayoutId id="2147483652" r:id="rId5"/>
+    <p:sldLayoutId id="2147483653" r:id="rId6"/>
+    <p:sldLayoutId id="2147483654" r:id="rId7"/>
+    <p:sldLayoutId id="2147483655" r:id="rId8"/>
+    <p:sldLayoutId id="2147483656" r:id="rId9"/>
+    <p:sldLayoutId id="2147483657" r:id="rId10"/>
+    <p:sldLayoutId id="2147483658" r:id="rId11"/>
+    <p:sldLayoutId id="2147483659" r:id="rId12"/>
+    <p:sldLayoutId id="2147483660" r:id="rId13"/>
   </p:sldLayoutIdLst>
-  <p:transition spd="med"/>
+  <p:transition xmlns:p14="http://schemas.microsoft.com/office/powerpoint/2010/main" spd="med" advClick="1"/>
   <p:txStyles>
     <p:titleStyle>
       <a:lvl1pPr marL="0" marR="0" indent="0" algn="ctr" defTabSz="584200" rtl="0" latinLnBrk="0">
@@ -2310,14 +2260,17 @@
         <a:buFontTx/>
         <a:buNone/>
         <a:tabLst/>
-        <a:defRPr sz="8000" b="0" i="0" u="none" strike="noStrike" cap="none" spc="0" baseline="0">
+        <a:defRPr b="0" baseline="0" cap="none" i="0" spc="0" strike="noStrike" sz="8000" u="none">
+          <a:ln>
+            <a:noFill/>
+          </a:ln>
           <a:solidFill>
             <a:srgbClr val="000000"/>
           </a:solidFill>
           <a:uFillTx/>
-          <a:latin typeface="+mn-lt"/>
-          <a:ea typeface="+mn-ea"/>
-          <a:cs typeface="+mn-cs"/>
+          <a:latin typeface="Helvetica Neue Medium"/>
+          <a:ea typeface="Helvetica Neue Medium"/>
+          <a:cs typeface="Helvetica Neue Medium"/>
           <a:sym typeface="Helvetica Neue Medium"/>
         </a:defRPr>
       </a:lvl1pPr>
@@ -2336,14 +2289,17 @@
         <a:buFontTx/>
         <a:buNone/>
         <a:tabLst/>
-        <a:defRPr sz="8000" b="0" i="0" u="none" strike="noStrike" cap="none" spc="0" baseline="0">
+        <a:defRPr b="0" baseline="0" cap="none" i="0" spc="0" strike="noStrike" sz="8000" u="none">
+          <a:ln>
+            <a:noFill/>
+          </a:ln>
           <a:solidFill>
             <a:srgbClr val="000000"/>
           </a:solidFill>
           <a:uFillTx/>
-          <a:latin typeface="+mn-lt"/>
-          <a:ea typeface="+mn-ea"/>
-          <a:cs typeface="+mn-cs"/>
+          <a:latin typeface="Helvetica Neue Medium"/>
+          <a:ea typeface="Helvetica Neue Medium"/>
+          <a:cs typeface="Helvetica Neue Medium"/>
           <a:sym typeface="Helvetica Neue Medium"/>
         </a:defRPr>
       </a:lvl2pPr>
@@ -2362,14 +2318,17 @@
         <a:buFontTx/>
         <a:buNone/>
         <a:tabLst/>
-        <a:defRPr sz="8000" b="0" i="0" u="none" strike="noStrike" cap="none" spc="0" baseline="0">
+        <a:defRPr b="0" baseline="0" cap="none" i="0" spc="0" strike="noStrike" sz="8000" u="none">
+          <a:ln>
+            <a:noFill/>
+          </a:ln>
           <a:solidFill>
             <a:srgbClr val="000000"/>
           </a:solidFill>
           <a:uFillTx/>
-          <a:latin typeface="+mn-lt"/>
-          <a:ea typeface="+mn-ea"/>
-          <a:cs typeface="+mn-cs"/>
+          <a:latin typeface="Helvetica Neue Medium"/>
+          <a:ea typeface="Helvetica Neue Medium"/>
+          <a:cs typeface="Helvetica Neue Medium"/>
           <a:sym typeface="Helvetica Neue Medium"/>
         </a:defRPr>
       </a:lvl3pPr>
@@ -2388,14 +2347,17 @@
         <a:buFontTx/>
         <a:buNone/>
         <a:tabLst/>
-        <a:defRPr sz="8000" b="0" i="0" u="none" strike="noStrike" cap="none" spc="0" baseline="0">
+        <a:defRPr b="0" baseline="0" cap="none" i="0" spc="0" strike="noStrike" sz="8000" u="none">
+          <a:ln>
+            <a:noFill/>
+          </a:ln>
           <a:solidFill>
             <a:srgbClr val="000000"/>
           </a:solidFill>
           <a:uFillTx/>
-          <a:latin typeface="+mn-lt"/>
-          <a:ea typeface="+mn-ea"/>
-          <a:cs typeface="+mn-cs"/>
+          <a:latin typeface="Helvetica Neue Medium"/>
+          <a:ea typeface="Helvetica Neue Medium"/>
+          <a:cs typeface="Helvetica Neue Medium"/>
           <a:sym typeface="Helvetica Neue Medium"/>
         </a:defRPr>
       </a:lvl4pPr>
@@ -2414,14 +2376,17 @@
         <a:buFontTx/>
         <a:buNone/>
         <a:tabLst/>
-        <a:defRPr sz="8000" b="0" i="0" u="none" strike="noStrike" cap="none" spc="0" baseline="0">
+        <a:defRPr b="0" baseline="0" cap="none" i="0" spc="0" strike="noStrike" sz="8000" u="none">
+          <a:ln>
+            <a:noFill/>
+          </a:ln>
           <a:solidFill>
             <a:srgbClr val="000000"/>
           </a:solidFill>
           <a:uFillTx/>
-          <a:latin typeface="+mn-lt"/>
-          <a:ea typeface="+mn-ea"/>
-          <a:cs typeface="+mn-cs"/>
+          <a:latin typeface="Helvetica Neue Medium"/>
+          <a:ea typeface="Helvetica Neue Medium"/>
+          <a:cs typeface="Helvetica Neue Medium"/>
           <a:sym typeface="Helvetica Neue Medium"/>
         </a:defRPr>
       </a:lvl5pPr>
@@ -2440,14 +2405,17 @@
         <a:buFontTx/>
         <a:buNone/>
         <a:tabLst/>
-        <a:defRPr sz="8000" b="0" i="0" u="none" strike="noStrike" cap="none" spc="0" baseline="0">
+        <a:defRPr b="0" baseline="0" cap="none" i="0" spc="0" strike="noStrike" sz="8000" u="none">
+          <a:ln>
+            <a:noFill/>
+          </a:ln>
           <a:solidFill>
             <a:srgbClr val="000000"/>
           </a:solidFill>
           <a:uFillTx/>
-          <a:latin typeface="+mn-lt"/>
-          <a:ea typeface="+mn-ea"/>
-          <a:cs typeface="+mn-cs"/>
+          <a:latin typeface="Helvetica Neue Medium"/>
+          <a:ea typeface="Helvetica Neue Medium"/>
+          <a:cs typeface="Helvetica Neue Medium"/>
           <a:sym typeface="Helvetica Neue Medium"/>
         </a:defRPr>
       </a:lvl6pPr>
@@ -2466,14 +2434,17 @@
         <a:buFontTx/>
         <a:buNone/>
         <a:tabLst/>
-        <a:defRPr sz="8000" b="0" i="0" u="none" strike="noStrike" cap="none" spc="0" baseline="0">
+        <a:defRPr b="0" baseline="0" cap="none" i="0" spc="0" strike="noStrike" sz="8000" u="none">
+          <a:ln>
+            <a:noFill/>
+          </a:ln>
           <a:solidFill>
             <a:srgbClr val="000000"/>
           </a:solidFill>
           <a:uFillTx/>
-          <a:latin typeface="+mn-lt"/>
-          <a:ea typeface="+mn-ea"/>
-          <a:cs typeface="+mn-cs"/>
+          <a:latin typeface="Helvetica Neue Medium"/>
+          <a:ea typeface="Helvetica Neue Medium"/>
+          <a:cs typeface="Helvetica Neue Medium"/>
           <a:sym typeface="Helvetica Neue Medium"/>
         </a:defRPr>
       </a:lvl7pPr>
@@ -2492,14 +2463,17 @@
         <a:buFontTx/>
         <a:buNone/>
         <a:tabLst/>
-        <a:defRPr sz="8000" b="0" i="0" u="none" strike="noStrike" cap="none" spc="0" baseline="0">
+        <a:defRPr b="0" baseline="0" cap="none" i="0" spc="0" strike="noStrike" sz="8000" u="none">
+          <a:ln>
+            <a:noFill/>
+          </a:ln>
           <a:solidFill>
             <a:srgbClr val="000000"/>
           </a:solidFill>
           <a:uFillTx/>
-          <a:latin typeface="+mn-lt"/>
-          <a:ea typeface="+mn-ea"/>
-          <a:cs typeface="+mn-cs"/>
+          <a:latin typeface="Helvetica Neue Medium"/>
+          <a:ea typeface="Helvetica Neue Medium"/>
+          <a:cs typeface="Helvetica Neue Medium"/>
           <a:sym typeface="Helvetica Neue Medium"/>
         </a:defRPr>
       </a:lvl8pPr>
@@ -2518,14 +2492,17 @@
         <a:buFontTx/>
         <a:buNone/>
         <a:tabLst/>
-        <a:defRPr sz="8000" b="0" i="0" u="none" strike="noStrike" cap="none" spc="0" baseline="0">
+        <a:defRPr b="0" baseline="0" cap="none" i="0" spc="0" strike="noStrike" sz="8000" u="none">
+          <a:ln>
+            <a:noFill/>
+          </a:ln>
           <a:solidFill>
             <a:srgbClr val="000000"/>
           </a:solidFill>
           <a:uFillTx/>
-          <a:latin typeface="+mn-lt"/>
-          <a:ea typeface="+mn-ea"/>
-          <a:cs typeface="+mn-cs"/>
+          <a:latin typeface="Helvetica Neue Medium"/>
+          <a:ea typeface="Helvetica Neue Medium"/>
+          <a:cs typeface="Helvetica Neue Medium"/>
           <a:sym typeface="Helvetica Neue Medium"/>
         </a:defRPr>
       </a:lvl9pPr>
@@ -2546,14 +2523,17 @@
         <a:buFontTx/>
         <a:buChar char="•"/>
         <a:tabLst/>
-        <a:defRPr sz="3200" b="0" i="0" u="none" strike="noStrike" cap="none" spc="0" baseline="0">
+        <a:defRPr b="0" baseline="0" cap="none" i="0" spc="0" strike="noStrike" sz="3200" u="none">
+          <a:ln>
+            <a:noFill/>
+          </a:ln>
           <a:solidFill>
             <a:srgbClr val="000000"/>
           </a:solidFill>
           <a:uFillTx/>
-          <a:latin typeface="Helvetica Neue"/>
-          <a:ea typeface="Helvetica Neue"/>
-          <a:cs typeface="Helvetica Neue"/>
+          <a:latin typeface="+mn-lt"/>
+          <a:ea typeface="+mn-ea"/>
+          <a:cs typeface="+mn-cs"/>
           <a:sym typeface="Helvetica Neue"/>
         </a:defRPr>
       </a:lvl1pPr>
@@ -2572,14 +2552,17 @@
         <a:buFontTx/>
         <a:buChar char="•"/>
         <a:tabLst/>
-        <a:defRPr sz="3200" b="0" i="0" u="none" strike="noStrike" cap="none" spc="0" baseline="0">
+        <a:defRPr b="0" baseline="0" cap="none" i="0" spc="0" strike="noStrike" sz="3200" u="none">
+          <a:ln>
+            <a:noFill/>
+          </a:ln>
           <a:solidFill>
             <a:srgbClr val="000000"/>
           </a:solidFill>
           <a:uFillTx/>
-          <a:latin typeface="Helvetica Neue"/>
-          <a:ea typeface="Helvetica Neue"/>
-          <a:cs typeface="Helvetica Neue"/>
+          <a:latin typeface="+mn-lt"/>
+          <a:ea typeface="+mn-ea"/>
+          <a:cs typeface="+mn-cs"/>
           <a:sym typeface="Helvetica Neue"/>
         </a:defRPr>
       </a:lvl2pPr>
@@ -2598,14 +2581,17 @@
         <a:buFontTx/>
         <a:buChar char="•"/>
         <a:tabLst/>
-        <a:defRPr sz="3200" b="0" i="0" u="none" strike="noStrike" cap="none" spc="0" baseline="0">
+        <a:defRPr b="0" baseline="0" cap="none" i="0" spc="0" strike="noStrike" sz="3200" u="none">
+          <a:ln>
+            <a:noFill/>
+          </a:ln>
           <a:solidFill>
             <a:srgbClr val="000000"/>
           </a:solidFill>
           <a:uFillTx/>
-          <a:latin typeface="Helvetica Neue"/>
-          <a:ea typeface="Helvetica Neue"/>
-          <a:cs typeface="Helvetica Neue"/>
+          <a:latin typeface="+mn-lt"/>
+          <a:ea typeface="+mn-ea"/>
+          <a:cs typeface="+mn-cs"/>
           <a:sym typeface="Helvetica Neue"/>
         </a:defRPr>
       </a:lvl3pPr>
@@ -2624,14 +2610,17 @@
         <a:buFontTx/>
         <a:buChar char="•"/>
         <a:tabLst/>
-        <a:defRPr sz="3200" b="0" i="0" u="none" strike="noStrike" cap="none" spc="0" baseline="0">
+        <a:defRPr b="0" baseline="0" cap="none" i="0" spc="0" strike="noStrike" sz="3200" u="none">
+          <a:ln>
+            <a:noFill/>
+          </a:ln>
           <a:solidFill>
             <a:srgbClr val="000000"/>
           </a:solidFill>
           <a:uFillTx/>
-          <a:latin typeface="Helvetica Neue"/>
-          <a:ea typeface="Helvetica Neue"/>
-          <a:cs typeface="Helvetica Neue"/>
+          <a:latin typeface="+mn-lt"/>
+          <a:ea typeface="+mn-ea"/>
+          <a:cs typeface="+mn-cs"/>
           <a:sym typeface="Helvetica Neue"/>
         </a:defRPr>
       </a:lvl4pPr>
@@ -2650,14 +2639,17 @@
         <a:buFontTx/>
         <a:buChar char="•"/>
         <a:tabLst/>
-        <a:defRPr sz="3200" b="0" i="0" u="none" strike="noStrike" cap="none" spc="0" baseline="0">
+        <a:defRPr b="0" baseline="0" cap="none" i="0" spc="0" strike="noStrike" sz="3200" u="none">
+          <a:ln>
+            <a:noFill/>
+          </a:ln>
           <a:solidFill>
             <a:srgbClr val="000000"/>
           </a:solidFill>
           <a:uFillTx/>
-          <a:latin typeface="Helvetica Neue"/>
-          <a:ea typeface="Helvetica Neue"/>
-          <a:cs typeface="Helvetica Neue"/>
+          <a:latin typeface="+mn-lt"/>
+          <a:ea typeface="+mn-ea"/>
+          <a:cs typeface="+mn-cs"/>
           <a:sym typeface="Helvetica Neue"/>
         </a:defRPr>
       </a:lvl5pPr>
@@ -2676,14 +2668,17 @@
         <a:buFontTx/>
         <a:buChar char="•"/>
         <a:tabLst/>
-        <a:defRPr sz="3200" b="0" i="0" u="none" strike="noStrike" cap="none" spc="0" baseline="0">
+        <a:defRPr b="0" baseline="0" cap="none" i="0" spc="0" strike="noStrike" sz="3200" u="none">
+          <a:ln>
+            <a:noFill/>
+          </a:ln>
           <a:solidFill>
             <a:srgbClr val="000000"/>
           </a:solidFill>
           <a:uFillTx/>
-          <a:latin typeface="Helvetica Neue"/>
-          <a:ea typeface="Helvetica Neue"/>
-          <a:cs typeface="Helvetica Neue"/>
+          <a:latin typeface="+mn-lt"/>
+          <a:ea typeface="+mn-ea"/>
+          <a:cs typeface="+mn-cs"/>
           <a:sym typeface="Helvetica Neue"/>
         </a:defRPr>
       </a:lvl6pPr>
@@ -2702,14 +2697,17 @@
         <a:buFontTx/>
         <a:buChar char="•"/>
         <a:tabLst/>
-        <a:defRPr sz="3200" b="0" i="0" u="none" strike="noStrike" cap="none" spc="0" baseline="0">
+        <a:defRPr b="0" baseline="0" cap="none" i="0" spc="0" strike="noStrike" sz="3200" u="none">
+          <a:ln>
+            <a:noFill/>
+          </a:ln>
           <a:solidFill>
             <a:srgbClr val="000000"/>
           </a:solidFill>
           <a:uFillTx/>
-          <a:latin typeface="Helvetica Neue"/>
-          <a:ea typeface="Helvetica Neue"/>
-          <a:cs typeface="Helvetica Neue"/>
+          <a:latin typeface="+mn-lt"/>
+          <a:ea typeface="+mn-ea"/>
+          <a:cs typeface="+mn-cs"/>
           <a:sym typeface="Helvetica Neue"/>
         </a:defRPr>
       </a:lvl7pPr>
@@ -2728,14 +2726,17 @@
         <a:buFontTx/>
         <a:buChar char="•"/>
         <a:tabLst/>
-        <a:defRPr sz="3200" b="0" i="0" u="none" strike="noStrike" cap="none" spc="0" baseline="0">
+        <a:defRPr b="0" baseline="0" cap="none" i="0" spc="0" strike="noStrike" sz="3200" u="none">
+          <a:ln>
+            <a:noFill/>
+          </a:ln>
           <a:solidFill>
             <a:srgbClr val="000000"/>
           </a:solidFill>
           <a:uFillTx/>
-          <a:latin typeface="Helvetica Neue"/>
-          <a:ea typeface="Helvetica Neue"/>
-          <a:cs typeface="Helvetica Neue"/>
+          <a:latin typeface="+mn-lt"/>
+          <a:ea typeface="+mn-ea"/>
+          <a:cs typeface="+mn-cs"/>
           <a:sym typeface="Helvetica Neue"/>
         </a:defRPr>
       </a:lvl8pPr>
@@ -2754,20 +2755,23 @@
         <a:buFontTx/>
         <a:buChar char="•"/>
         <a:tabLst/>
-        <a:defRPr sz="3200" b="0" i="0" u="none" strike="noStrike" cap="none" spc="0" baseline="0">
+        <a:defRPr b="0" baseline="0" cap="none" i="0" spc="0" strike="noStrike" sz="3200" u="none">
+          <a:ln>
+            <a:noFill/>
+          </a:ln>
           <a:solidFill>
             <a:srgbClr val="000000"/>
           </a:solidFill>
           <a:uFillTx/>
-          <a:latin typeface="Helvetica Neue"/>
-          <a:ea typeface="Helvetica Neue"/>
-          <a:cs typeface="Helvetica Neue"/>
+          <a:latin typeface="+mn-lt"/>
+          <a:ea typeface="+mn-ea"/>
+          <a:cs typeface="+mn-cs"/>
           <a:sym typeface="Helvetica Neue"/>
         </a:defRPr>
       </a:lvl9pPr>
     </p:bodyStyle>
     <p:otherStyle>
-      <a:lvl1pPr marL="0" marR="0" indent="0" algn="ctr" defTabSz="584200" latinLnBrk="0">
+      <a:lvl1pPr marL="0" marR="0" indent="0" algn="ctr" defTabSz="584200" rtl="0" latinLnBrk="0">
         <a:lnSpc>
           <a:spcPct val="100000"/>
         </a:lnSpc>
@@ -2782,7 +2786,10 @@
         <a:buFontTx/>
         <a:buNone/>
         <a:tabLst/>
-        <a:defRPr sz="1600" b="0" i="0" u="none" strike="noStrike" cap="none" spc="0" baseline="0">
+        <a:defRPr b="0" baseline="0" cap="none" i="0" spc="0" strike="noStrike" sz="1600" u="none">
+          <a:ln>
+            <a:noFill/>
+          </a:ln>
           <a:solidFill>
             <a:schemeClr val="tx1"/>
           </a:solidFill>
@@ -2793,7 +2800,7 @@
           <a:sym typeface="Helvetica Neue Light"/>
         </a:defRPr>
       </a:lvl1pPr>
-      <a:lvl2pPr marL="0" marR="0" indent="228600" algn="ctr" defTabSz="584200" latinLnBrk="0">
+      <a:lvl2pPr marL="0" marR="0" indent="0" algn="ctr" defTabSz="584200" rtl="0" latinLnBrk="0">
         <a:lnSpc>
           <a:spcPct val="100000"/>
         </a:lnSpc>
@@ -2808,7 +2815,10 @@
         <a:buFontTx/>
         <a:buNone/>
         <a:tabLst/>
-        <a:defRPr sz="1600" b="0" i="0" u="none" strike="noStrike" cap="none" spc="0" baseline="0">
+        <a:defRPr b="0" baseline="0" cap="none" i="0" spc="0" strike="noStrike" sz="1600" u="none">
+          <a:ln>
+            <a:noFill/>
+          </a:ln>
           <a:solidFill>
             <a:schemeClr val="tx1"/>
           </a:solidFill>
@@ -2819,7 +2829,7 @@
           <a:sym typeface="Helvetica Neue Light"/>
         </a:defRPr>
       </a:lvl2pPr>
-      <a:lvl3pPr marL="0" marR="0" indent="457200" algn="ctr" defTabSz="584200" latinLnBrk="0">
+      <a:lvl3pPr marL="0" marR="0" indent="0" algn="ctr" defTabSz="584200" rtl="0" latinLnBrk="0">
         <a:lnSpc>
           <a:spcPct val="100000"/>
         </a:lnSpc>
@@ -2834,7 +2844,10 @@
         <a:buFontTx/>
         <a:buNone/>
         <a:tabLst/>
-        <a:defRPr sz="1600" b="0" i="0" u="none" strike="noStrike" cap="none" spc="0" baseline="0">
+        <a:defRPr b="0" baseline="0" cap="none" i="0" spc="0" strike="noStrike" sz="1600" u="none">
+          <a:ln>
+            <a:noFill/>
+          </a:ln>
           <a:solidFill>
             <a:schemeClr val="tx1"/>
           </a:solidFill>
@@ -2845,7 +2858,7 @@
           <a:sym typeface="Helvetica Neue Light"/>
         </a:defRPr>
       </a:lvl3pPr>
-      <a:lvl4pPr marL="0" marR="0" indent="685800" algn="ctr" defTabSz="584200" latinLnBrk="0">
+      <a:lvl4pPr marL="0" marR="0" indent="0" algn="ctr" defTabSz="584200" rtl="0" latinLnBrk="0">
         <a:lnSpc>
           <a:spcPct val="100000"/>
         </a:lnSpc>
@@ -2860,7 +2873,10 @@
         <a:buFontTx/>
         <a:buNone/>
         <a:tabLst/>
-        <a:defRPr sz="1600" b="0" i="0" u="none" strike="noStrike" cap="none" spc="0" baseline="0">
+        <a:defRPr b="0" baseline="0" cap="none" i="0" spc="0" strike="noStrike" sz="1600" u="none">
+          <a:ln>
+            <a:noFill/>
+          </a:ln>
           <a:solidFill>
             <a:schemeClr val="tx1"/>
           </a:solidFill>
@@ -2871,7 +2887,7 @@
           <a:sym typeface="Helvetica Neue Light"/>
         </a:defRPr>
       </a:lvl4pPr>
-      <a:lvl5pPr marL="0" marR="0" indent="914400" algn="ctr" defTabSz="584200" latinLnBrk="0">
+      <a:lvl5pPr marL="0" marR="0" indent="0" algn="ctr" defTabSz="584200" rtl="0" latinLnBrk="0">
         <a:lnSpc>
           <a:spcPct val="100000"/>
         </a:lnSpc>
@@ -2886,7 +2902,10 @@
         <a:buFontTx/>
         <a:buNone/>
         <a:tabLst/>
-        <a:defRPr sz="1600" b="0" i="0" u="none" strike="noStrike" cap="none" spc="0" baseline="0">
+        <a:defRPr b="0" baseline="0" cap="none" i="0" spc="0" strike="noStrike" sz="1600" u="none">
+          <a:ln>
+            <a:noFill/>
+          </a:ln>
           <a:solidFill>
             <a:schemeClr val="tx1"/>
           </a:solidFill>
@@ -2897,7 +2916,7 @@
           <a:sym typeface="Helvetica Neue Light"/>
         </a:defRPr>
       </a:lvl5pPr>
-      <a:lvl6pPr marL="0" marR="0" indent="1143000" algn="ctr" defTabSz="584200" latinLnBrk="0">
+      <a:lvl6pPr marL="0" marR="0" indent="0" algn="ctr" defTabSz="584200" rtl="0" latinLnBrk="0">
         <a:lnSpc>
           <a:spcPct val="100000"/>
         </a:lnSpc>
@@ -2912,7 +2931,10 @@
         <a:buFontTx/>
         <a:buNone/>
         <a:tabLst/>
-        <a:defRPr sz="1600" b="0" i="0" u="none" strike="noStrike" cap="none" spc="0" baseline="0">
+        <a:defRPr b="0" baseline="0" cap="none" i="0" spc="0" strike="noStrike" sz="1600" u="none">
+          <a:ln>
+            <a:noFill/>
+          </a:ln>
           <a:solidFill>
             <a:schemeClr val="tx1"/>
           </a:solidFill>
@@ -2923,7 +2945,7 @@
           <a:sym typeface="Helvetica Neue Light"/>
         </a:defRPr>
       </a:lvl6pPr>
-      <a:lvl7pPr marL="0" marR="0" indent="1371600" algn="ctr" defTabSz="584200" latinLnBrk="0">
+      <a:lvl7pPr marL="0" marR="0" indent="0" algn="ctr" defTabSz="584200" rtl="0" latinLnBrk="0">
         <a:lnSpc>
           <a:spcPct val="100000"/>
         </a:lnSpc>
@@ -2938,7 +2960,10 @@
         <a:buFontTx/>
         <a:buNone/>
         <a:tabLst/>
-        <a:defRPr sz="1600" b="0" i="0" u="none" strike="noStrike" cap="none" spc="0" baseline="0">
+        <a:defRPr b="0" baseline="0" cap="none" i="0" spc="0" strike="noStrike" sz="1600" u="none">
+          <a:ln>
+            <a:noFill/>
+          </a:ln>
           <a:solidFill>
             <a:schemeClr val="tx1"/>
           </a:solidFill>
@@ -2949,7 +2974,7 @@
           <a:sym typeface="Helvetica Neue Light"/>
         </a:defRPr>
       </a:lvl7pPr>
-      <a:lvl8pPr marL="0" marR="0" indent="1600200" algn="ctr" defTabSz="584200" latinLnBrk="0">
+      <a:lvl8pPr marL="0" marR="0" indent="0" algn="ctr" defTabSz="584200" rtl="0" latinLnBrk="0">
         <a:lnSpc>
           <a:spcPct val="100000"/>
         </a:lnSpc>
@@ -2964,7 +2989,10 @@
         <a:buFontTx/>
         <a:buNone/>
         <a:tabLst/>
-        <a:defRPr sz="1600" b="0" i="0" u="none" strike="noStrike" cap="none" spc="0" baseline="0">
+        <a:defRPr b="0" baseline="0" cap="none" i="0" spc="0" strike="noStrike" sz="1600" u="none">
+          <a:ln>
+            <a:noFill/>
+          </a:ln>
           <a:solidFill>
             <a:schemeClr val="tx1"/>
           </a:solidFill>
@@ -2975,7 +3003,7 @@
           <a:sym typeface="Helvetica Neue Light"/>
         </a:defRPr>
       </a:lvl8pPr>
-      <a:lvl9pPr marL="0" marR="0" indent="1828800" algn="ctr" defTabSz="584200" latinLnBrk="0">
+      <a:lvl9pPr marL="0" marR="0" indent="0" algn="ctr" defTabSz="584200" rtl="0" latinLnBrk="0">
         <a:lnSpc>
           <a:spcPct val="100000"/>
         </a:lnSpc>
@@ -2990,7 +3018,10 @@
         <a:buFontTx/>
         <a:buNone/>
         <a:tabLst/>
-        <a:defRPr sz="1600" b="0" i="0" u="none" strike="noStrike" cap="none" spc="0" baseline="0">
+        <a:defRPr b="0" baseline="0" cap="none" i="0" spc="0" strike="noStrike" sz="1600" u="none">
+          <a:ln>
+            <a:noFill/>
+          </a:ln>
           <a:solidFill>
             <a:schemeClr val="tx1"/>
           </a:solidFill>
@@ -3007,7 +3038,7 @@
 </file>
 
 <file path=ppt/slides/slide1.xml><?xml version="1.0" encoding="utf-8"?>
-<p:sld xmlns:a="http://schemas.openxmlformats.org/drawingml/2006/main" xmlns:r="http://schemas.openxmlformats.org/officeDocument/2006/relationships" xmlns:p="http://schemas.openxmlformats.org/presentationml/2006/main">
+<p:sld xmlns:a="http://schemas.openxmlformats.org/drawingml/2006/main" xmlns:r="http://schemas.openxmlformats.org/officeDocument/2006/relationships" xmlns:p="http://schemas.openxmlformats.org/presentationml/2006/main" showMasterSp="1" showMasterPhAnim="1">
   <p:cSld>
     <p:spTree>
       <p:nvGrpSpPr>
@@ -3026,17 +3057,15 @@
       <p:sp>
         <p:nvSpPr>
           <p:cNvPr id="119" name="Whatsapp2.0"/>
-          <p:cNvSpPr txBox="1">
-            <a:spLocks noGrp="1"/>
-          </p:cNvSpPr>
+          <p:cNvSpPr txBox="1"/>
           <p:nvPr>
             <p:ph type="ctrTitle"/>
           </p:nvPr>
         </p:nvSpPr>
         <p:spPr>
           <a:xfrm>
-            <a:off x="1270000" y="5312568"/>
-            <a:ext cx="10464800" cy="1365698"/>
+            <a:off x="1270000" y="5312567"/>
+            <a:ext cx="10464800" cy="1365699"/>
           </a:xfrm>
           <a:prstGeom prst="rect">
             <a:avLst/>
@@ -3046,6 +3075,7 @@
           <a:bodyPr/>
           <a:lstStyle/>
           <a:p>
+            <a:pPr/>
             <a:r>
               <a:t>Whatsapp2.0</a:t>
             </a:r>
@@ -3055,9 +3085,7 @@
       <p:sp>
         <p:nvSpPr>
           <p:cNvPr id="120" name="Giaccari, Giaccari, Marussich"/>
-          <p:cNvSpPr txBox="1">
-            <a:spLocks noGrp="1"/>
-          </p:cNvSpPr>
+          <p:cNvSpPr txBox="1"/>
           <p:nvPr>
             <p:ph type="subTitle" sz="quarter" idx="1"/>
           </p:nvPr>
@@ -3065,7 +3093,7 @@
         <p:spPr>
           <a:xfrm>
             <a:off x="1270000" y="6754465"/>
-            <a:ext cx="10464800" cy="1130301"/>
+            <a:ext cx="10464800" cy="1130302"/>
           </a:xfrm>
           <a:prstGeom prst="rect">
             <a:avLst/>
@@ -3079,6 +3107,7 @@
             </a:lvl1pPr>
           </a:lstStyle>
           <a:p>
+            <a:pPr/>
             <a:r>
               <a:t>Giaccari, Giaccari, Marussich</a:t>
             </a:r>
@@ -3094,15 +3123,17 @@
           <p:nvPr/>
         </p:nvPicPr>
         <p:blipFill>
-          <a:blip r:embed="rId2"/>
+          <a:blip r:embed="rId2">
+            <a:extLst/>
+          </a:blip>
           <a:stretch>
             <a:fillRect/>
           </a:stretch>
         </p:blipFill>
         <p:spPr>
           <a:xfrm>
-            <a:off x="4502814" y="1242665"/>
-            <a:ext cx="3999173" cy="4093270"/>
+            <a:off x="4502813" y="1242665"/>
+            <a:ext cx="3999174" cy="4093270"/>
           </a:xfrm>
           <a:prstGeom prst="rect">
             <a:avLst/>
@@ -3117,12 +3148,12 @@
   <p:clrMapOvr>
     <a:masterClrMapping/>
   </p:clrMapOvr>
-  <p:transition spd="med"/>
+  <p:transition xmlns:p14="http://schemas.microsoft.com/office/powerpoint/2010/main" spd="med" advClick="1"/>
 </p:sld>
 </file>
 
 <file path=ppt/slides/slide10.xml><?xml version="1.0" encoding="utf-8"?>
-<p:sld xmlns:a="http://schemas.openxmlformats.org/drawingml/2006/main" xmlns:r="http://schemas.openxmlformats.org/officeDocument/2006/relationships" xmlns:p="http://schemas.openxmlformats.org/presentationml/2006/main">
+<p:sld xmlns:a="http://schemas.openxmlformats.org/drawingml/2006/main" xmlns:r="http://schemas.openxmlformats.org/officeDocument/2006/relationships" xmlns:p="http://schemas.openxmlformats.org/presentationml/2006/main" showMasterSp="1" showMasterPhAnim="1">
   <p:cSld>
     <p:spTree>
       <p:nvGrpSpPr>
@@ -3140,14 +3171,14 @@
       </p:grpSpPr>
       <p:sp>
         <p:nvSpPr>
-          <p:cNvPr id="145" name="Esempi - Ban"/>
+          <p:cNvPr id="147" name="Esempi - Ban"/>
           <p:cNvSpPr txBox="1"/>
           <p:nvPr/>
         </p:nvSpPr>
         <p:spPr>
           <a:xfrm>
-            <a:off x="3753250" y="264200"/>
-            <a:ext cx="5498301" cy="779701"/>
+            <a:off x="3801847" y="268455"/>
+            <a:ext cx="5401107" cy="771191"/>
           </a:xfrm>
           <a:prstGeom prst="rect">
             <a:avLst/>
@@ -3157,7 +3188,7 @@
           </a:ln>
           <a:extLst>
             <a:ext uri="{C572A759-6A51-4108-AA02-DFA0A04FC94B}">
-              <ma14:wrappingTextBoxFlag xmlns:ma14="http://schemas.microsoft.com/office/mac/drawingml/2011/main" xmlns:a14="http://schemas.microsoft.com/office/drawing/2010/main" xmlns:m="http://schemas.openxmlformats.org/officeDocument/2006/math" xmlns="" val="1"/>
+              <ma14:wrappingTextBoxFlag xmlns:ma14="http://schemas.microsoft.com/office/mac/drawingml/2011/main" val="1"/>
             </a:ext>
           </a:extLst>
         </p:spPr>
@@ -3165,52 +3196,43 @@
           <a:bodyPr wrap="none" lIns="50800" tIns="50800" rIns="50800" bIns="50800" anchor="ctr">
             <a:spAutoFit/>
           </a:bodyPr>
-          <a:lstStyle>
-            <a:lvl1pPr>
-              <a:defRPr sz="4400"/>
-            </a:lvl1pPr>
-          </a:lstStyle>
-          <a:p>
-            <a:r>
-              <a:rPr dirty="0" err="1"/>
-              <a:t>Esempi</a:t>
-            </a:r>
-            <a:r>
-              <a:rPr dirty="0"/>
-              <a:t> </a:t>
-            </a:r>
-            <a:r>
-              <a:rPr lang="it-IT" dirty="0"/>
+          <a:lstStyle/>
+          <a:p>
+            <a:pPr>
+              <a:defRPr b="1" sz="4400">
+                <a:latin typeface="+mn-lt"/>
+                <a:ea typeface="+mn-ea"/>
+                <a:cs typeface="+mn-cs"/>
+                <a:sym typeface="Helvetica Neue"/>
+              </a:defRPr>
+            </a:pPr>
+            <a:r>
+              <a:t>Esempi </a:t>
+            </a:r>
+            <a:r>
               <a:t>–</a:t>
             </a:r>
             <a:r>
-              <a:rPr dirty="0"/>
               <a:t> Ban</a:t>
             </a:r>
             <a:r>
-              <a:rPr lang="it-IT" dirty="0"/>
               <a:t> utenti</a:t>
             </a:r>
-            <a:endParaRPr dirty="0"/>
           </a:p>
         </p:txBody>
       </p:sp>
       <p:pic>
         <p:nvPicPr>
-          <p:cNvPr id="3" name="Picture 2">
-            <a:extLst>
-              <a:ext uri="{FF2B5EF4-FFF2-40B4-BE49-F238E27FC236}">
-                <a16:creationId xmlns:a16="http://schemas.microsoft.com/office/drawing/2014/main" id="{076D4123-E306-74AE-CEF9-30E45D18B437}"/>
-              </a:ext>
-            </a:extLst>
-          </p:cNvPr>
+          <p:cNvPr id="148" name="Picture 2" descr="Picture 2"/>
           <p:cNvPicPr>
             <a:picLocks noChangeAspect="1"/>
           </p:cNvPicPr>
           <p:nvPr/>
         </p:nvPicPr>
         <p:blipFill>
-          <a:blip r:embed="rId2"/>
+          <a:blip r:embed="rId2">
+            <a:extLst/>
+          </a:blip>
           <a:stretch>
             <a:fillRect/>
           </a:stretch>
@@ -3218,29 +3240,27 @@
         <p:spPr>
           <a:xfrm>
             <a:off x="444188" y="1611087"/>
-            <a:ext cx="12116423" cy="5647086"/>
+            <a:ext cx="12116424" cy="5647086"/>
           </a:xfrm>
           <a:prstGeom prst="rect">
             <a:avLst/>
           </a:prstGeom>
+          <a:ln w="12700">
+            <a:miter lim="400000"/>
+          </a:ln>
         </p:spPr>
       </p:pic>
     </p:spTree>
-    <p:extLst>
-      <p:ext uri="{BB962C8B-B14F-4D97-AF65-F5344CB8AC3E}">
-        <p14:creationId xmlns:p14="http://schemas.microsoft.com/office/powerpoint/2010/main" val="2582154103"/>
-      </p:ext>
-    </p:extLst>
   </p:cSld>
   <p:clrMapOvr>
     <a:masterClrMapping/>
   </p:clrMapOvr>
-  <p:transition spd="med"/>
+  <p:transition xmlns:p14="http://schemas.microsoft.com/office/powerpoint/2010/main" spd="med" advClick="1"/>
 </p:sld>
 </file>
 
 <file path=ppt/slides/slide11.xml><?xml version="1.0" encoding="utf-8"?>
-<p:sld xmlns:a="http://schemas.openxmlformats.org/drawingml/2006/main" xmlns:r="http://schemas.openxmlformats.org/officeDocument/2006/relationships" xmlns:p="http://schemas.openxmlformats.org/presentationml/2006/main">
+<p:sld xmlns:a="http://schemas.openxmlformats.org/drawingml/2006/main" xmlns:r="http://schemas.openxmlformats.org/officeDocument/2006/relationships" xmlns:p="http://schemas.openxmlformats.org/presentationml/2006/main" showMasterSp="1" showMasterPhAnim="1">
   <p:cSld>
     <p:spTree>
       <p:nvGrpSpPr>
@@ -3258,14 +3278,14 @@
       </p:grpSpPr>
       <p:sp>
         <p:nvSpPr>
-          <p:cNvPr id="147" name="Difficoltà"/>
+          <p:cNvPr id="150" name="Difficoltà"/>
           <p:cNvSpPr txBox="1"/>
           <p:nvPr/>
         </p:nvSpPr>
         <p:spPr>
           <a:xfrm>
-            <a:off x="5254447" y="268454"/>
-            <a:ext cx="2495906" cy="771192"/>
+            <a:off x="5251094" y="268454"/>
+            <a:ext cx="2502612" cy="771192"/>
           </a:xfrm>
           <a:prstGeom prst="rect">
             <a:avLst/>
@@ -3275,7 +3295,7 @@
           </a:ln>
           <a:extLst>
             <a:ext uri="{C572A759-6A51-4108-AA02-DFA0A04FC94B}">
-              <ma14:wrappingTextBoxFlag xmlns:ma14="http://schemas.microsoft.com/office/mac/drawingml/2011/main" xmlns:a14="http://schemas.microsoft.com/office/drawing/2010/main" xmlns:m="http://schemas.openxmlformats.org/officeDocument/2006/math" xmlns="" val="1"/>
+              <ma14:wrappingTextBoxFlag xmlns:ma14="http://schemas.microsoft.com/office/mac/drawingml/2011/main" val="1"/>
             </a:ext>
           </a:extLst>
         </p:spPr>
@@ -3285,10 +3305,16 @@
           </a:bodyPr>
           <a:lstStyle>
             <a:lvl1pPr>
-              <a:defRPr sz="4400"/>
+              <a:defRPr b="1" sz="4400">
+                <a:latin typeface="+mn-lt"/>
+                <a:ea typeface="+mn-ea"/>
+                <a:cs typeface="+mn-cs"/>
+                <a:sym typeface="Helvetica Neue"/>
+              </a:defRPr>
             </a:lvl1pPr>
           </a:lstStyle>
           <a:p>
+            <a:pPr/>
             <a:r>
               <a:t>Difficoltà</a:t>
             </a:r>
@@ -3297,13 +3323,13 @@
       </p:sp>
       <p:sp>
         <p:nvSpPr>
-          <p:cNvPr id="148" name="Entrare nel ‘flow’ del progetto…"/>
+          <p:cNvPr id="151" name="Entrare nel ‘flow’ del progetto…"/>
           <p:cNvSpPr txBox="1"/>
           <p:nvPr/>
         </p:nvSpPr>
         <p:spPr>
           <a:xfrm>
-            <a:off x="990234" y="2068327"/>
+            <a:off x="1028333" y="1661927"/>
             <a:ext cx="8066660" cy="3795265"/>
           </a:xfrm>
           <a:prstGeom prst="rect">
@@ -3314,7 +3340,7 @@
           </a:ln>
           <a:extLst>
             <a:ext uri="{C572A759-6A51-4108-AA02-DFA0A04FC94B}">
-              <ma14:wrappingTextBoxFlag xmlns:ma14="http://schemas.microsoft.com/office/mac/drawingml/2011/main" xmlns:a14="http://schemas.microsoft.com/office/drawing/2010/main" xmlns:m="http://schemas.openxmlformats.org/officeDocument/2006/math" xmlns="" val="1"/>
+              <ma14:wrappingTextBoxFlag xmlns:ma14="http://schemas.microsoft.com/office/mac/drawingml/2011/main" val="1"/>
             </a:ext>
           </a:extLst>
         </p:spPr>
@@ -3327,7 +3353,12 @@
             <a:pPr marL="333375" indent="-333375" algn="l">
               <a:buSzPct val="145000"/>
               <a:buChar char="•"/>
-              <a:defRPr sz="4000" b="0"/>
+              <a:defRPr sz="4000">
+                <a:latin typeface="+mn-lt"/>
+                <a:ea typeface="+mn-ea"/>
+                <a:cs typeface="+mn-cs"/>
+                <a:sym typeface="Helvetica Neue"/>
+              </a:defRPr>
             </a:pPr>
             <a:r>
               <a:t>Entrare nel ‘</a:t>
@@ -3341,20 +3372,30 @@
             </a:r>
           </a:p>
           <a:p>
-            <a:pPr marL="777875" lvl="1" indent="-333375" algn="l">
+            <a:pPr lvl="1" marL="777875" indent="-333375" algn="l">
               <a:buSzPct val="145000"/>
               <a:buChar char="•"/>
-              <a:defRPr sz="4000" b="0"/>
+              <a:defRPr sz="4000">
+                <a:latin typeface="+mn-lt"/>
+                <a:ea typeface="+mn-ea"/>
+                <a:cs typeface="+mn-cs"/>
+                <a:sym typeface="Helvetica Neue"/>
+              </a:defRPr>
             </a:pPr>
             <a:r>
               <a:t>linguaggio nuovo</a:t>
             </a:r>
           </a:p>
           <a:p>
-            <a:pPr marL="777875" lvl="1" indent="-333375" algn="l">
+            <a:pPr lvl="1" marL="777875" indent="-333375" algn="l">
               <a:buSzPct val="145000"/>
               <a:buChar char="•"/>
-              <a:defRPr sz="4000" b="0"/>
+              <a:defRPr sz="4000">
+                <a:latin typeface="+mn-lt"/>
+                <a:ea typeface="+mn-ea"/>
+                <a:cs typeface="+mn-cs"/>
+                <a:sym typeface="Helvetica Neue"/>
+              </a:defRPr>
             </a:pPr>
             <a:r>
               <a:t>tante idee</a:t>
@@ -3364,7 +3405,12 @@
             <a:pPr marL="333375" indent="-333375" algn="l">
               <a:buSzPct val="145000"/>
               <a:buChar char="•"/>
-              <a:defRPr sz="4000" b="0"/>
+              <a:defRPr sz="4000">
+                <a:latin typeface="+mn-lt"/>
+                <a:ea typeface="+mn-ea"/>
+                <a:cs typeface="+mn-cs"/>
+                <a:sym typeface="Helvetica Neue"/>
+              </a:defRPr>
             </a:pPr>
             <a:r>
               <a:t>Condivisione (</a:t>
@@ -3381,13 +3427,18 @@
             <a:pPr marL="333375" indent="-333375" algn="l">
               <a:buSzPct val="145000"/>
               <a:buChar char="•"/>
-              <a:defRPr sz="4000" b="0"/>
+              <a:defRPr b="1" sz="4000">
+                <a:latin typeface="+mn-lt"/>
+                <a:ea typeface="+mn-ea"/>
+                <a:cs typeface="+mn-cs"/>
+                <a:sym typeface="Helvetica Neue"/>
+              </a:defRPr>
             </a:pPr>
             <a:r>
-              <a:rPr b="1"/>
               <a:t>Streamlit</a:t>
             </a:r>
             <a:r>
+              <a:rPr b="0"/>
               <a:t> (limitazioni DataFrame)</a:t>
             </a:r>
           </a:p>
@@ -3395,13 +3446,18 @@
             <a:pPr marL="333375" indent="-333375" algn="l">
               <a:buSzPct val="145000"/>
               <a:buChar char="•"/>
-              <a:defRPr sz="4000" b="0"/>
+              <a:defRPr b="1" sz="4000">
+                <a:latin typeface="+mn-lt"/>
+                <a:ea typeface="+mn-ea"/>
+                <a:cs typeface="+mn-cs"/>
+                <a:sym typeface="Helvetica Neue"/>
+              </a:defRPr>
             </a:pPr>
             <a:r>
-              <a:rPr b="1"/>
               <a:t>Ruoli</a:t>
             </a:r>
             <a:r>
+              <a:rPr b="0"/>
               <a:t> non chiaramente distinti</a:t>
             </a:r>
           </a:p>
@@ -3412,12 +3468,12 @@
   <p:clrMapOvr>
     <a:masterClrMapping/>
   </p:clrMapOvr>
-  <p:transition spd="med"/>
+  <p:transition xmlns:p14="http://schemas.microsoft.com/office/powerpoint/2010/main" spd="med" advClick="1"/>
 </p:sld>
 </file>
 
 <file path=ppt/slides/slide12.xml><?xml version="1.0" encoding="utf-8"?>
-<p:sld xmlns:a="http://schemas.openxmlformats.org/drawingml/2006/main" xmlns:r="http://schemas.openxmlformats.org/officeDocument/2006/relationships" xmlns:p="http://schemas.openxmlformats.org/presentationml/2006/main">
+<p:sld xmlns:a="http://schemas.openxmlformats.org/drawingml/2006/main" xmlns:r="http://schemas.openxmlformats.org/officeDocument/2006/relationships" xmlns:p="http://schemas.openxmlformats.org/presentationml/2006/main" showMasterSp="1" showMasterPhAnim="1">
   <p:cSld>
     <p:spTree>
       <p:nvGrpSpPr>
@@ -3435,18 +3491,16 @@
       </p:grpSpPr>
       <p:sp>
         <p:nvSpPr>
-          <p:cNvPr id="150" name="Grazie per l’attenzione"/>
-          <p:cNvSpPr txBox="1">
-            <a:spLocks noGrp="1"/>
-          </p:cNvSpPr>
+          <p:cNvPr id="153" name="Grazie per l’attenzione"/>
+          <p:cNvSpPr txBox="1"/>
           <p:nvPr>
             <p:ph type="ctrTitle"/>
           </p:nvPr>
         </p:nvSpPr>
         <p:spPr>
           <a:xfrm>
-            <a:off x="1148134" y="4245644"/>
-            <a:ext cx="10708532" cy="1262312"/>
+            <a:off x="1148134" y="4245643"/>
+            <a:ext cx="10708532" cy="1262313"/>
           </a:xfrm>
           <a:prstGeom prst="rect">
             <a:avLst/>
@@ -3460,6 +3514,7 @@
             </a:lvl1pPr>
           </a:lstStyle>
           <a:p>
+            <a:pPr/>
             <a:r>
               <a:t>Grazie per l’attenzione</a:t>
             </a:r>
@@ -3471,12 +3526,12 @@
   <p:clrMapOvr>
     <a:masterClrMapping/>
   </p:clrMapOvr>
-  <p:transition spd="med"/>
+  <p:transition xmlns:p14="http://schemas.microsoft.com/office/powerpoint/2010/main" spd="med" advClick="1"/>
 </p:sld>
 </file>
 
 <file path=ppt/slides/slide2.xml><?xml version="1.0" encoding="utf-8"?>
-<p:sld xmlns:a="http://schemas.openxmlformats.org/drawingml/2006/main" xmlns:r="http://schemas.openxmlformats.org/officeDocument/2006/relationships" xmlns:p="http://schemas.openxmlformats.org/presentationml/2006/main">
+<p:sld xmlns:a="http://schemas.openxmlformats.org/drawingml/2006/main" xmlns:r="http://schemas.openxmlformats.org/officeDocument/2006/relationships" xmlns:p="http://schemas.openxmlformats.org/presentationml/2006/main" showMasterSp="1" showMasterPhAnim="1">
   <p:cSld>
     <p:spTree>
       <p:nvGrpSpPr>
@@ -3501,7 +3556,9 @@
           <p:nvPr/>
         </p:nvPicPr>
         <p:blipFill>
-          <a:blip r:embed="rId2"/>
+          <a:blip r:embed="rId2">
+            <a:extLst/>
+          </a:blip>
           <a:stretch>
             <a:fillRect/>
           </a:stretch>
@@ -3509,7 +3566,7 @@
         <p:spPr>
           <a:xfrm>
             <a:off x="77737" y="1392571"/>
-            <a:ext cx="12849326" cy="6968458"/>
+            <a:ext cx="12849326" cy="6968459"/>
           </a:xfrm>
           <a:prstGeom prst="rect">
             <a:avLst/>
@@ -3527,7 +3584,7 @@
         </p:nvSpPr>
         <p:spPr>
           <a:xfrm>
-            <a:off x="4552314" y="268454"/>
+            <a:off x="4552313" y="268453"/>
             <a:ext cx="3900171" cy="771192"/>
           </a:xfrm>
           <a:prstGeom prst="rect">
@@ -3538,7 +3595,7 @@
           </a:ln>
           <a:extLst>
             <a:ext uri="{C572A759-6A51-4108-AA02-DFA0A04FC94B}">
-              <ma14:wrappingTextBoxFlag xmlns:ma14="http://schemas.microsoft.com/office/mac/drawingml/2011/main" xmlns:a14="http://schemas.microsoft.com/office/drawing/2010/main" xmlns:m="http://schemas.openxmlformats.org/officeDocument/2006/math" xmlns="" val="1"/>
+              <ma14:wrappingTextBoxFlag xmlns:ma14="http://schemas.microsoft.com/office/mac/drawingml/2011/main" val="1"/>
             </a:ext>
           </a:extLst>
         </p:spPr>
@@ -3548,10 +3605,16 @@
           </a:bodyPr>
           <a:lstStyle>
             <a:lvl1pPr>
-              <a:defRPr sz="4400"/>
+              <a:defRPr b="1" sz="4400">
+                <a:latin typeface="+mn-lt"/>
+                <a:ea typeface="+mn-ea"/>
+                <a:cs typeface="+mn-cs"/>
+                <a:sym typeface="Helvetica Neue"/>
+              </a:defRPr>
             </a:lvl1pPr>
           </a:lstStyle>
           <a:p>
+            <a:pPr/>
             <a:r>
               <a:t>Brainstorming</a:t>
             </a:r>
@@ -3563,12 +3626,12 @@
   <p:clrMapOvr>
     <a:masterClrMapping/>
   </p:clrMapOvr>
-  <p:transition spd="med"/>
+  <p:transition xmlns:p14="http://schemas.microsoft.com/office/powerpoint/2010/main" spd="med" advClick="1"/>
 </p:sld>
 </file>
 
 <file path=ppt/slides/slide3.xml><?xml version="1.0" encoding="utf-8"?>
-<p:sld xmlns:a="http://schemas.openxmlformats.org/drawingml/2006/main" xmlns:r="http://schemas.openxmlformats.org/officeDocument/2006/relationships" xmlns:p="http://schemas.openxmlformats.org/presentationml/2006/main">
+<p:sld xmlns:a="http://schemas.openxmlformats.org/drawingml/2006/main" xmlns:r="http://schemas.openxmlformats.org/officeDocument/2006/relationships" xmlns:p="http://schemas.openxmlformats.org/presentationml/2006/main" showMasterSp="1" showMasterPhAnim="1">
   <p:cSld>
     <p:spTree>
       <p:nvGrpSpPr>
@@ -3593,8 +3656,10 @@
           <p:nvPr/>
         </p:nvPicPr>
         <p:blipFill>
-          <a:blip r:embed="rId2"/>
-          <a:srcRect t="8783" b="1574"/>
+          <a:blip r:embed="rId2">
+            <a:extLst/>
+          </a:blip>
+          <a:srcRect l="0" t="8783" r="0" b="1574"/>
           <a:stretch>
             <a:fillRect/>
           </a:stretch>
@@ -3602,7 +3667,7 @@
         <p:spPr>
           <a:xfrm>
             <a:off x="2631281" y="1072280"/>
-            <a:ext cx="7742199" cy="8638099"/>
+            <a:ext cx="7742199" cy="8638100"/>
           </a:xfrm>
           <a:prstGeom prst="rect">
             <a:avLst/>
@@ -3620,8 +3685,8 @@
         </p:nvSpPr>
         <p:spPr>
           <a:xfrm>
-            <a:off x="2545664" y="268454"/>
-            <a:ext cx="7913472" cy="771192"/>
+            <a:off x="2545663" y="268453"/>
+            <a:ext cx="7913473" cy="771192"/>
           </a:xfrm>
           <a:prstGeom prst="rect">
             <a:avLst/>
@@ -3631,7 +3696,7 @@
           </a:ln>
           <a:extLst>
             <a:ext uri="{C572A759-6A51-4108-AA02-DFA0A04FC94B}">
-              <ma14:wrappingTextBoxFlag xmlns:ma14="http://schemas.microsoft.com/office/mac/drawingml/2011/main" xmlns:a14="http://schemas.microsoft.com/office/drawing/2010/main" xmlns:m="http://schemas.openxmlformats.org/officeDocument/2006/math" xmlns="" val="1"/>
+              <ma14:wrappingTextBoxFlag xmlns:ma14="http://schemas.microsoft.com/office/mac/drawingml/2011/main" val="1"/>
             </a:ext>
           </a:extLst>
         </p:spPr>
@@ -3641,10 +3706,16 @@
           </a:bodyPr>
           <a:lstStyle>
             <a:lvl1pPr>
-              <a:defRPr sz="4400"/>
+              <a:defRPr b="1" sz="4400">
+                <a:latin typeface="+mn-lt"/>
+                <a:ea typeface="+mn-ea"/>
+                <a:cs typeface="+mn-cs"/>
+                <a:sym typeface="Helvetica Neue"/>
+              </a:defRPr>
             </a:lvl1pPr>
           </a:lstStyle>
           <a:p>
+            <a:pPr/>
             <a:r>
               <a:t>Flowchart di un tipico utilizzo</a:t>
             </a:r>
@@ -3656,12 +3727,12 @@
   <p:clrMapOvr>
     <a:masterClrMapping/>
   </p:clrMapOvr>
-  <p:transition spd="med"/>
+  <p:transition xmlns:p14="http://schemas.microsoft.com/office/powerpoint/2010/main" spd="med" advClick="1"/>
 </p:sld>
 </file>
 
 <file path=ppt/slides/slide4.xml><?xml version="1.0" encoding="utf-8"?>
-<p:sld xmlns:a="http://schemas.openxmlformats.org/drawingml/2006/main" xmlns:r="http://schemas.openxmlformats.org/officeDocument/2006/relationships" xmlns:p="http://schemas.openxmlformats.org/presentationml/2006/main">
+<p:sld xmlns:a="http://schemas.openxmlformats.org/drawingml/2006/main" xmlns:r="http://schemas.openxmlformats.org/officeDocument/2006/relationships" xmlns:p="http://schemas.openxmlformats.org/presentationml/2006/main" showMasterSp="1" showMasterPhAnim="1">
   <p:cSld>
     <p:spTree>
       <p:nvGrpSpPr>
@@ -3685,7 +3756,7 @@
         </p:nvSpPr>
         <p:spPr>
           <a:xfrm>
-            <a:off x="4831435" y="268454"/>
+            <a:off x="4831434" y="268453"/>
             <a:ext cx="3341930" cy="771192"/>
           </a:xfrm>
           <a:prstGeom prst="rect">
@@ -3696,7 +3767,7 @@
           </a:ln>
           <a:extLst>
             <a:ext uri="{C572A759-6A51-4108-AA02-DFA0A04FC94B}">
-              <ma14:wrappingTextBoxFlag xmlns:ma14="http://schemas.microsoft.com/office/mac/drawingml/2011/main" xmlns:a14="http://schemas.microsoft.com/office/drawing/2010/main" xmlns:m="http://schemas.openxmlformats.org/officeDocument/2006/math" xmlns="" val="1"/>
+              <ma14:wrappingTextBoxFlag xmlns:ma14="http://schemas.microsoft.com/office/mac/drawingml/2011/main" val="1"/>
             </a:ext>
           </a:extLst>
         </p:spPr>
@@ -3706,10 +3777,16 @@
           </a:bodyPr>
           <a:lstStyle>
             <a:lvl1pPr>
-              <a:defRPr sz="4400"/>
+              <a:defRPr b="1" sz="4400">
+                <a:latin typeface="+mn-lt"/>
+                <a:ea typeface="+mn-ea"/>
+                <a:cs typeface="+mn-cs"/>
+                <a:sym typeface="Helvetica Neue"/>
+              </a:defRPr>
             </a:lvl1pPr>
           </a:lstStyle>
           <a:p>
+            <a:pPr/>
             <a:r>
               <a:t>Funzionalità</a:t>
             </a:r>
@@ -3724,8 +3801,8 @@
         </p:nvSpPr>
         <p:spPr>
           <a:xfrm>
-            <a:off x="990234" y="1476422"/>
-            <a:ext cx="8338821" cy="5027017"/>
+            <a:off x="990233" y="1507842"/>
+            <a:ext cx="8501508" cy="4964177"/>
           </a:xfrm>
           <a:prstGeom prst="rect">
             <a:avLst/>
@@ -3735,7 +3812,7 @@
           </a:ln>
           <a:extLst>
             <a:ext uri="{C572A759-6A51-4108-AA02-DFA0A04FC94B}">
-              <ma14:wrappingTextBoxFlag xmlns:ma14="http://schemas.microsoft.com/office/mac/drawingml/2011/main" xmlns:a14="http://schemas.microsoft.com/office/drawing/2010/main" xmlns:m="http://schemas.openxmlformats.org/officeDocument/2006/math" xmlns="" val="1"/>
+              <ma14:wrappingTextBoxFlag xmlns:ma14="http://schemas.microsoft.com/office/mac/drawingml/2011/main" val="1"/>
             </a:ext>
           </a:extLst>
         </p:spPr>
@@ -3748,142 +3825,121 @@
             <a:pPr marL="333375" indent="-333375" algn="l">
               <a:buSzPct val="145000"/>
               <a:buChar char="•"/>
-              <a:defRPr sz="4000" b="0"/>
+              <a:defRPr sz="4000">
+                <a:latin typeface="+mn-lt"/>
+                <a:ea typeface="+mn-ea"/>
+                <a:cs typeface="+mn-cs"/>
+                <a:sym typeface="Helvetica Neue"/>
+              </a:defRPr>
             </a:pPr>
             <a:r>
-              <a:rPr lang="it-IT" dirty="0"/>
-              <a:t>Tre</a:t>
-            </a:r>
-            <a:r>
-              <a:rPr dirty="0"/>
-              <a:t> </a:t>
-            </a:r>
-            <a:r>
-              <a:rPr dirty="0" err="1"/>
-              <a:t>pagine</a:t>
-            </a:r>
-            <a:r>
-              <a:rPr dirty="0"/>
-              <a:t>:</a:t>
-            </a:r>
-          </a:p>
-          <a:p>
-            <a:pPr marL="777875" lvl="1" indent="-333375" algn="l">
+              <a:t>Tre pagine:</a:t>
+            </a:r>
+          </a:p>
+          <a:p>
+            <a:pPr lvl="1" marL="777875" indent="-333375" algn="l">
               <a:buSzPct val="145000"/>
               <a:buChar char="•"/>
-              <a:defRPr sz="4000" b="0"/>
+              <a:defRPr sz="4000">
+                <a:latin typeface="+mn-lt"/>
+                <a:ea typeface="+mn-ea"/>
+                <a:cs typeface="+mn-cs"/>
+                <a:sym typeface="Helvetica Neue"/>
+              </a:defRPr>
             </a:pPr>
             <a:r>
-              <a:rPr dirty="0" err="1"/>
-              <a:t>Registrazione</a:t>
-            </a:r>
-            <a:r>
-              <a:rPr dirty="0"/>
-              <a:t>, </a:t>
-            </a:r>
-            <a:r>
-              <a:rPr dirty="0" err="1"/>
-              <a:t>autenticazione</a:t>
-            </a:r>
-            <a:endParaRPr dirty="0"/>
-          </a:p>
-          <a:p>
-            <a:pPr marL="777875" lvl="1" indent="-333375" algn="l">
+              <a:t>Registrazione, autenticazione</a:t>
+            </a:r>
+          </a:p>
+          <a:p>
+            <a:pPr lvl="1" marL="777875" indent="-333375" algn="l">
               <a:buSzPct val="145000"/>
               <a:buChar char="•"/>
-              <a:defRPr sz="4000" b="0"/>
+              <a:defRPr sz="4000">
+                <a:latin typeface="+mn-lt"/>
+                <a:ea typeface="+mn-ea"/>
+                <a:cs typeface="+mn-cs"/>
+                <a:sym typeface="Helvetica Neue"/>
+              </a:defRPr>
             </a:pPr>
             <a:r>
-              <a:rPr dirty="0"/>
-              <a:t>Chat </a:t>
-            </a:r>
-            <a:r>
-              <a:rPr dirty="0" err="1"/>
-              <a:t>globale</a:t>
-            </a:r>
-            <a:r>
-              <a:rPr dirty="0"/>
-              <a:t>, logout</a:t>
-            </a:r>
-            <a:endParaRPr lang="it-IT" dirty="0"/>
-          </a:p>
-          <a:p>
-            <a:pPr marL="777875" lvl="1" indent="-333375" algn="l">
+              <a:t>Chat globale, logout</a:t>
+            </a:r>
+          </a:p>
+          <a:p>
+            <a:pPr lvl="1" marL="777875" indent="-333375" algn="l">
               <a:buSzPct val="145000"/>
               <a:buChar char="•"/>
-              <a:defRPr sz="4000" b="0"/>
+              <a:defRPr sz="4000">
+                <a:latin typeface="+mn-lt"/>
+                <a:ea typeface="+mn-ea"/>
+                <a:cs typeface="+mn-cs"/>
+                <a:sym typeface="Helvetica Neue"/>
+              </a:defRPr>
             </a:pPr>
             <a:r>
-              <a:rPr lang="it-IT" dirty="0"/>
               <a:t>Gestione utenti</a:t>
             </a:r>
-            <a:endParaRPr dirty="0"/>
           </a:p>
           <a:p>
             <a:pPr marL="333375" indent="-333375" algn="l">
               <a:buSzPct val="145000"/>
               <a:buChar char="•"/>
-              <a:defRPr sz="4000" b="0"/>
+              <a:defRPr sz="4000">
+                <a:latin typeface="+mn-lt"/>
+                <a:ea typeface="+mn-ea"/>
+                <a:cs typeface="+mn-cs"/>
+                <a:sym typeface="Helvetica Neue"/>
+              </a:defRPr>
             </a:pPr>
             <a:r>
-              <a:rPr dirty="0" err="1"/>
-              <a:t>Salvataggio</a:t>
-            </a:r>
-            <a:r>
-              <a:rPr dirty="0"/>
-              <a:t> log chat e </a:t>
-            </a:r>
-            <a:r>
-              <a:rPr dirty="0" err="1"/>
-              <a:t>utenti</a:t>
-            </a:r>
-            <a:r>
-              <a:rPr dirty="0"/>
-              <a:t> in csv</a:t>
+              <a:t>Salvataggio log chat e utenti in csv</a:t>
             </a:r>
           </a:p>
           <a:p>
             <a:pPr marL="333375" indent="-333375" algn="l">
               <a:buSzPct val="145000"/>
               <a:buChar char="•"/>
-              <a:defRPr sz="4000" b="0"/>
+              <a:defRPr sz="4000">
+                <a:latin typeface="+mn-lt"/>
+                <a:ea typeface="+mn-ea"/>
+                <a:cs typeface="+mn-cs"/>
+                <a:sym typeface="Helvetica Neue"/>
+              </a:defRPr>
             </a:pPr>
             <a:r>
-              <a:rPr dirty="0" err="1"/>
-              <a:t>Utenti</a:t>
-            </a:r>
-            <a:r>
-              <a:rPr dirty="0"/>
-              <a:t> admin</a:t>
-            </a:r>
-          </a:p>
-          <a:p>
-            <a:pPr marL="777875" lvl="1" indent="-333375" algn="l">
+              <a:t>Utenti admin</a:t>
+            </a:r>
+          </a:p>
+          <a:p>
+            <a:pPr lvl="1" marL="777875" indent="-333375" algn="l">
               <a:buSzPct val="145000"/>
               <a:buChar char="•"/>
-              <a:defRPr sz="4000" b="0"/>
+              <a:defRPr sz="4000">
+                <a:latin typeface="+mn-lt"/>
+                <a:ea typeface="+mn-ea"/>
+                <a:cs typeface="+mn-cs"/>
+                <a:sym typeface="Helvetica Neue"/>
+              </a:defRPr>
             </a:pPr>
             <a:r>
-              <a:rPr dirty="0"/>
-              <a:t>Ban </a:t>
-            </a:r>
-            <a:r>
-              <a:rPr dirty="0" err="1"/>
-              <a:t>messaggi</a:t>
-            </a:r>
-            <a:endParaRPr lang="it-IT" dirty="0"/>
-          </a:p>
-          <a:p>
-            <a:pPr marL="777875" lvl="1" indent="-333375" algn="l">
+              <a:t>Ban messaggi</a:t>
+            </a:r>
+          </a:p>
+          <a:p>
+            <a:pPr lvl="1" marL="777875" indent="-333375" algn="l">
               <a:buSzPct val="145000"/>
               <a:buChar char="•"/>
-              <a:defRPr sz="4000" b="0"/>
+              <a:defRPr sz="4000">
+                <a:latin typeface="+mn-lt"/>
+                <a:ea typeface="+mn-ea"/>
+                <a:cs typeface="+mn-cs"/>
+                <a:sym typeface="Helvetica Neue"/>
+              </a:defRPr>
             </a:pPr>
             <a:r>
-              <a:rPr lang="it-IT" dirty="0"/>
               <a:t>Ban utenti</a:t>
             </a:r>
-            <a:endParaRPr dirty="0"/>
           </a:p>
         </p:txBody>
       </p:sp>
@@ -3892,12 +3948,12 @@
   <p:clrMapOvr>
     <a:masterClrMapping/>
   </p:clrMapOvr>
-  <p:transition spd="med"/>
+  <p:transition xmlns:p14="http://schemas.microsoft.com/office/powerpoint/2010/main" spd="med" advClick="1"/>
 </p:sld>
 </file>
 
 <file path=ppt/slides/slide5.xml><?xml version="1.0" encoding="utf-8"?>
-<p:sld xmlns:a="http://schemas.openxmlformats.org/drawingml/2006/main" xmlns:r="http://schemas.openxmlformats.org/officeDocument/2006/relationships" xmlns:p="http://schemas.openxmlformats.org/presentationml/2006/main">
+<p:sld xmlns:a="http://schemas.openxmlformats.org/drawingml/2006/main" xmlns:r="http://schemas.openxmlformats.org/officeDocument/2006/relationships" xmlns:p="http://schemas.openxmlformats.org/presentationml/2006/main" showMasterSp="1" showMasterPhAnim="1">
   <p:cSld>
     <p:spTree>
       <p:nvGrpSpPr>
@@ -3921,8 +3977,8 @@
         </p:nvSpPr>
         <p:spPr>
           <a:xfrm>
-            <a:off x="990234" y="2100728"/>
-            <a:ext cx="3894456" cy="4976877"/>
+            <a:off x="1015633" y="1580028"/>
+            <a:ext cx="4656456" cy="5586477"/>
           </a:xfrm>
           <a:prstGeom prst="rect">
             <a:avLst/>
@@ -3932,7 +3988,7 @@
           </a:ln>
           <a:extLst>
             <a:ext uri="{C572A759-6A51-4108-AA02-DFA0A04FC94B}">
-              <ma14:wrappingTextBoxFlag xmlns:ma14="http://schemas.microsoft.com/office/mac/drawingml/2011/main" xmlns:a14="http://schemas.microsoft.com/office/drawing/2010/main" xmlns:m="http://schemas.openxmlformats.org/officeDocument/2006/math" xmlns="" val="1"/>
+              <ma14:wrappingTextBoxFlag xmlns:ma14="http://schemas.microsoft.com/office/mac/drawingml/2011/main" val="1"/>
             </a:ext>
           </a:extLst>
         </p:spPr>
@@ -3945,27 +4001,42 @@
             <a:pPr marL="333375" indent="-333375" algn="l">
               <a:buSzPct val="145000"/>
               <a:buChar char="•"/>
-              <a:defRPr sz="4000" b="0"/>
+              <a:defRPr sz="4000">
+                <a:latin typeface="+mn-lt"/>
+                <a:ea typeface="+mn-ea"/>
+                <a:cs typeface="+mn-cs"/>
+                <a:sym typeface="Helvetica Neue"/>
+              </a:defRPr>
             </a:pPr>
             <a:r>
               <a:t>csv:</a:t>
             </a:r>
           </a:p>
           <a:p>
-            <a:pPr marL="777875" lvl="1" indent="-333375" algn="l">
+            <a:pPr lvl="1" marL="777875" indent="-333375" algn="l">
               <a:buSzPct val="145000"/>
               <a:buChar char="•"/>
-              <a:defRPr sz="4000" b="0"/>
+              <a:defRPr sz="4000">
+                <a:latin typeface="+mn-lt"/>
+                <a:ea typeface="+mn-ea"/>
+                <a:cs typeface="+mn-cs"/>
+                <a:sym typeface="Helvetica Neue"/>
+              </a:defRPr>
             </a:pPr>
             <a:r>
               <a:t>logChat.csv</a:t>
             </a:r>
           </a:p>
           <a:p>
-            <a:pPr marL="777875" lvl="1" indent="-333375" algn="l">
+            <a:pPr lvl="1" marL="777875" indent="-333375" algn="l">
               <a:buSzPct val="145000"/>
               <a:buChar char="•"/>
-              <a:defRPr sz="4000" b="0"/>
+              <a:defRPr sz="4000">
+                <a:latin typeface="+mn-lt"/>
+                <a:ea typeface="+mn-ea"/>
+                <a:cs typeface="+mn-cs"/>
+                <a:sym typeface="Helvetica Neue"/>
+              </a:defRPr>
             </a:pPr>
             <a:r>
               <a:t>utenti.csv</a:t>
@@ -3975,7 +4046,12 @@
             <a:pPr marL="333375" indent="-333375" algn="l">
               <a:buSzPct val="145000"/>
               <a:buChar char="•"/>
-              <a:defRPr sz="4000" u="sng"/>
+              <a:defRPr b="1" sz="4000" u="sng">
+                <a:latin typeface="+mn-lt"/>
+                <a:ea typeface="+mn-ea"/>
+                <a:cs typeface="+mn-cs"/>
+                <a:sym typeface="Helvetica Neue"/>
+              </a:defRPr>
             </a:pPr>
             <a:r>
               <a:t>Login.py</a:t>
@@ -3985,27 +4061,57 @@
             <a:pPr marL="333375" indent="-333375" algn="l">
               <a:buSzPct val="145000"/>
               <a:buChar char="•"/>
-              <a:defRPr sz="4000" b="0"/>
+              <a:defRPr sz="4000">
+                <a:latin typeface="+mn-lt"/>
+                <a:ea typeface="+mn-ea"/>
+                <a:cs typeface="+mn-cs"/>
+                <a:sym typeface="Helvetica Neue"/>
+              </a:defRPr>
             </a:pPr>
             <a:r>
               <a:t>pages:</a:t>
             </a:r>
           </a:p>
           <a:p>
-            <a:pPr marL="777875" lvl="1" indent="-333375" algn="l">
+            <a:pPr lvl="1" marL="777875" indent="-333375" algn="l">
               <a:buSzPct val="145000"/>
               <a:buChar char="•"/>
-              <a:defRPr sz="4000" b="0"/>
+              <a:defRPr sz="4000">
+                <a:latin typeface="+mn-lt"/>
+                <a:ea typeface="+mn-ea"/>
+                <a:cs typeface="+mn-cs"/>
+                <a:sym typeface="Helvetica Neue"/>
+              </a:defRPr>
             </a:pPr>
             <a:r>
               <a:t>chatroom.py</a:t>
+            </a:r>
+          </a:p>
+          <a:p>
+            <a:pPr lvl="1" marL="777875" indent="-333375" algn="l">
+              <a:buSzPct val="145000"/>
+              <a:buChar char="•"/>
+              <a:defRPr sz="4000">
+                <a:latin typeface="+mn-lt"/>
+                <a:ea typeface="+mn-ea"/>
+                <a:cs typeface="+mn-cs"/>
+                <a:sym typeface="Helvetica Neue"/>
+              </a:defRPr>
+            </a:pPr>
+            <a:r>
+              <a:t>usermanager.py</a:t>
             </a:r>
           </a:p>
           <a:p>
             <a:pPr marL="333375" indent="-333375" algn="l">
               <a:buSzPct val="145000"/>
               <a:buChar char="•"/>
-              <a:defRPr sz="4000" b="0"/>
+              <a:defRPr sz="4000">
+                <a:latin typeface="+mn-lt"/>
+                <a:ea typeface="+mn-ea"/>
+                <a:cs typeface="+mn-cs"/>
+                <a:sym typeface="Helvetica Neue"/>
+              </a:defRPr>
             </a:pPr>
             <a:r>
               <a:t>README.md</a:t>
@@ -4015,10 +4121,14 @@
             <a:pPr marL="333375" indent="-333375" algn="l">
               <a:buSzPct val="145000"/>
               <a:buChar char="•"/>
-              <a:defRPr sz="4000" b="0">
+              <a:defRPr sz="4000">
                 <a:solidFill>
                   <a:srgbClr val="929292"/>
                 </a:solidFill>
+                <a:latin typeface="+mn-lt"/>
+                <a:ea typeface="+mn-ea"/>
+                <a:cs typeface="+mn-cs"/>
+                <a:sym typeface="Helvetica Neue"/>
               </a:defRPr>
             </a:pPr>
             <a:r>
@@ -4035,7 +4145,7 @@
         </p:nvSpPr>
         <p:spPr>
           <a:xfrm>
-            <a:off x="4861890" y="268454"/>
+            <a:off x="4861890" y="268453"/>
             <a:ext cx="3281020" cy="771192"/>
           </a:xfrm>
           <a:prstGeom prst="rect">
@@ -4046,7 +4156,7 @@
           </a:ln>
           <a:extLst>
             <a:ext uri="{C572A759-6A51-4108-AA02-DFA0A04FC94B}">
-              <ma14:wrappingTextBoxFlag xmlns:ma14="http://schemas.microsoft.com/office/mac/drawingml/2011/main" xmlns:a14="http://schemas.microsoft.com/office/drawing/2010/main" xmlns:m="http://schemas.openxmlformats.org/officeDocument/2006/math" xmlns="" val="1"/>
+              <ma14:wrappingTextBoxFlag xmlns:ma14="http://schemas.microsoft.com/office/mac/drawingml/2011/main" val="1"/>
             </a:ext>
           </a:extLst>
         </p:spPr>
@@ -4056,10 +4166,16 @@
           </a:bodyPr>
           <a:lstStyle>
             <a:lvl1pPr>
-              <a:defRPr sz="4400"/>
+              <a:defRPr b="1" sz="4400">
+                <a:latin typeface="+mn-lt"/>
+                <a:ea typeface="+mn-ea"/>
+                <a:cs typeface="+mn-cs"/>
+                <a:sym typeface="Helvetica Neue"/>
+              </a:defRPr>
             </a:lvl1pPr>
           </a:lstStyle>
           <a:p>
+            <a:pPr/>
             <a:r>
               <a:t>Architettura</a:t>
             </a:r>
@@ -4071,12 +4187,12 @@
   <p:clrMapOvr>
     <a:masterClrMapping/>
   </p:clrMapOvr>
-  <p:transition spd="med"/>
+  <p:transition xmlns:p14="http://schemas.microsoft.com/office/powerpoint/2010/main" spd="med" advClick="1"/>
 </p:sld>
 </file>
 
 <file path=ppt/slides/slide6.xml><?xml version="1.0" encoding="utf-8"?>
-<p:sld xmlns:a="http://schemas.openxmlformats.org/drawingml/2006/main" xmlns:r="http://schemas.openxmlformats.org/officeDocument/2006/relationships" xmlns:p="http://schemas.openxmlformats.org/presentationml/2006/main">
+<p:sld xmlns:a="http://schemas.openxmlformats.org/drawingml/2006/main" xmlns:r="http://schemas.openxmlformats.org/officeDocument/2006/relationships" xmlns:p="http://schemas.openxmlformats.org/presentationml/2006/main" showMasterSp="1" showMasterPhAnim="1">
   <p:cSld>
     <p:spTree>
       <p:nvGrpSpPr>
@@ -4100,8 +4216,8 @@
         </p:nvSpPr>
         <p:spPr>
           <a:xfrm>
-            <a:off x="5762955" y="268454"/>
-            <a:ext cx="1478890" cy="771192"/>
+            <a:off x="5762954" y="268453"/>
+            <a:ext cx="1478891" cy="771192"/>
           </a:xfrm>
           <a:prstGeom prst="rect">
             <a:avLst/>
@@ -4111,7 +4227,7 @@
           </a:ln>
           <a:extLst>
             <a:ext uri="{C572A759-6A51-4108-AA02-DFA0A04FC94B}">
-              <ma14:wrappingTextBoxFlag xmlns:ma14="http://schemas.microsoft.com/office/mac/drawingml/2011/main" xmlns:a14="http://schemas.microsoft.com/office/drawing/2010/main" xmlns:m="http://schemas.openxmlformats.org/officeDocument/2006/math" xmlns="" val="1"/>
+              <ma14:wrappingTextBoxFlag xmlns:ma14="http://schemas.microsoft.com/office/mac/drawingml/2011/main" val="1"/>
             </a:ext>
           </a:extLst>
         </p:spPr>
@@ -4121,10 +4237,16 @@
           </a:bodyPr>
           <a:lstStyle>
             <a:lvl1pPr>
-              <a:defRPr sz="4400"/>
+              <a:defRPr b="1" sz="4400">
+                <a:latin typeface="+mn-lt"/>
+                <a:ea typeface="+mn-ea"/>
+                <a:cs typeface="+mn-cs"/>
+                <a:sym typeface="Helvetica Neue"/>
+              </a:defRPr>
             </a:lvl1pPr>
           </a:lstStyle>
           <a:p>
+            <a:pPr/>
             <a:r>
               <a:t>Ruoli</a:t>
             </a:r>
@@ -4139,8 +4261,8 @@
         </p:nvSpPr>
         <p:spPr>
           <a:xfrm>
-            <a:off x="991142" y="2070862"/>
-            <a:ext cx="8521102" cy="5611877"/>
+            <a:off x="965741" y="1461261"/>
+            <a:ext cx="8521104" cy="5611877"/>
           </a:xfrm>
           <a:prstGeom prst="rect">
             <a:avLst/>
@@ -4150,7 +4272,7 @@
           </a:ln>
           <a:extLst>
             <a:ext uri="{C572A759-6A51-4108-AA02-DFA0A04FC94B}">
-              <ma14:wrappingTextBoxFlag xmlns:ma14="http://schemas.microsoft.com/office/mac/drawingml/2011/main" xmlns:a14="http://schemas.microsoft.com/office/drawing/2010/main" xmlns:m="http://schemas.openxmlformats.org/officeDocument/2006/math" xmlns="" val="1"/>
+              <ma14:wrappingTextBoxFlag xmlns:ma14="http://schemas.microsoft.com/office/mac/drawingml/2011/main" val="1"/>
             </a:ext>
           </a:extLst>
         </p:spPr>
@@ -4163,37 +4285,57 @@
             <a:pPr marL="333375" indent="-333375" algn="l">
               <a:buSzPct val="145000"/>
               <a:buChar char="•"/>
-              <a:defRPr sz="4000"/>
+              <a:defRPr b="1" sz="4000">
+                <a:latin typeface="+mn-lt"/>
+                <a:ea typeface="+mn-ea"/>
+                <a:cs typeface="+mn-cs"/>
+                <a:sym typeface="Helvetica Neue"/>
+              </a:defRPr>
             </a:pPr>
             <a:r>
               <a:t>Project Manager</a:t>
             </a:r>
           </a:p>
           <a:p>
-            <a:pPr marL="777875" lvl="1" indent="-333375" algn="l">
+            <a:pPr lvl="1" marL="777875" indent="-333375" algn="l">
               <a:buSzPct val="145000"/>
               <a:buChar char="•"/>
-              <a:defRPr sz="4000" b="0"/>
+              <a:defRPr sz="4000">
+                <a:latin typeface="+mn-lt"/>
+                <a:ea typeface="+mn-ea"/>
+                <a:cs typeface="+mn-cs"/>
+                <a:sym typeface="Helvetica Neue"/>
+              </a:defRPr>
             </a:pPr>
             <a:r>
               <a:t>Lorenzo Giaccari</a:t>
             </a:r>
           </a:p>
           <a:p>
-            <a:pPr marL="777875" lvl="1" indent="-333375" algn="l">
+            <a:pPr lvl="1" marL="777875" indent="-333375" algn="l">
               <a:buSzPct val="145000"/>
               <a:buChar char="•"/>
-              <a:defRPr sz="4000" b="0"/>
+              <a:defRPr sz="4000">
+                <a:latin typeface="+mn-lt"/>
+                <a:ea typeface="+mn-ea"/>
+                <a:cs typeface="+mn-cs"/>
+                <a:sym typeface="Helvetica Neue"/>
+              </a:defRPr>
             </a:pPr>
             <a:r>
               <a:t>Camilla Giaccari</a:t>
             </a:r>
           </a:p>
           <a:p>
-            <a:pPr marL="777875" lvl="1" indent="-333375" algn="l">
+            <a:pPr lvl="1" marL="777875" indent="-333375" algn="l">
               <a:buSzPct val="145000"/>
               <a:buChar char="•"/>
-              <a:defRPr sz="4000" b="0"/>
+              <a:defRPr sz="4000">
+                <a:latin typeface="+mn-lt"/>
+                <a:ea typeface="+mn-ea"/>
+                <a:cs typeface="+mn-cs"/>
+                <a:sym typeface="Helvetica Neue"/>
+              </a:defRPr>
             </a:pPr>
             <a:r>
               <a:t>Sandro Marussich</a:t>
@@ -4203,17 +4345,27 @@
             <a:pPr marL="333375" indent="-333375" algn="l">
               <a:buSzPct val="145000"/>
               <a:buChar char="•"/>
-              <a:defRPr sz="4000"/>
+              <a:defRPr b="1" sz="4000">
+                <a:latin typeface="+mn-lt"/>
+                <a:ea typeface="+mn-ea"/>
+                <a:cs typeface="+mn-cs"/>
+                <a:sym typeface="Helvetica Neue"/>
+              </a:defRPr>
             </a:pPr>
             <a:r>
               <a:t>Back End Developer </a:t>
             </a:r>
           </a:p>
           <a:p>
-            <a:pPr marL="777875" lvl="1" indent="-333375" algn="l">
+            <a:pPr lvl="1" marL="777875" indent="-333375" algn="l">
               <a:buSzPct val="145000"/>
               <a:buChar char="•"/>
-              <a:defRPr sz="4000" b="0"/>
+              <a:defRPr sz="4000">
+                <a:latin typeface="+mn-lt"/>
+                <a:ea typeface="+mn-ea"/>
+                <a:cs typeface="+mn-cs"/>
+                <a:sym typeface="Helvetica Neue"/>
+              </a:defRPr>
             </a:pPr>
             <a:r>
               <a:t>Lorenzo Giaccari</a:t>
@@ -4223,27 +4375,42 @@
             <a:pPr marL="333375" indent="-333375" algn="l">
               <a:buSzPct val="145000"/>
               <a:buChar char="•"/>
-              <a:defRPr sz="4000"/>
+              <a:defRPr b="1" sz="4000">
+                <a:latin typeface="+mn-lt"/>
+                <a:ea typeface="+mn-ea"/>
+                <a:cs typeface="+mn-cs"/>
+                <a:sym typeface="Helvetica Neue"/>
+              </a:defRPr>
             </a:pPr>
             <a:r>
               <a:t>Front End Developer</a:t>
             </a:r>
           </a:p>
           <a:p>
-            <a:pPr marL="777875" lvl="1" indent="-333375" algn="l">
+            <a:pPr lvl="1" marL="777875" indent="-333375" algn="l">
               <a:buSzPct val="145000"/>
               <a:buChar char="•"/>
-              <a:defRPr sz="4000" b="0"/>
+              <a:defRPr sz="4000">
+                <a:latin typeface="+mn-lt"/>
+                <a:ea typeface="+mn-ea"/>
+                <a:cs typeface="+mn-cs"/>
+                <a:sym typeface="Helvetica Neue"/>
+              </a:defRPr>
             </a:pPr>
             <a:r>
               <a:t>Camilla Giaccari</a:t>
             </a:r>
           </a:p>
           <a:p>
-            <a:pPr marL="777875" lvl="1" indent="-333375" algn="l">
+            <a:pPr lvl="1" marL="777875" indent="-333375" algn="l">
               <a:buSzPct val="145000"/>
               <a:buChar char="•"/>
-              <a:defRPr sz="4000" b="0"/>
+              <a:defRPr sz="4000">
+                <a:latin typeface="+mn-lt"/>
+                <a:ea typeface="+mn-ea"/>
+                <a:cs typeface="+mn-cs"/>
+                <a:sym typeface="Helvetica Neue"/>
+              </a:defRPr>
             </a:pPr>
             <a:r>
               <a:t>Sandro Marussich</a:t>
@@ -4256,12 +4423,12 @@
   <p:clrMapOvr>
     <a:masterClrMapping/>
   </p:clrMapOvr>
-  <p:transition spd="med"/>
+  <p:transition xmlns:p14="http://schemas.microsoft.com/office/powerpoint/2010/main" spd="med" advClick="1"/>
 </p:sld>
 </file>
 
 <file path=ppt/slides/slide7.xml><?xml version="1.0" encoding="utf-8"?>
-<p:sld xmlns:a="http://schemas.openxmlformats.org/drawingml/2006/main" xmlns:r="http://schemas.openxmlformats.org/officeDocument/2006/relationships" xmlns:p="http://schemas.openxmlformats.org/presentationml/2006/main">
+<p:sld xmlns:a="http://schemas.openxmlformats.org/drawingml/2006/main" xmlns:r="http://schemas.openxmlformats.org/officeDocument/2006/relationships" xmlns:p="http://schemas.openxmlformats.org/presentationml/2006/main" showMasterSp="1" showMasterPhAnim="1">
   <p:cSld>
     <p:spTree>
       <p:nvGrpSpPr>
@@ -4285,8 +4452,8 @@
         </p:nvSpPr>
         <p:spPr>
           <a:xfrm>
-            <a:off x="4443907" y="268454"/>
-            <a:ext cx="4116986" cy="771192"/>
+            <a:off x="4443907" y="268453"/>
+            <a:ext cx="4116985" cy="771192"/>
           </a:xfrm>
           <a:prstGeom prst="rect">
             <a:avLst/>
@@ -4296,7 +4463,7 @@
           </a:ln>
           <a:extLst>
             <a:ext uri="{C572A759-6A51-4108-AA02-DFA0A04FC94B}">
-              <ma14:wrappingTextBoxFlag xmlns:ma14="http://schemas.microsoft.com/office/mac/drawingml/2011/main" xmlns:a14="http://schemas.microsoft.com/office/drawing/2010/main" xmlns:m="http://schemas.openxmlformats.org/officeDocument/2006/math" xmlns="" val="1"/>
+              <ma14:wrappingTextBoxFlag xmlns:ma14="http://schemas.microsoft.com/office/mac/drawingml/2011/main" val="1"/>
             </a:ext>
           </a:extLst>
         </p:spPr>
@@ -4306,10 +4473,16 @@
           </a:bodyPr>
           <a:lstStyle>
             <a:lvl1pPr>
-              <a:defRPr sz="4400"/>
+              <a:defRPr b="1" sz="4400">
+                <a:latin typeface="+mn-lt"/>
+                <a:ea typeface="+mn-ea"/>
+                <a:cs typeface="+mn-cs"/>
+                <a:sym typeface="Helvetica Neue"/>
+              </a:defRPr>
             </a:lvl1pPr>
           </a:lstStyle>
           <a:p>
+            <a:pPr/>
             <a:r>
               <a:t>Esempi - Login</a:t>
             </a:r>
@@ -4325,15 +4498,17 @@
           <p:nvPr/>
         </p:nvPicPr>
         <p:blipFill>
-          <a:blip r:embed="rId2"/>
+          <a:blip r:embed="rId2">
+            <a:extLst/>
+          </a:blip>
           <a:stretch>
             <a:fillRect/>
           </a:stretch>
         </p:blipFill>
         <p:spPr>
           <a:xfrm>
-            <a:off x="1040213" y="1279207"/>
-            <a:ext cx="10924374" cy="8298536"/>
+            <a:off x="1040212" y="1279206"/>
+            <a:ext cx="10924376" cy="8298538"/>
           </a:xfrm>
           <a:prstGeom prst="rect">
             <a:avLst/>
@@ -4348,12 +4523,12 @@
   <p:clrMapOvr>
     <a:masterClrMapping/>
   </p:clrMapOvr>
-  <p:transition spd="med"/>
+  <p:transition xmlns:p14="http://schemas.microsoft.com/office/powerpoint/2010/main" spd="med" advClick="1"/>
 </p:sld>
 </file>
 
 <file path=ppt/slides/slide8.xml><?xml version="1.0" encoding="utf-8"?>
-<p:sld xmlns:a="http://schemas.openxmlformats.org/drawingml/2006/main" xmlns:r="http://schemas.openxmlformats.org/officeDocument/2006/relationships" xmlns:p="http://schemas.openxmlformats.org/presentationml/2006/main">
+<p:sld xmlns:a="http://schemas.openxmlformats.org/drawingml/2006/main" xmlns:r="http://schemas.openxmlformats.org/officeDocument/2006/relationships" xmlns:p="http://schemas.openxmlformats.org/presentationml/2006/main" showMasterSp="1" showMasterPhAnim="1">
   <p:cSld>
     <p:spTree>
       <p:nvGrpSpPr>
@@ -4378,15 +4553,17 @@
           <p:nvPr/>
         </p:nvPicPr>
         <p:blipFill>
-          <a:blip r:embed="rId2"/>
+          <a:blip r:embed="rId2">
+            <a:extLst/>
+          </a:blip>
           <a:stretch>
             <a:fillRect/>
           </a:stretch>
         </p:blipFill>
         <p:spPr>
           <a:xfrm>
-            <a:off x="1036577" y="1270131"/>
-            <a:ext cx="10881395" cy="8265888"/>
+            <a:off x="1036577" y="1270130"/>
+            <a:ext cx="10881395" cy="8265889"/>
           </a:xfrm>
           <a:prstGeom prst="rect">
             <a:avLst/>
@@ -4404,7 +4581,7 @@
         </p:nvSpPr>
         <p:spPr>
           <a:xfrm>
-            <a:off x="3859123" y="268454"/>
+            <a:off x="3859122" y="268453"/>
             <a:ext cx="5286554" cy="771192"/>
           </a:xfrm>
           <a:prstGeom prst="rect">
@@ -4415,7 +4592,7 @@
           </a:ln>
           <a:extLst>
             <a:ext uri="{C572A759-6A51-4108-AA02-DFA0A04FC94B}">
-              <ma14:wrappingTextBoxFlag xmlns:ma14="http://schemas.microsoft.com/office/mac/drawingml/2011/main" xmlns:a14="http://schemas.microsoft.com/office/drawing/2010/main" xmlns:m="http://schemas.openxmlformats.org/officeDocument/2006/math" xmlns="" val="1"/>
+              <ma14:wrappingTextBoxFlag xmlns:ma14="http://schemas.microsoft.com/office/mac/drawingml/2011/main" val="1"/>
             </a:ext>
           </a:extLst>
         </p:spPr>
@@ -4425,10 +4602,16 @@
           </a:bodyPr>
           <a:lstStyle>
             <a:lvl1pPr>
-              <a:defRPr sz="4400"/>
+              <a:defRPr b="1" sz="4400">
+                <a:latin typeface="+mn-lt"/>
+                <a:ea typeface="+mn-ea"/>
+                <a:cs typeface="+mn-cs"/>
+                <a:sym typeface="Helvetica Neue"/>
+              </a:defRPr>
             </a:lvl1pPr>
           </a:lstStyle>
           <a:p>
+            <a:pPr/>
             <a:r>
               <a:t>Esempi - Chatroom</a:t>
             </a:r>
@@ -4440,12 +4623,12 @@
   <p:clrMapOvr>
     <a:masterClrMapping/>
   </p:clrMapOvr>
-  <p:transition spd="med"/>
+  <p:transition xmlns:p14="http://schemas.microsoft.com/office/powerpoint/2010/main" spd="med" advClick="1"/>
 </p:sld>
 </file>
 
 <file path=ppt/slides/slide9.xml><?xml version="1.0" encoding="utf-8"?>
-<p:sld xmlns:a="http://schemas.openxmlformats.org/drawingml/2006/main" xmlns:r="http://schemas.openxmlformats.org/officeDocument/2006/relationships" xmlns:p="http://schemas.openxmlformats.org/presentationml/2006/main">
+<p:sld xmlns:a="http://schemas.openxmlformats.org/drawingml/2006/main" xmlns:r="http://schemas.openxmlformats.org/officeDocument/2006/relationships" xmlns:p="http://schemas.openxmlformats.org/presentationml/2006/main" showMasterSp="1" showMasterPhAnim="1">
   <p:cSld>
     <p:spTree>
       <p:nvGrpSpPr>
@@ -4470,7 +4653,9 @@
           <p:nvPr/>
         </p:nvPicPr>
         <p:blipFill>
-          <a:blip r:embed="rId2"/>
+          <a:blip r:embed="rId2">
+            <a:extLst/>
+          </a:blip>
           <a:stretch>
             <a:fillRect/>
           </a:stretch>
@@ -4478,7 +4663,7 @@
         <p:spPr>
           <a:xfrm>
             <a:off x="1038168" y="1262015"/>
-            <a:ext cx="10878213" cy="8263470"/>
+            <a:ext cx="10878213" cy="8263471"/>
           </a:xfrm>
           <a:prstGeom prst="rect">
             <a:avLst/>
@@ -4496,8 +4681,8 @@
         </p:nvSpPr>
         <p:spPr>
           <a:xfrm>
-            <a:off x="3160329" y="267544"/>
-            <a:ext cx="6684141" cy="779701"/>
+            <a:off x="3160329" y="271799"/>
+            <a:ext cx="6684141" cy="771191"/>
           </a:xfrm>
           <a:prstGeom prst="rect">
             <a:avLst/>
@@ -4507,41 +4692,36 @@
           </a:ln>
           <a:extLst>
             <a:ext uri="{C572A759-6A51-4108-AA02-DFA0A04FC94B}">
-              <ma14:wrappingTextBoxFlag xmlns:ma14="http://schemas.microsoft.com/office/mac/drawingml/2011/main" xmlns:a14="http://schemas.microsoft.com/office/drawing/2010/main" xmlns:m="http://schemas.openxmlformats.org/officeDocument/2006/math" xmlns="" val="1"/>
+              <ma14:wrappingTextBoxFlag xmlns:ma14="http://schemas.microsoft.com/office/mac/drawingml/2011/main" val="1"/>
             </a:ext>
           </a:extLst>
         </p:spPr>
         <p:txBody>
-          <a:bodyPr wrap="square" lIns="50800" tIns="50800" rIns="50800" bIns="50800" anchor="ctr">
+          <a:bodyPr lIns="50800" tIns="50800" rIns="50800" bIns="50800" anchor="ctr">
             <a:spAutoFit/>
           </a:bodyPr>
-          <a:lstStyle>
-            <a:lvl1pPr>
-              <a:defRPr sz="4400"/>
-            </a:lvl1pPr>
-          </a:lstStyle>
-          <a:p>
-            <a:r>
-              <a:rPr dirty="0" err="1"/>
-              <a:t>Esempi</a:t>
-            </a:r>
-            <a:r>
-              <a:rPr dirty="0"/>
-              <a:t> </a:t>
-            </a:r>
-            <a:r>
-              <a:rPr lang="it-IT" dirty="0"/>
+          <a:lstStyle/>
+          <a:p>
+            <a:pPr>
+              <a:defRPr b="1" sz="4400">
+                <a:latin typeface="+mn-lt"/>
+                <a:ea typeface="+mn-ea"/>
+                <a:cs typeface="+mn-cs"/>
+                <a:sym typeface="Helvetica Neue"/>
+              </a:defRPr>
+            </a:pPr>
+            <a:r>
+              <a:t>Esempi </a:t>
+            </a:r>
+            <a:r>
               <a:t>–</a:t>
             </a:r>
             <a:r>
-              <a:rPr dirty="0"/>
               <a:t> Ban</a:t>
             </a:r>
             <a:r>
-              <a:rPr lang="it-IT" dirty="0"/>
               <a:t> messaggi</a:t>
             </a:r>
-            <a:endParaRPr dirty="0"/>
           </a:p>
         </p:txBody>
       </p:sp>
@@ -4550,12 +4730,12 @@
   <p:clrMapOvr>
     <a:masterClrMapping/>
   </p:clrMapOvr>
-  <p:transition spd="med"/>
+  <p:transition xmlns:p14="http://schemas.microsoft.com/office/powerpoint/2010/main" spd="med" advClick="1"/>
 </p:sld>
 </file>
 
 <file path=ppt/theme/theme1.xml><?xml version="1.0" encoding="utf-8"?>
-<a:theme xmlns:a="http://schemas.openxmlformats.org/drawingml/2006/main" name="White">
+<a:theme xmlns:a="http://schemas.openxmlformats.org/drawingml/2006/main" xmlns:r="http://schemas.openxmlformats.org/officeDocument/2006/relationships" name="White">
   <a:themeElements>
     <a:clrScheme name="White">
       <a:dk1>
@@ -4565,10 +4745,10 @@
         <a:srgbClr val="FFFFFF"/>
       </a:lt1>
       <a:dk2>
-        <a:srgbClr val="5E5E5E"/>
+        <a:srgbClr val="A7A7A7"/>
       </a:dk2>
       <a:lt2>
-        <a:srgbClr val="D6D5D5"/>
+        <a:srgbClr val="535353"/>
       </a:lt2>
       <a:accent1>
         <a:srgbClr val="00A2FF"/>
@@ -4597,14 +4777,14 @@
     </a:clrScheme>
     <a:fontScheme name="White">
       <a:majorFont>
-        <a:latin typeface="Helvetica Neue Medium"/>
-        <a:ea typeface="Helvetica Neue Medium"/>
-        <a:cs typeface="Helvetica Neue Medium"/>
+        <a:latin typeface="Helvetica"/>
+        <a:ea typeface="Helvetica"/>
+        <a:cs typeface="Helvetica"/>
       </a:majorFont>
       <a:minorFont>
-        <a:latin typeface="Helvetica Neue Medium"/>
-        <a:ea typeface="Helvetica Neue Medium"/>
-        <a:cs typeface="Helvetica Neue Medium"/>
+        <a:latin typeface="Helvetica Neue"/>
+        <a:ea typeface="Helvetica Neue"/>
+        <a:cs typeface="Helvetica Neue"/>
       </a:minorFont>
     </a:fontScheme>
     <a:fmtScheme name="White">
@@ -4745,16 +4925,19 @@
     <a:spDef>
       <a:spPr>
         <a:solidFill>
-          <a:schemeClr val="accent1"/>
+          <a:srgbClr val="FFFFFF"/>
         </a:solidFill>
-        <a:ln w="12700" cap="flat">
-          <a:noFill/>
-          <a:miter lim="400000"/>
+        <a:ln w="25400" cap="flat">
+          <a:solidFill>
+            <a:schemeClr val="accent1"/>
+          </a:solidFill>
+          <a:prstDash val="solid"/>
+          <a:round/>
         </a:ln>
         <a:effectLst/>
         <a:sp3d/>
       </a:spPr>
-      <a:bodyPr rot="0" spcFirstLastPara="1" vertOverflow="overflow" horzOverflow="overflow" vert="horz" wrap="square" lIns="50800" tIns="50800" rIns="50800" bIns="50800" numCol="1" spcCol="38100" rtlCol="0" anchor="ctr">
+      <a:bodyPr rot="0" spcFirstLastPara="1" vertOverflow="overflow" horzOverflow="overflow" vert="horz" wrap="square" lIns="50800" tIns="50800" rIns="50800" bIns="50800" numCol="1" spcCol="38100" rtlCol="0" anchor="ctr" upright="0">
         <a:spAutoFit/>
       </a:bodyPr>
       <a:lstStyle>
@@ -4773,18 +4956,18 @@
           <a:buFontTx/>
           <a:buNone/>
           <a:tabLst/>
-          <a:defRPr kumimoji="0" sz="2200" b="0" i="0" u="none" strike="noStrike" cap="none" spc="0" normalizeH="0" baseline="0">
+          <a:defRPr b="0" baseline="0" cap="none" i="0" spc="0" strike="noStrike" sz="2400" u="none" kumimoji="0" normalizeH="0">
             <a:ln>
               <a:noFill/>
             </a:ln>
             <a:solidFill>
-              <a:srgbClr val="FFFFFF"/>
+              <a:srgbClr val="000000"/>
             </a:solidFill>
             <a:effectLst/>
             <a:uFillTx/>
-            <a:latin typeface="+mn-lt"/>
-            <a:ea typeface="+mn-ea"/>
-            <a:cs typeface="+mn-cs"/>
+            <a:latin typeface="Helvetica Neue Medium"/>
+            <a:ea typeface="Helvetica Neue Medium"/>
+            <a:cs typeface="Helvetica Neue Medium"/>
             <a:sym typeface="Helvetica Neue Medium"/>
           </a:defRPr>
         </a:defPPr>
@@ -4803,7 +4986,7 @@
           <a:buFontTx/>
           <a:buNone/>
           <a:tabLst/>
-          <a:defRPr kumimoji="0" sz="1800" b="0" i="0" u="none" strike="noStrike" cap="none" spc="0" normalizeH="0" baseline="0">
+          <a:defRPr b="0" baseline="0" cap="none" i="0" spc="0" strike="noStrike" sz="1800" u="none" kumimoji="0" normalizeH="0">
             <a:ln>
               <a:noFill/>
             </a:ln>
@@ -4829,7 +5012,7 @@
           <a:buFontTx/>
           <a:buNone/>
           <a:tabLst/>
-          <a:defRPr kumimoji="0" sz="1800" b="0" i="0" u="none" strike="noStrike" cap="none" spc="0" normalizeH="0" baseline="0">
+          <a:defRPr b="0" baseline="0" cap="none" i="0" spc="0" strike="noStrike" sz="1800" u="none" kumimoji="0" normalizeH="0">
             <a:ln>
               <a:noFill/>
             </a:ln>
@@ -4855,7 +5038,7 @@
           <a:buFontTx/>
           <a:buNone/>
           <a:tabLst/>
-          <a:defRPr kumimoji="0" sz="1800" b="0" i="0" u="none" strike="noStrike" cap="none" spc="0" normalizeH="0" baseline="0">
+          <a:defRPr b="0" baseline="0" cap="none" i="0" spc="0" strike="noStrike" sz="1800" u="none" kumimoji="0" normalizeH="0">
             <a:ln>
               <a:noFill/>
             </a:ln>
@@ -4881,7 +5064,7 @@
           <a:buFontTx/>
           <a:buNone/>
           <a:tabLst/>
-          <a:defRPr kumimoji="0" sz="1800" b="0" i="0" u="none" strike="noStrike" cap="none" spc="0" normalizeH="0" baseline="0">
+          <a:defRPr b="0" baseline="0" cap="none" i="0" spc="0" strike="noStrike" sz="1800" u="none" kumimoji="0" normalizeH="0">
             <a:ln>
               <a:noFill/>
             </a:ln>
@@ -4907,7 +5090,7 @@
           <a:buFontTx/>
           <a:buNone/>
           <a:tabLst/>
-          <a:defRPr kumimoji="0" sz="1800" b="0" i="0" u="none" strike="noStrike" cap="none" spc="0" normalizeH="0" baseline="0">
+          <a:defRPr b="0" baseline="0" cap="none" i="0" spc="0" strike="noStrike" sz="1800" u="none" kumimoji="0" normalizeH="0">
             <a:ln>
               <a:noFill/>
             </a:ln>
@@ -4933,7 +5116,7 @@
           <a:buFontTx/>
           <a:buNone/>
           <a:tabLst/>
-          <a:defRPr kumimoji="0" sz="1800" b="0" i="0" u="none" strike="noStrike" cap="none" spc="0" normalizeH="0" baseline="0">
+          <a:defRPr b="0" baseline="0" cap="none" i="0" spc="0" strike="noStrike" sz="1800" u="none" kumimoji="0" normalizeH="0">
             <a:ln>
               <a:noFill/>
             </a:ln>
@@ -4959,7 +5142,7 @@
           <a:buFontTx/>
           <a:buNone/>
           <a:tabLst/>
-          <a:defRPr kumimoji="0" sz="1800" b="0" i="0" u="none" strike="noStrike" cap="none" spc="0" normalizeH="0" baseline="0">
+          <a:defRPr b="0" baseline="0" cap="none" i="0" spc="0" strike="noStrike" sz="1800" u="none" kumimoji="0" normalizeH="0">
             <a:ln>
               <a:noFill/>
             </a:ln>
@@ -4985,7 +5168,7 @@
           <a:buFontTx/>
           <a:buNone/>
           <a:tabLst/>
-          <a:defRPr kumimoji="0" sz="1800" b="0" i="0" u="none" strike="noStrike" cap="none" spc="0" normalizeH="0" baseline="0">
+          <a:defRPr b="0" baseline="0" cap="none" i="0" spc="0" strike="noStrike" sz="1800" u="none" kumimoji="0" normalizeH="0">
             <a:ln>
               <a:noFill/>
             </a:ln>
@@ -5011,7 +5194,7 @@
           <a:buFontTx/>
           <a:buNone/>
           <a:tabLst/>
-          <a:defRPr kumimoji="0" sz="1800" b="0" i="0" u="none" strike="noStrike" cap="none" spc="0" normalizeH="0" baseline="0">
+          <a:defRPr b="0" baseline="0" cap="none" i="0" spc="0" strike="noStrike" sz="1800" u="none" kumimoji="0" normalizeH="0">
             <a:ln>
               <a:noFill/>
             </a:ln>
@@ -5024,15 +5207,9 @@
         </a:lvl9pPr>
       </a:lstStyle>
       <a:style>
-        <a:lnRef idx="0">
-          <a:scrgbClr r="0" g="0" b="0"/>
-        </a:lnRef>
-        <a:fillRef idx="0">
-          <a:scrgbClr r="0" g="0" b="0"/>
-        </a:fillRef>
-        <a:effectRef idx="0">
-          <a:scrgbClr r="0" g="0" b="0"/>
-        </a:effectRef>
+        <a:lnRef idx="0"/>
+        <a:fillRef idx="0"/>
+        <a:effectRef idx="0"/>
         <a:fontRef idx="none"/>
       </a:style>
     </a:spDef>
@@ -5041,15 +5218,15 @@
         <a:noFill/>
         <a:ln w="25400" cap="flat">
           <a:solidFill>
-            <a:srgbClr val="000000"/>
+            <a:schemeClr val="accent1"/>
           </a:solidFill>
           <a:prstDash val="solid"/>
-          <a:miter lim="400000"/>
+          <a:round/>
         </a:ln>
         <a:effectLst/>
         <a:sp3d/>
       </a:spPr>
-      <a:bodyPr rot="0" spcFirstLastPara="1" vertOverflow="overflow" horzOverflow="overflow" vert="horz" wrap="square" lIns="91439" tIns="45719" rIns="91439" bIns="45719" numCol="1" spcCol="38100" rtlCol="0" anchor="t">
+      <a:bodyPr rot="0" spcFirstLastPara="1" vertOverflow="overflow" horzOverflow="overflow" vert="horz" wrap="square" lIns="91439" tIns="45719" rIns="91439" bIns="45719" numCol="1" spcCol="38100" rtlCol="0" anchor="t" upright="0">
         <a:noAutofit/>
       </a:bodyPr>
       <a:lstStyle>
@@ -5068,7 +5245,7 @@
           <a:buFontTx/>
           <a:buNone/>
           <a:tabLst/>
-          <a:defRPr kumimoji="0" sz="1800" b="0" i="0" u="none" strike="noStrike" cap="none" spc="0" normalizeH="0" baseline="0">
+          <a:defRPr b="0" baseline="0" cap="none" i="0" spc="0" strike="noStrike" sz="1800" u="none" kumimoji="0" normalizeH="0">
             <a:ln>
               <a:noFill/>
             </a:ln>
@@ -5094,7 +5271,7 @@
           <a:buFontTx/>
           <a:buNone/>
           <a:tabLst/>
-          <a:defRPr kumimoji="0" sz="1800" b="0" i="0" u="none" strike="noStrike" cap="none" spc="0" normalizeH="0" baseline="0">
+          <a:defRPr b="0" baseline="0" cap="none" i="0" spc="0" strike="noStrike" sz="1800" u="none" kumimoji="0" normalizeH="0">
             <a:ln>
               <a:noFill/>
             </a:ln>
@@ -5120,7 +5297,7 @@
           <a:buFontTx/>
           <a:buNone/>
           <a:tabLst/>
-          <a:defRPr kumimoji="0" sz="1800" b="0" i="0" u="none" strike="noStrike" cap="none" spc="0" normalizeH="0" baseline="0">
+          <a:defRPr b="0" baseline="0" cap="none" i="0" spc="0" strike="noStrike" sz="1800" u="none" kumimoji="0" normalizeH="0">
             <a:ln>
               <a:noFill/>
             </a:ln>
@@ -5146,7 +5323,7 @@
           <a:buFontTx/>
           <a:buNone/>
           <a:tabLst/>
-          <a:defRPr kumimoji="0" sz="1800" b="0" i="0" u="none" strike="noStrike" cap="none" spc="0" normalizeH="0" baseline="0">
+          <a:defRPr b="0" baseline="0" cap="none" i="0" spc="0" strike="noStrike" sz="1800" u="none" kumimoji="0" normalizeH="0">
             <a:ln>
               <a:noFill/>
             </a:ln>
@@ -5172,7 +5349,7 @@
           <a:buFontTx/>
           <a:buNone/>
           <a:tabLst/>
-          <a:defRPr kumimoji="0" sz="1800" b="0" i="0" u="none" strike="noStrike" cap="none" spc="0" normalizeH="0" baseline="0">
+          <a:defRPr b="0" baseline="0" cap="none" i="0" spc="0" strike="noStrike" sz="1800" u="none" kumimoji="0" normalizeH="0">
             <a:ln>
               <a:noFill/>
             </a:ln>
@@ -5198,7 +5375,7 @@
           <a:buFontTx/>
           <a:buNone/>
           <a:tabLst/>
-          <a:defRPr kumimoji="0" sz="1800" b="0" i="0" u="none" strike="noStrike" cap="none" spc="0" normalizeH="0" baseline="0">
+          <a:defRPr b="0" baseline="0" cap="none" i="0" spc="0" strike="noStrike" sz="1800" u="none" kumimoji="0" normalizeH="0">
             <a:ln>
               <a:noFill/>
             </a:ln>
@@ -5224,7 +5401,7 @@
           <a:buFontTx/>
           <a:buNone/>
           <a:tabLst/>
-          <a:defRPr kumimoji="0" sz="1800" b="0" i="0" u="none" strike="noStrike" cap="none" spc="0" normalizeH="0" baseline="0">
+          <a:defRPr b="0" baseline="0" cap="none" i="0" spc="0" strike="noStrike" sz="1800" u="none" kumimoji="0" normalizeH="0">
             <a:ln>
               <a:noFill/>
             </a:ln>
@@ -5250,7 +5427,7 @@
           <a:buFontTx/>
           <a:buNone/>
           <a:tabLst/>
-          <a:defRPr kumimoji="0" sz="1800" b="0" i="0" u="none" strike="noStrike" cap="none" spc="0" normalizeH="0" baseline="0">
+          <a:defRPr b="0" baseline="0" cap="none" i="0" spc="0" strike="noStrike" sz="1800" u="none" kumimoji="0" normalizeH="0">
             <a:ln>
               <a:noFill/>
             </a:ln>
@@ -5276,7 +5453,7 @@
           <a:buFontTx/>
           <a:buNone/>
           <a:tabLst/>
-          <a:defRPr kumimoji="0" sz="1800" b="0" i="0" u="none" strike="noStrike" cap="none" spc="0" normalizeH="0" baseline="0">
+          <a:defRPr b="0" baseline="0" cap="none" i="0" spc="0" strike="noStrike" sz="1800" u="none" kumimoji="0" normalizeH="0">
             <a:ln>
               <a:noFill/>
             </a:ln>
@@ -5302,7 +5479,7 @@
           <a:buFontTx/>
           <a:buNone/>
           <a:tabLst/>
-          <a:defRPr kumimoji="0" sz="1800" b="0" i="0" u="none" strike="noStrike" cap="none" spc="0" normalizeH="0" baseline="0">
+          <a:defRPr b="0" baseline="0" cap="none" i="0" spc="0" strike="noStrike" sz="1800" u="none" kumimoji="0" normalizeH="0">
             <a:ln>
               <a:noFill/>
             </a:ln>
@@ -5315,15 +5492,9 @@
         </a:lvl9pPr>
       </a:lstStyle>
       <a:style>
-        <a:lnRef idx="0">
-          <a:scrgbClr r="0" g="0" b="0"/>
-        </a:lnRef>
-        <a:fillRef idx="0">
-          <a:scrgbClr r="0" g="0" b="0"/>
-        </a:fillRef>
-        <a:effectRef idx="0">
-          <a:scrgbClr r="0" g="0" b="0"/>
-        </a:effectRef>
+        <a:lnRef idx="0"/>
+        <a:fillRef idx="0"/>
+        <a:effectRef idx="0"/>
         <a:fontRef idx="none"/>
       </a:style>
     </a:lnDef>
@@ -5337,7 +5508,7 @@
         <a:effectLst/>
         <a:sp3d/>
       </a:spPr>
-      <a:bodyPr rot="0" spcFirstLastPara="1" vertOverflow="overflow" horzOverflow="overflow" vert="horz" wrap="square" lIns="50800" tIns="50800" rIns="50800" bIns="50800" numCol="1" spcCol="38100" rtlCol="0" anchor="ctr">
+      <a:bodyPr rot="0" spcFirstLastPara="1" vertOverflow="overflow" horzOverflow="overflow" vert="horz" wrap="square" lIns="50800" tIns="50800" rIns="50800" bIns="50800" numCol="1" spcCol="38100" rtlCol="0" anchor="ctr" upright="0">
         <a:spAutoFit/>
       </a:bodyPr>
       <a:lstStyle>
@@ -5356,7 +5527,7 @@
           <a:buFontTx/>
           <a:buNone/>
           <a:tabLst/>
-          <a:defRPr kumimoji="0" sz="2400" b="1" i="0" u="none" strike="noStrike" cap="none" spc="0" normalizeH="0" baseline="0">
+          <a:defRPr b="0" baseline="0" cap="none" i="0" spc="0" strike="noStrike" sz="2400" u="none" kumimoji="0" normalizeH="0">
             <a:ln>
               <a:noFill/>
             </a:ln>
@@ -5365,10 +5536,10 @@
             </a:solidFill>
             <a:effectLst/>
             <a:uFillTx/>
-            <a:latin typeface="Helvetica Neue"/>
-            <a:ea typeface="Helvetica Neue"/>
-            <a:cs typeface="Helvetica Neue"/>
-            <a:sym typeface="Helvetica Neue"/>
+            <a:latin typeface="Helvetica Neue Medium"/>
+            <a:ea typeface="Helvetica Neue Medium"/>
+            <a:cs typeface="Helvetica Neue Medium"/>
+            <a:sym typeface="Helvetica Neue Medium"/>
           </a:defRPr>
         </a:defPPr>
         <a:lvl1pPr marL="0" marR="0" indent="0" algn="l" defTabSz="914400" rtl="0" fontAlgn="auto" latinLnBrk="1" hangingPunct="0">
@@ -5386,7 +5557,7 @@
           <a:buFontTx/>
           <a:buNone/>
           <a:tabLst/>
-          <a:defRPr kumimoji="0" sz="1800" b="0" i="0" u="none" strike="noStrike" cap="none" spc="0" normalizeH="0" baseline="0">
+          <a:defRPr b="0" baseline="0" cap="none" i="0" spc="0" strike="noStrike" sz="1800" u="none" kumimoji="0" normalizeH="0">
             <a:ln>
               <a:noFill/>
             </a:ln>
@@ -5412,7 +5583,7 @@
           <a:buFontTx/>
           <a:buNone/>
           <a:tabLst/>
-          <a:defRPr kumimoji="0" sz="1800" b="0" i="0" u="none" strike="noStrike" cap="none" spc="0" normalizeH="0" baseline="0">
+          <a:defRPr b="0" baseline="0" cap="none" i="0" spc="0" strike="noStrike" sz="1800" u="none" kumimoji="0" normalizeH="0">
             <a:ln>
               <a:noFill/>
             </a:ln>
@@ -5438,7 +5609,7 @@
           <a:buFontTx/>
           <a:buNone/>
           <a:tabLst/>
-          <a:defRPr kumimoji="0" sz="1800" b="0" i="0" u="none" strike="noStrike" cap="none" spc="0" normalizeH="0" baseline="0">
+          <a:defRPr b="0" baseline="0" cap="none" i="0" spc="0" strike="noStrike" sz="1800" u="none" kumimoji="0" normalizeH="0">
             <a:ln>
               <a:noFill/>
             </a:ln>
@@ -5464,7 +5635,7 @@
           <a:buFontTx/>
           <a:buNone/>
           <a:tabLst/>
-          <a:defRPr kumimoji="0" sz="1800" b="0" i="0" u="none" strike="noStrike" cap="none" spc="0" normalizeH="0" baseline="0">
+          <a:defRPr b="0" baseline="0" cap="none" i="0" spc="0" strike="noStrike" sz="1800" u="none" kumimoji="0" normalizeH="0">
             <a:ln>
               <a:noFill/>
             </a:ln>
@@ -5490,7 +5661,7 @@
           <a:buFontTx/>
           <a:buNone/>
           <a:tabLst/>
-          <a:defRPr kumimoji="0" sz="1800" b="0" i="0" u="none" strike="noStrike" cap="none" spc="0" normalizeH="0" baseline="0">
+          <a:defRPr b="0" baseline="0" cap="none" i="0" spc="0" strike="noStrike" sz="1800" u="none" kumimoji="0" normalizeH="0">
             <a:ln>
               <a:noFill/>
             </a:ln>
@@ -5516,7 +5687,7 @@
           <a:buFontTx/>
           <a:buNone/>
           <a:tabLst/>
-          <a:defRPr kumimoji="0" sz="1800" b="0" i="0" u="none" strike="noStrike" cap="none" spc="0" normalizeH="0" baseline="0">
+          <a:defRPr b="0" baseline="0" cap="none" i="0" spc="0" strike="noStrike" sz="1800" u="none" kumimoji="0" normalizeH="0">
             <a:ln>
               <a:noFill/>
             </a:ln>
@@ -5542,7 +5713,7 @@
           <a:buFontTx/>
           <a:buNone/>
           <a:tabLst/>
-          <a:defRPr kumimoji="0" sz="1800" b="0" i="0" u="none" strike="noStrike" cap="none" spc="0" normalizeH="0" baseline="0">
+          <a:defRPr b="0" baseline="0" cap="none" i="0" spc="0" strike="noStrike" sz="1800" u="none" kumimoji="0" normalizeH="0">
             <a:ln>
               <a:noFill/>
             </a:ln>
@@ -5568,7 +5739,7 @@
           <a:buFontTx/>
           <a:buNone/>
           <a:tabLst/>
-          <a:defRPr kumimoji="0" sz="1800" b="0" i="0" u="none" strike="noStrike" cap="none" spc="0" normalizeH="0" baseline="0">
+          <a:defRPr b="0" baseline="0" cap="none" i="0" spc="0" strike="noStrike" sz="1800" u="none" kumimoji="0" normalizeH="0">
             <a:ln>
               <a:noFill/>
             </a:ln>
@@ -5594,7 +5765,7 @@
           <a:buFontTx/>
           <a:buNone/>
           <a:tabLst/>
-          <a:defRPr kumimoji="0" sz="1800" b="0" i="0" u="none" strike="noStrike" cap="none" spc="0" normalizeH="0" baseline="0">
+          <a:defRPr b="0" baseline="0" cap="none" i="0" spc="0" strike="noStrike" sz="1800" u="none" kumimoji="0" normalizeH="0">
             <a:ln>
               <a:noFill/>
             </a:ln>
@@ -5607,25 +5778,18 @@
         </a:lvl9pPr>
       </a:lstStyle>
       <a:style>
-        <a:lnRef idx="0">
-          <a:scrgbClr r="0" g="0" b="0"/>
-        </a:lnRef>
-        <a:fillRef idx="0">
-          <a:scrgbClr r="0" g="0" b="0"/>
-        </a:fillRef>
-        <a:effectRef idx="0">
-          <a:scrgbClr r="0" g="0" b="0"/>
-        </a:effectRef>
+        <a:lnRef idx="0"/>
+        <a:fillRef idx="0"/>
+        <a:effectRef idx="0"/>
         <a:fontRef idx="none"/>
       </a:style>
     </a:txDef>
   </a:objectDefaults>
-  <a:extraClrSchemeLst/>
 </a:theme>
 </file>
 
 <file path=ppt/theme/theme2.xml><?xml version="1.0" encoding="utf-8"?>
-<a:theme xmlns:a="http://schemas.openxmlformats.org/drawingml/2006/main" name="White">
+<a:theme xmlns:a="http://schemas.openxmlformats.org/drawingml/2006/main" xmlns:r="http://schemas.openxmlformats.org/officeDocument/2006/relationships" name="White">
   <a:themeElements>
     <a:clrScheme name="White">
       <a:dk1>
@@ -5635,10 +5799,10 @@
         <a:srgbClr val="FFFFFF"/>
       </a:lt1>
       <a:dk2>
-        <a:srgbClr val="5E5E5E"/>
+        <a:srgbClr val="A7A7A7"/>
       </a:dk2>
       <a:lt2>
-        <a:srgbClr val="D6D5D5"/>
+        <a:srgbClr val="535353"/>
       </a:lt2>
       <a:accent1>
         <a:srgbClr val="00A2FF"/>
@@ -5667,14 +5831,14 @@
     </a:clrScheme>
     <a:fontScheme name="White">
       <a:majorFont>
-        <a:latin typeface="Helvetica Neue Medium"/>
-        <a:ea typeface="Helvetica Neue Medium"/>
-        <a:cs typeface="Helvetica Neue Medium"/>
+        <a:latin typeface="Helvetica"/>
+        <a:ea typeface="Helvetica"/>
+        <a:cs typeface="Helvetica"/>
       </a:majorFont>
       <a:minorFont>
-        <a:latin typeface="Helvetica Neue Medium"/>
-        <a:ea typeface="Helvetica Neue Medium"/>
-        <a:cs typeface="Helvetica Neue Medium"/>
+        <a:latin typeface="Helvetica Neue"/>
+        <a:ea typeface="Helvetica Neue"/>
+        <a:cs typeface="Helvetica Neue"/>
       </a:minorFont>
     </a:fontScheme>
     <a:fmtScheme name="White">
@@ -5815,16 +5979,19 @@
     <a:spDef>
       <a:spPr>
         <a:solidFill>
-          <a:schemeClr val="accent1"/>
+          <a:srgbClr val="FFFFFF"/>
         </a:solidFill>
-        <a:ln w="12700" cap="flat">
-          <a:noFill/>
-          <a:miter lim="400000"/>
+        <a:ln w="25400" cap="flat">
+          <a:solidFill>
+            <a:schemeClr val="accent1"/>
+          </a:solidFill>
+          <a:prstDash val="solid"/>
+          <a:round/>
         </a:ln>
         <a:effectLst/>
         <a:sp3d/>
       </a:spPr>
-      <a:bodyPr rot="0" spcFirstLastPara="1" vertOverflow="overflow" horzOverflow="overflow" vert="horz" wrap="square" lIns="50800" tIns="50800" rIns="50800" bIns="50800" numCol="1" spcCol="38100" rtlCol="0" anchor="ctr">
+      <a:bodyPr rot="0" spcFirstLastPara="1" vertOverflow="overflow" horzOverflow="overflow" vert="horz" wrap="square" lIns="50800" tIns="50800" rIns="50800" bIns="50800" numCol="1" spcCol="38100" rtlCol="0" anchor="ctr" upright="0">
         <a:spAutoFit/>
       </a:bodyPr>
       <a:lstStyle>
@@ -5843,18 +6010,18 @@
           <a:buFontTx/>
           <a:buNone/>
           <a:tabLst/>
-          <a:defRPr kumimoji="0" sz="2200" b="0" i="0" u="none" strike="noStrike" cap="none" spc="0" normalizeH="0" baseline="0">
+          <a:defRPr b="0" baseline="0" cap="none" i="0" spc="0" strike="noStrike" sz="2400" u="none" kumimoji="0" normalizeH="0">
             <a:ln>
               <a:noFill/>
             </a:ln>
             <a:solidFill>
-              <a:srgbClr val="FFFFFF"/>
+              <a:srgbClr val="000000"/>
             </a:solidFill>
             <a:effectLst/>
             <a:uFillTx/>
-            <a:latin typeface="+mn-lt"/>
-            <a:ea typeface="+mn-ea"/>
-            <a:cs typeface="+mn-cs"/>
+            <a:latin typeface="Helvetica Neue Medium"/>
+            <a:ea typeface="Helvetica Neue Medium"/>
+            <a:cs typeface="Helvetica Neue Medium"/>
             <a:sym typeface="Helvetica Neue Medium"/>
           </a:defRPr>
         </a:defPPr>
@@ -5873,7 +6040,7 @@
           <a:buFontTx/>
           <a:buNone/>
           <a:tabLst/>
-          <a:defRPr kumimoji="0" sz="1800" b="0" i="0" u="none" strike="noStrike" cap="none" spc="0" normalizeH="0" baseline="0">
+          <a:defRPr b="0" baseline="0" cap="none" i="0" spc="0" strike="noStrike" sz="1800" u="none" kumimoji="0" normalizeH="0">
             <a:ln>
               <a:noFill/>
             </a:ln>
@@ -5899,7 +6066,7 @@
           <a:buFontTx/>
           <a:buNone/>
           <a:tabLst/>
-          <a:defRPr kumimoji="0" sz="1800" b="0" i="0" u="none" strike="noStrike" cap="none" spc="0" normalizeH="0" baseline="0">
+          <a:defRPr b="0" baseline="0" cap="none" i="0" spc="0" strike="noStrike" sz="1800" u="none" kumimoji="0" normalizeH="0">
             <a:ln>
               <a:noFill/>
             </a:ln>
@@ -5925,7 +6092,7 @@
           <a:buFontTx/>
           <a:buNone/>
           <a:tabLst/>
-          <a:defRPr kumimoji="0" sz="1800" b="0" i="0" u="none" strike="noStrike" cap="none" spc="0" normalizeH="0" baseline="0">
+          <a:defRPr b="0" baseline="0" cap="none" i="0" spc="0" strike="noStrike" sz="1800" u="none" kumimoji="0" normalizeH="0">
             <a:ln>
               <a:noFill/>
             </a:ln>
@@ -5951,7 +6118,7 @@
           <a:buFontTx/>
           <a:buNone/>
           <a:tabLst/>
-          <a:defRPr kumimoji="0" sz="1800" b="0" i="0" u="none" strike="noStrike" cap="none" spc="0" normalizeH="0" baseline="0">
+          <a:defRPr b="0" baseline="0" cap="none" i="0" spc="0" strike="noStrike" sz="1800" u="none" kumimoji="0" normalizeH="0">
             <a:ln>
               <a:noFill/>
             </a:ln>
@@ -5977,7 +6144,7 @@
           <a:buFontTx/>
           <a:buNone/>
           <a:tabLst/>
-          <a:defRPr kumimoji="0" sz="1800" b="0" i="0" u="none" strike="noStrike" cap="none" spc="0" normalizeH="0" baseline="0">
+          <a:defRPr b="0" baseline="0" cap="none" i="0" spc="0" strike="noStrike" sz="1800" u="none" kumimoji="0" normalizeH="0">
             <a:ln>
               <a:noFill/>
             </a:ln>
@@ -6003,7 +6170,7 @@
           <a:buFontTx/>
           <a:buNone/>
           <a:tabLst/>
-          <a:defRPr kumimoji="0" sz="1800" b="0" i="0" u="none" strike="noStrike" cap="none" spc="0" normalizeH="0" baseline="0">
+          <a:defRPr b="0" baseline="0" cap="none" i="0" spc="0" strike="noStrike" sz="1800" u="none" kumimoji="0" normalizeH="0">
             <a:ln>
               <a:noFill/>
             </a:ln>
@@ -6029,7 +6196,7 @@
           <a:buFontTx/>
           <a:buNone/>
           <a:tabLst/>
-          <a:defRPr kumimoji="0" sz="1800" b="0" i="0" u="none" strike="noStrike" cap="none" spc="0" normalizeH="0" baseline="0">
+          <a:defRPr b="0" baseline="0" cap="none" i="0" spc="0" strike="noStrike" sz="1800" u="none" kumimoji="0" normalizeH="0">
             <a:ln>
               <a:noFill/>
             </a:ln>
@@ -6055,7 +6222,7 @@
           <a:buFontTx/>
           <a:buNone/>
           <a:tabLst/>
-          <a:defRPr kumimoji="0" sz="1800" b="0" i="0" u="none" strike="noStrike" cap="none" spc="0" normalizeH="0" baseline="0">
+          <a:defRPr b="0" baseline="0" cap="none" i="0" spc="0" strike="noStrike" sz="1800" u="none" kumimoji="0" normalizeH="0">
             <a:ln>
               <a:noFill/>
             </a:ln>
@@ -6081,7 +6248,7 @@
           <a:buFontTx/>
           <a:buNone/>
           <a:tabLst/>
-          <a:defRPr kumimoji="0" sz="1800" b="0" i="0" u="none" strike="noStrike" cap="none" spc="0" normalizeH="0" baseline="0">
+          <a:defRPr b="0" baseline="0" cap="none" i="0" spc="0" strike="noStrike" sz="1800" u="none" kumimoji="0" normalizeH="0">
             <a:ln>
               <a:noFill/>
             </a:ln>
@@ -6094,15 +6261,9 @@
         </a:lvl9pPr>
       </a:lstStyle>
       <a:style>
-        <a:lnRef idx="0">
-          <a:scrgbClr r="0" g="0" b="0"/>
-        </a:lnRef>
-        <a:fillRef idx="0">
-          <a:scrgbClr r="0" g="0" b="0"/>
-        </a:fillRef>
-        <a:effectRef idx="0">
-          <a:scrgbClr r="0" g="0" b="0"/>
-        </a:effectRef>
+        <a:lnRef idx="0"/>
+        <a:fillRef idx="0"/>
+        <a:effectRef idx="0"/>
         <a:fontRef idx="none"/>
       </a:style>
     </a:spDef>
@@ -6111,15 +6272,15 @@
         <a:noFill/>
         <a:ln w="25400" cap="flat">
           <a:solidFill>
-            <a:srgbClr val="000000"/>
+            <a:schemeClr val="accent1"/>
           </a:solidFill>
           <a:prstDash val="solid"/>
-          <a:miter lim="400000"/>
+          <a:round/>
         </a:ln>
         <a:effectLst/>
         <a:sp3d/>
       </a:spPr>
-      <a:bodyPr rot="0" spcFirstLastPara="1" vertOverflow="overflow" horzOverflow="overflow" vert="horz" wrap="square" lIns="91439" tIns="45719" rIns="91439" bIns="45719" numCol="1" spcCol="38100" rtlCol="0" anchor="t">
+      <a:bodyPr rot="0" spcFirstLastPara="1" vertOverflow="overflow" horzOverflow="overflow" vert="horz" wrap="square" lIns="91439" tIns="45719" rIns="91439" bIns="45719" numCol="1" spcCol="38100" rtlCol="0" anchor="t" upright="0">
         <a:noAutofit/>
       </a:bodyPr>
       <a:lstStyle>
@@ -6138,7 +6299,7 @@
           <a:buFontTx/>
           <a:buNone/>
           <a:tabLst/>
-          <a:defRPr kumimoji="0" sz="1800" b="0" i="0" u="none" strike="noStrike" cap="none" spc="0" normalizeH="0" baseline="0">
+          <a:defRPr b="0" baseline="0" cap="none" i="0" spc="0" strike="noStrike" sz="1800" u="none" kumimoji="0" normalizeH="0">
             <a:ln>
               <a:noFill/>
             </a:ln>
@@ -6164,7 +6325,7 @@
           <a:buFontTx/>
           <a:buNone/>
           <a:tabLst/>
-          <a:defRPr kumimoji="0" sz="1800" b="0" i="0" u="none" strike="noStrike" cap="none" spc="0" normalizeH="0" baseline="0">
+          <a:defRPr b="0" baseline="0" cap="none" i="0" spc="0" strike="noStrike" sz="1800" u="none" kumimoji="0" normalizeH="0">
             <a:ln>
               <a:noFill/>
             </a:ln>
@@ -6190,7 +6351,7 @@
           <a:buFontTx/>
           <a:buNone/>
           <a:tabLst/>
-          <a:defRPr kumimoji="0" sz="1800" b="0" i="0" u="none" strike="noStrike" cap="none" spc="0" normalizeH="0" baseline="0">
+          <a:defRPr b="0" baseline="0" cap="none" i="0" spc="0" strike="noStrike" sz="1800" u="none" kumimoji="0" normalizeH="0">
             <a:ln>
               <a:noFill/>
             </a:ln>
@@ -6216,7 +6377,7 @@
           <a:buFontTx/>
           <a:buNone/>
           <a:tabLst/>
-          <a:defRPr kumimoji="0" sz="1800" b="0" i="0" u="none" strike="noStrike" cap="none" spc="0" normalizeH="0" baseline="0">
+          <a:defRPr b="0" baseline="0" cap="none" i="0" spc="0" strike="noStrike" sz="1800" u="none" kumimoji="0" normalizeH="0">
             <a:ln>
               <a:noFill/>
             </a:ln>
@@ -6242,7 +6403,7 @@
           <a:buFontTx/>
           <a:buNone/>
           <a:tabLst/>
-          <a:defRPr kumimoji="0" sz="1800" b="0" i="0" u="none" strike="noStrike" cap="none" spc="0" normalizeH="0" baseline="0">
+          <a:defRPr b="0" baseline="0" cap="none" i="0" spc="0" strike="noStrike" sz="1800" u="none" kumimoji="0" normalizeH="0">
             <a:ln>
               <a:noFill/>
             </a:ln>
@@ -6268,7 +6429,7 @@
           <a:buFontTx/>
           <a:buNone/>
           <a:tabLst/>
-          <a:defRPr kumimoji="0" sz="1800" b="0" i="0" u="none" strike="noStrike" cap="none" spc="0" normalizeH="0" baseline="0">
+          <a:defRPr b="0" baseline="0" cap="none" i="0" spc="0" strike="noStrike" sz="1800" u="none" kumimoji="0" normalizeH="0">
             <a:ln>
               <a:noFill/>
             </a:ln>
@@ -6294,7 +6455,7 @@
           <a:buFontTx/>
           <a:buNone/>
           <a:tabLst/>
-          <a:defRPr kumimoji="0" sz="1800" b="0" i="0" u="none" strike="noStrike" cap="none" spc="0" normalizeH="0" baseline="0">
+          <a:defRPr b="0" baseline="0" cap="none" i="0" spc="0" strike="noStrike" sz="1800" u="none" kumimoji="0" normalizeH="0">
             <a:ln>
               <a:noFill/>
             </a:ln>
@@ -6320,7 +6481,7 @@
           <a:buFontTx/>
           <a:buNone/>
           <a:tabLst/>
-          <a:defRPr kumimoji="0" sz="1800" b="0" i="0" u="none" strike="noStrike" cap="none" spc="0" normalizeH="0" baseline="0">
+          <a:defRPr b="0" baseline="0" cap="none" i="0" spc="0" strike="noStrike" sz="1800" u="none" kumimoji="0" normalizeH="0">
             <a:ln>
               <a:noFill/>
             </a:ln>
@@ -6346,7 +6507,7 @@
           <a:buFontTx/>
           <a:buNone/>
           <a:tabLst/>
-          <a:defRPr kumimoji="0" sz="1800" b="0" i="0" u="none" strike="noStrike" cap="none" spc="0" normalizeH="0" baseline="0">
+          <a:defRPr b="0" baseline="0" cap="none" i="0" spc="0" strike="noStrike" sz="1800" u="none" kumimoji="0" normalizeH="0">
             <a:ln>
               <a:noFill/>
             </a:ln>
@@ -6372,7 +6533,7 @@
           <a:buFontTx/>
           <a:buNone/>
           <a:tabLst/>
-          <a:defRPr kumimoji="0" sz="1800" b="0" i="0" u="none" strike="noStrike" cap="none" spc="0" normalizeH="0" baseline="0">
+          <a:defRPr b="0" baseline="0" cap="none" i="0" spc="0" strike="noStrike" sz="1800" u="none" kumimoji="0" normalizeH="0">
             <a:ln>
               <a:noFill/>
             </a:ln>
@@ -6385,15 +6546,9 @@
         </a:lvl9pPr>
       </a:lstStyle>
       <a:style>
-        <a:lnRef idx="0">
-          <a:scrgbClr r="0" g="0" b="0"/>
-        </a:lnRef>
-        <a:fillRef idx="0">
-          <a:scrgbClr r="0" g="0" b="0"/>
-        </a:fillRef>
-        <a:effectRef idx="0">
-          <a:scrgbClr r="0" g="0" b="0"/>
-        </a:effectRef>
+        <a:lnRef idx="0"/>
+        <a:fillRef idx="0"/>
+        <a:effectRef idx="0"/>
         <a:fontRef idx="none"/>
       </a:style>
     </a:lnDef>
@@ -6407,7 +6562,7 @@
         <a:effectLst/>
         <a:sp3d/>
       </a:spPr>
-      <a:bodyPr rot="0" spcFirstLastPara="1" vertOverflow="overflow" horzOverflow="overflow" vert="horz" wrap="square" lIns="50800" tIns="50800" rIns="50800" bIns="50800" numCol="1" spcCol="38100" rtlCol="0" anchor="ctr">
+      <a:bodyPr rot="0" spcFirstLastPara="1" vertOverflow="overflow" horzOverflow="overflow" vert="horz" wrap="square" lIns="50800" tIns="50800" rIns="50800" bIns="50800" numCol="1" spcCol="38100" rtlCol="0" anchor="ctr" upright="0">
         <a:spAutoFit/>
       </a:bodyPr>
       <a:lstStyle>
@@ -6426,7 +6581,7 @@
           <a:buFontTx/>
           <a:buNone/>
           <a:tabLst/>
-          <a:defRPr kumimoji="0" sz="2400" b="1" i="0" u="none" strike="noStrike" cap="none" spc="0" normalizeH="0" baseline="0">
+          <a:defRPr b="0" baseline="0" cap="none" i="0" spc="0" strike="noStrike" sz="2400" u="none" kumimoji="0" normalizeH="0">
             <a:ln>
               <a:noFill/>
             </a:ln>
@@ -6435,10 +6590,10 @@
             </a:solidFill>
             <a:effectLst/>
             <a:uFillTx/>
-            <a:latin typeface="Helvetica Neue"/>
-            <a:ea typeface="Helvetica Neue"/>
-            <a:cs typeface="Helvetica Neue"/>
-            <a:sym typeface="Helvetica Neue"/>
+            <a:latin typeface="Helvetica Neue Medium"/>
+            <a:ea typeface="Helvetica Neue Medium"/>
+            <a:cs typeface="Helvetica Neue Medium"/>
+            <a:sym typeface="Helvetica Neue Medium"/>
           </a:defRPr>
         </a:defPPr>
         <a:lvl1pPr marL="0" marR="0" indent="0" algn="l" defTabSz="914400" rtl="0" fontAlgn="auto" latinLnBrk="1" hangingPunct="0">
@@ -6456,7 +6611,7 @@
           <a:buFontTx/>
           <a:buNone/>
           <a:tabLst/>
-          <a:defRPr kumimoji="0" sz="1800" b="0" i="0" u="none" strike="noStrike" cap="none" spc="0" normalizeH="0" baseline="0">
+          <a:defRPr b="0" baseline="0" cap="none" i="0" spc="0" strike="noStrike" sz="1800" u="none" kumimoji="0" normalizeH="0">
             <a:ln>
               <a:noFill/>
             </a:ln>
@@ -6482,7 +6637,7 @@
           <a:buFontTx/>
           <a:buNone/>
           <a:tabLst/>
-          <a:defRPr kumimoji="0" sz="1800" b="0" i="0" u="none" strike="noStrike" cap="none" spc="0" normalizeH="0" baseline="0">
+          <a:defRPr b="0" baseline="0" cap="none" i="0" spc="0" strike="noStrike" sz="1800" u="none" kumimoji="0" normalizeH="0">
             <a:ln>
               <a:noFill/>
             </a:ln>
@@ -6508,7 +6663,7 @@
           <a:buFontTx/>
           <a:buNone/>
           <a:tabLst/>
-          <a:defRPr kumimoji="0" sz="1800" b="0" i="0" u="none" strike="noStrike" cap="none" spc="0" normalizeH="0" baseline="0">
+          <a:defRPr b="0" baseline="0" cap="none" i="0" spc="0" strike="noStrike" sz="1800" u="none" kumimoji="0" normalizeH="0">
             <a:ln>
               <a:noFill/>
             </a:ln>
@@ -6534,7 +6689,7 @@
           <a:buFontTx/>
           <a:buNone/>
           <a:tabLst/>
-          <a:defRPr kumimoji="0" sz="1800" b="0" i="0" u="none" strike="noStrike" cap="none" spc="0" normalizeH="0" baseline="0">
+          <a:defRPr b="0" baseline="0" cap="none" i="0" spc="0" strike="noStrike" sz="1800" u="none" kumimoji="0" normalizeH="0">
             <a:ln>
               <a:noFill/>
             </a:ln>
@@ -6560,7 +6715,7 @@
           <a:buFontTx/>
           <a:buNone/>
           <a:tabLst/>
-          <a:defRPr kumimoji="0" sz="1800" b="0" i="0" u="none" strike="noStrike" cap="none" spc="0" normalizeH="0" baseline="0">
+          <a:defRPr b="0" baseline="0" cap="none" i="0" spc="0" strike="noStrike" sz="1800" u="none" kumimoji="0" normalizeH="0">
             <a:ln>
               <a:noFill/>
             </a:ln>
@@ -6586,7 +6741,7 @@
           <a:buFontTx/>
           <a:buNone/>
           <a:tabLst/>
-          <a:defRPr kumimoji="0" sz="1800" b="0" i="0" u="none" strike="noStrike" cap="none" spc="0" normalizeH="0" baseline="0">
+          <a:defRPr b="0" baseline="0" cap="none" i="0" spc="0" strike="noStrike" sz="1800" u="none" kumimoji="0" normalizeH="0">
             <a:ln>
               <a:noFill/>
             </a:ln>
@@ -6612,7 +6767,7 @@
           <a:buFontTx/>
           <a:buNone/>
           <a:tabLst/>
-          <a:defRPr kumimoji="0" sz="1800" b="0" i="0" u="none" strike="noStrike" cap="none" spc="0" normalizeH="0" baseline="0">
+          <a:defRPr b="0" baseline="0" cap="none" i="0" spc="0" strike="noStrike" sz="1800" u="none" kumimoji="0" normalizeH="0">
             <a:ln>
               <a:noFill/>
             </a:ln>
@@ -6638,7 +6793,7 @@
           <a:buFontTx/>
           <a:buNone/>
           <a:tabLst/>
-          <a:defRPr kumimoji="0" sz="1800" b="0" i="0" u="none" strike="noStrike" cap="none" spc="0" normalizeH="0" baseline="0">
+          <a:defRPr b="0" baseline="0" cap="none" i="0" spc="0" strike="noStrike" sz="1800" u="none" kumimoji="0" normalizeH="0">
             <a:ln>
               <a:noFill/>
             </a:ln>
@@ -6664,7 +6819,7 @@
           <a:buFontTx/>
           <a:buNone/>
           <a:tabLst/>
-          <a:defRPr kumimoji="0" sz="1800" b="0" i="0" u="none" strike="noStrike" cap="none" spc="0" normalizeH="0" baseline="0">
+          <a:defRPr b="0" baseline="0" cap="none" i="0" spc="0" strike="noStrike" sz="1800" u="none" kumimoji="0" normalizeH="0">
             <a:ln>
               <a:noFill/>
             </a:ln>
@@ -6677,19 +6832,12 @@
         </a:lvl9pPr>
       </a:lstStyle>
       <a:style>
-        <a:lnRef idx="0">
-          <a:scrgbClr r="0" g="0" b="0"/>
-        </a:lnRef>
-        <a:fillRef idx="0">
-          <a:scrgbClr r="0" g="0" b="0"/>
-        </a:fillRef>
-        <a:effectRef idx="0">
-          <a:scrgbClr r="0" g="0" b="0"/>
-        </a:effectRef>
+        <a:lnRef idx="0"/>
+        <a:fillRef idx="0"/>
+        <a:effectRef idx="0"/>
         <a:fontRef idx="none"/>
       </a:style>
     </a:txDef>
   </a:objectDefaults>
-  <a:extraClrSchemeLst/>
 </a:theme>
 </file>
</xml_diff>